<commit_message>
Ammends and Updates English Presentation
</commit_message>
<xml_diff>
--- a/QCNNCancerClassifier.pptx
+++ b/QCNNCancerClassifier.pptx
@@ -12,11 +12,13 @@
     <p:sldId id="261" r:id="rId6"/>
     <p:sldId id="262" r:id="rId7"/>
     <p:sldId id="263" r:id="rId8"/>
-    <p:sldId id="266" r:id="rId9"/>
-    <p:sldId id="264" r:id="rId10"/>
-    <p:sldId id="268" r:id="rId11"/>
-    <p:sldId id="265" r:id="rId12"/>
-    <p:sldId id="267" r:id="rId13"/>
+    <p:sldId id="269" r:id="rId9"/>
+    <p:sldId id="270" r:id="rId10"/>
+    <p:sldId id="266" r:id="rId11"/>
+    <p:sldId id="264" r:id="rId12"/>
+    <p:sldId id="268" r:id="rId13"/>
+    <p:sldId id="265" r:id="rId14"/>
+    <p:sldId id="267" r:id="rId15"/>
   </p:sldIdLst>
   <p:sldSz cx="12192000" cy="6858000"/>
   <p:notesSz cx="6858000" cy="9144000"/>
@@ -1789,7 +1791,7 @@
           <a:p>
             <a:fld id="{8F72BA41-EC5B-4197-BCC8-0FD2E523CD7A}" type="datetimeFigureOut">
               <a:rPr lang="en-US" smtClean="0"/>
-              <a:t>10/28/2022</a:t>
+              <a:t>11/4/2022</a:t>
             </a:fld>
             <a:endParaRPr lang="en-US"/>
           </a:p>
@@ -1992,7 +1994,7 @@
           <a:p>
             <a:fld id="{8F72BA41-EC5B-4197-BCC8-0FD2E523CD7A}" type="datetimeFigureOut">
               <a:rPr lang="en-US" smtClean="0"/>
-              <a:t>10/28/2022</a:t>
+              <a:t>11/4/2022</a:t>
             </a:fld>
             <a:endParaRPr lang="en-US"/>
           </a:p>
@@ -3713,7 +3715,7 @@
           <a:p>
             <a:fld id="{8F72BA41-EC5B-4197-BCC8-0FD2E523CD7A}" type="datetimeFigureOut">
               <a:rPr lang="en-US" smtClean="0"/>
-              <a:t>10/28/2022</a:t>
+              <a:t>11/4/2022</a:t>
             </a:fld>
             <a:endParaRPr lang="en-US"/>
           </a:p>
@@ -3912,7 +3914,7 @@
           <a:p>
             <a:fld id="{8F72BA41-EC5B-4197-BCC8-0FD2E523CD7A}" type="datetimeFigureOut">
               <a:rPr lang="en-US" smtClean="0"/>
-              <a:t>10/28/2022</a:t>
+              <a:t>11/4/2022</a:t>
             </a:fld>
             <a:endParaRPr lang="en-US"/>
           </a:p>
@@ -5702,7 +5704,7 @@
           <a:p>
             <a:fld id="{8F72BA41-EC5B-4197-BCC8-0FD2E523CD7A}" type="datetimeFigureOut">
               <a:rPr lang="en-US" smtClean="0"/>
-              <a:t>10/28/2022</a:t>
+              <a:t>11/4/2022</a:t>
             </a:fld>
             <a:endParaRPr lang="en-US"/>
           </a:p>
@@ -5975,7 +5977,7 @@
           <a:p>
             <a:fld id="{8F72BA41-EC5B-4197-BCC8-0FD2E523CD7A}" type="datetimeFigureOut">
               <a:rPr lang="en-US" smtClean="0"/>
-              <a:t>10/28/2022</a:t>
+              <a:t>11/4/2022</a:t>
             </a:fld>
             <a:endParaRPr lang="en-US"/>
           </a:p>
@@ -6395,7 +6397,7 @@
           <a:p>
             <a:fld id="{8F72BA41-EC5B-4197-BCC8-0FD2E523CD7A}" type="datetimeFigureOut">
               <a:rPr lang="en-US" smtClean="0"/>
-              <a:t>10/28/2022</a:t>
+              <a:t>11/4/2022</a:t>
             </a:fld>
             <a:endParaRPr lang="en-US"/>
           </a:p>
@@ -6551,7 +6553,7 @@
           <a:p>
             <a:fld id="{8F72BA41-EC5B-4197-BCC8-0FD2E523CD7A}" type="datetimeFigureOut">
               <a:rPr lang="en-US" smtClean="0"/>
-              <a:t>10/28/2022</a:t>
+              <a:t>11/4/2022</a:t>
             </a:fld>
             <a:endParaRPr lang="en-US"/>
           </a:p>
@@ -8119,7 +8121,7 @@
           <a:p>
             <a:fld id="{8F72BA41-EC5B-4197-BCC8-0FD2E523CD7A}" type="datetimeFigureOut">
               <a:rPr lang="en-US" smtClean="0"/>
-              <a:t>10/28/2022</a:t>
+              <a:t>11/4/2022</a:t>
             </a:fld>
             <a:endParaRPr lang="en-US"/>
           </a:p>
@@ -9970,7 +9972,7 @@
           <a:p>
             <a:fld id="{8F72BA41-EC5B-4197-BCC8-0FD2E523CD7A}" type="datetimeFigureOut">
               <a:rPr lang="en-US" smtClean="0"/>
-              <a:t>10/28/2022</a:t>
+              <a:t>11/4/2022</a:t>
             </a:fld>
             <a:endParaRPr lang="en-US"/>
           </a:p>
@@ -11783,7 +11785,7 @@
           <a:p>
             <a:fld id="{8F72BA41-EC5B-4197-BCC8-0FD2E523CD7A}" type="datetimeFigureOut">
               <a:rPr lang="en-US" smtClean="0"/>
-              <a:t>10/28/2022</a:t>
+              <a:t>11/4/2022</a:t>
             </a:fld>
             <a:endParaRPr lang="en-US"/>
           </a:p>
@@ -13477,7 +13479,7 @@
             <a:fld id="{8F72BA41-EC5B-4197-BCC8-0FD2E523CD7A}" type="datetimeFigureOut">
               <a:rPr lang="en-US" smtClean="0"/>
               <a:pPr/>
-              <a:t>10/28/2022</a:t>
+              <a:t>11/4/2022</a:t>
             </a:fld>
             <a:endParaRPr lang="en-US" dirty="0"/>
           </a:p>
@@ -16344,6 +16346,1238 @@
           <a:chExt cx="0" cy="0"/>
         </a:xfrm>
       </p:grpSpPr>
+      <p:sp>
+        <p:nvSpPr>
+          <p:cNvPr id="2" name="Title 1">
+            <a:extLst>
+              <a:ext uri="{FF2B5EF4-FFF2-40B4-BE49-F238E27FC236}">
+                <a16:creationId xmlns:a16="http://schemas.microsoft.com/office/drawing/2014/main" id="{EB6A064A-D868-272C-A067-DD7A50F22CEB}"/>
+              </a:ext>
+            </a:extLst>
+          </p:cNvPr>
+          <p:cNvSpPr>
+            <a:spLocks noGrp="1"/>
+          </p:cNvSpPr>
+          <p:nvPr>
+            <p:ph type="ctrTitle"/>
+          </p:nvPr>
+        </p:nvSpPr>
+        <p:spPr>
+          <a:xfrm>
+            <a:off x="22847" y="48063"/>
+            <a:ext cx="6643087" cy="676505"/>
+          </a:xfrm>
+        </p:spPr>
+        <p:txBody>
+          <a:bodyPr vert="horz" lIns="91440" tIns="45720" rIns="91440" bIns="45720" rtlCol="0" anchor="b">
+            <a:normAutofit/>
+          </a:bodyPr>
+          <a:lstStyle/>
+          <a:p>
+            <a:pPr>
+              <a:lnSpc>
+                <a:spcPct val="90000"/>
+              </a:lnSpc>
+            </a:pPr>
+            <a:r>
+              <a:rPr lang="es-AR" sz="4200" dirty="0"/>
+              <a:t>Net </a:t>
+            </a:r>
+            <a:r>
+              <a:rPr lang="es-AR" sz="4200" dirty="0" err="1"/>
+              <a:t>Overwiew</a:t>
+            </a:r>
+            <a:endParaRPr lang="en-US" sz="4200" dirty="0"/>
+          </a:p>
+        </p:txBody>
+      </p:sp>
+      <p:sp>
+        <p:nvSpPr>
+          <p:cNvPr id="3" name="Subtitle 2">
+            <a:extLst>
+              <a:ext uri="{FF2B5EF4-FFF2-40B4-BE49-F238E27FC236}">
+                <a16:creationId xmlns:a16="http://schemas.microsoft.com/office/drawing/2014/main" id="{73CA6260-6C0F-D08C-E398-A7B28E978324}"/>
+              </a:ext>
+            </a:extLst>
+          </p:cNvPr>
+          <p:cNvSpPr txBox="1">
+            <a:spLocks/>
+          </p:cNvSpPr>
+          <p:nvPr/>
+        </p:nvSpPr>
+        <p:spPr>
+          <a:xfrm>
+            <a:off x="421673" y="6349415"/>
+            <a:ext cx="5633922" cy="658680"/>
+          </a:xfrm>
+          <a:prstGeom prst="rect">
+            <a:avLst/>
+          </a:prstGeom>
+        </p:spPr>
+        <p:txBody>
+          <a:bodyPr vert="horz" lIns="91440" tIns="45720" rIns="91440" bIns="45720" rtlCol="0">
+            <a:normAutofit fontScale="85000" lnSpcReduction="10000"/>
+          </a:bodyPr>
+          <a:lstStyle>
+            <a:lvl1pPr marL="0" indent="0" algn="l" defTabSz="914400" rtl="0" eaLnBrk="1" latinLnBrk="0" hangingPunct="1">
+              <a:lnSpc>
+                <a:spcPct val="110000"/>
+              </a:lnSpc>
+              <a:spcBef>
+                <a:spcPts val="1000"/>
+              </a:spcBef>
+              <a:buClr>
+                <a:schemeClr val="tx2">
+                  <a:lumMod val="50000"/>
+                  <a:lumOff val="50000"/>
+                </a:schemeClr>
+              </a:buClr>
+              <a:buSzPct val="75000"/>
+              <a:buFont typeface="Wingdings" panose="05000000000000000000" pitchFamily="2" charset="2"/>
+              <a:buNone/>
+              <a:defRPr sz="2400" kern="1200">
+                <a:solidFill>
+                  <a:schemeClr val="tx2"/>
+                </a:solidFill>
+                <a:latin typeface="+mn-lt"/>
+                <a:ea typeface="+mn-ea"/>
+                <a:cs typeface="+mn-cs"/>
+              </a:defRPr>
+            </a:lvl1pPr>
+            <a:lvl2pPr marL="457200" indent="0" algn="ctr" defTabSz="914400" rtl="0" eaLnBrk="1" latinLnBrk="0" hangingPunct="1">
+              <a:lnSpc>
+                <a:spcPct val="110000"/>
+              </a:lnSpc>
+              <a:spcBef>
+                <a:spcPts val="500"/>
+              </a:spcBef>
+              <a:buClr>
+                <a:schemeClr val="tx2">
+                  <a:lumMod val="50000"/>
+                  <a:lumOff val="50000"/>
+                </a:schemeClr>
+              </a:buClr>
+              <a:buSzPct val="75000"/>
+              <a:buFont typeface="Wingdings" panose="05000000000000000000" pitchFamily="2" charset="2"/>
+              <a:buNone/>
+              <a:defRPr sz="2000" kern="1200">
+                <a:solidFill>
+                  <a:schemeClr val="tx2"/>
+                </a:solidFill>
+                <a:latin typeface="+mn-lt"/>
+                <a:ea typeface="+mn-ea"/>
+                <a:cs typeface="+mn-cs"/>
+              </a:defRPr>
+            </a:lvl2pPr>
+            <a:lvl3pPr marL="914400" indent="0" algn="ctr" defTabSz="914400" rtl="0" eaLnBrk="1" latinLnBrk="0" hangingPunct="1">
+              <a:lnSpc>
+                <a:spcPct val="110000"/>
+              </a:lnSpc>
+              <a:spcBef>
+                <a:spcPts val="500"/>
+              </a:spcBef>
+              <a:buClr>
+                <a:schemeClr val="tx2">
+                  <a:lumMod val="50000"/>
+                  <a:lumOff val="50000"/>
+                </a:schemeClr>
+              </a:buClr>
+              <a:buSzPct val="75000"/>
+              <a:buFont typeface="Wingdings" panose="05000000000000000000" pitchFamily="2" charset="2"/>
+              <a:buNone/>
+              <a:defRPr sz="1800" kern="1200">
+                <a:solidFill>
+                  <a:schemeClr val="tx2"/>
+                </a:solidFill>
+                <a:latin typeface="+mn-lt"/>
+                <a:ea typeface="+mn-ea"/>
+                <a:cs typeface="+mn-cs"/>
+              </a:defRPr>
+            </a:lvl3pPr>
+            <a:lvl4pPr marL="1371600" indent="0" algn="ctr" defTabSz="914400" rtl="0" eaLnBrk="1" latinLnBrk="0" hangingPunct="1">
+              <a:lnSpc>
+                <a:spcPct val="110000"/>
+              </a:lnSpc>
+              <a:spcBef>
+                <a:spcPts val="500"/>
+              </a:spcBef>
+              <a:buClr>
+                <a:schemeClr val="tx2">
+                  <a:lumMod val="50000"/>
+                  <a:lumOff val="50000"/>
+                </a:schemeClr>
+              </a:buClr>
+              <a:buSzPct val="75000"/>
+              <a:buFont typeface="Wingdings" panose="05000000000000000000" pitchFamily="2" charset="2"/>
+              <a:buNone/>
+              <a:defRPr sz="1600" kern="1200">
+                <a:solidFill>
+                  <a:schemeClr val="tx2"/>
+                </a:solidFill>
+                <a:latin typeface="+mn-lt"/>
+                <a:ea typeface="+mn-ea"/>
+                <a:cs typeface="+mn-cs"/>
+              </a:defRPr>
+            </a:lvl4pPr>
+            <a:lvl5pPr marL="1828800" indent="0" algn="ctr" defTabSz="914400" rtl="0" eaLnBrk="1" latinLnBrk="0" hangingPunct="1">
+              <a:lnSpc>
+                <a:spcPct val="110000"/>
+              </a:lnSpc>
+              <a:spcBef>
+                <a:spcPts val="500"/>
+              </a:spcBef>
+              <a:buClr>
+                <a:schemeClr val="tx2">
+                  <a:lumMod val="50000"/>
+                  <a:lumOff val="50000"/>
+                </a:schemeClr>
+              </a:buClr>
+              <a:buSzPct val="75000"/>
+              <a:buFont typeface="Wingdings" panose="05000000000000000000" pitchFamily="2" charset="2"/>
+              <a:buNone/>
+              <a:defRPr sz="1600" kern="1200">
+                <a:solidFill>
+                  <a:schemeClr val="tx2"/>
+                </a:solidFill>
+                <a:latin typeface="+mn-lt"/>
+                <a:ea typeface="+mn-ea"/>
+                <a:cs typeface="+mn-cs"/>
+              </a:defRPr>
+            </a:lvl5pPr>
+            <a:lvl6pPr marL="2286000" indent="0" algn="ctr" defTabSz="914400" rtl="0" eaLnBrk="1" latinLnBrk="0" hangingPunct="1">
+              <a:lnSpc>
+                <a:spcPct val="90000"/>
+              </a:lnSpc>
+              <a:spcBef>
+                <a:spcPts val="500"/>
+              </a:spcBef>
+              <a:buFont typeface="Arial" panose="020B0604020202020204" pitchFamily="34" charset="0"/>
+              <a:buNone/>
+              <a:defRPr sz="1600" kern="1200">
+                <a:solidFill>
+                  <a:schemeClr val="tx1"/>
+                </a:solidFill>
+                <a:latin typeface="+mn-lt"/>
+                <a:ea typeface="+mn-ea"/>
+                <a:cs typeface="+mn-cs"/>
+              </a:defRPr>
+            </a:lvl6pPr>
+            <a:lvl7pPr marL="2743200" indent="0" algn="ctr" defTabSz="914400" rtl="0" eaLnBrk="1" latinLnBrk="0" hangingPunct="1">
+              <a:lnSpc>
+                <a:spcPct val="90000"/>
+              </a:lnSpc>
+              <a:spcBef>
+                <a:spcPts val="500"/>
+              </a:spcBef>
+              <a:buFont typeface="Arial" panose="020B0604020202020204" pitchFamily="34" charset="0"/>
+              <a:buNone/>
+              <a:defRPr sz="1600" kern="1200">
+                <a:solidFill>
+                  <a:schemeClr val="tx1"/>
+                </a:solidFill>
+                <a:latin typeface="+mn-lt"/>
+                <a:ea typeface="+mn-ea"/>
+                <a:cs typeface="+mn-cs"/>
+              </a:defRPr>
+            </a:lvl7pPr>
+            <a:lvl8pPr marL="3200400" indent="0" algn="ctr" defTabSz="914400" rtl="0" eaLnBrk="1" latinLnBrk="0" hangingPunct="1">
+              <a:lnSpc>
+                <a:spcPct val="90000"/>
+              </a:lnSpc>
+              <a:spcBef>
+                <a:spcPts val="500"/>
+              </a:spcBef>
+              <a:buFont typeface="Arial" panose="020B0604020202020204" pitchFamily="34" charset="0"/>
+              <a:buNone/>
+              <a:defRPr sz="1600" kern="1200">
+                <a:solidFill>
+                  <a:schemeClr val="tx1"/>
+                </a:solidFill>
+                <a:latin typeface="+mn-lt"/>
+                <a:ea typeface="+mn-ea"/>
+                <a:cs typeface="+mn-cs"/>
+              </a:defRPr>
+            </a:lvl8pPr>
+            <a:lvl9pPr marL="3657600" indent="0" algn="ctr" defTabSz="914400" rtl="0" eaLnBrk="1" latinLnBrk="0" hangingPunct="1">
+              <a:lnSpc>
+                <a:spcPct val="90000"/>
+              </a:lnSpc>
+              <a:spcBef>
+                <a:spcPts val="500"/>
+              </a:spcBef>
+              <a:buFont typeface="Arial" panose="020B0604020202020204" pitchFamily="34" charset="0"/>
+              <a:buNone/>
+              <a:defRPr sz="1600" kern="1200">
+                <a:solidFill>
+                  <a:schemeClr val="tx1"/>
+                </a:solidFill>
+                <a:latin typeface="+mn-lt"/>
+                <a:ea typeface="+mn-ea"/>
+                <a:cs typeface="+mn-cs"/>
+              </a:defRPr>
+            </a:lvl9pPr>
+          </a:lstStyle>
+          <a:p>
+            <a:r>
+              <a:rPr lang="es-AR" dirty="0"/>
+              <a:t>Machine </a:t>
+            </a:r>
+            <a:r>
+              <a:rPr lang="es-AR" dirty="0" err="1"/>
+              <a:t>Learning</a:t>
+            </a:r>
+            <a:r>
+              <a:rPr lang="es-AR" dirty="0"/>
+              <a:t> &amp; Quantum Deep </a:t>
+            </a:r>
+            <a:r>
+              <a:rPr lang="es-AR" dirty="0" err="1"/>
+              <a:t>Learning</a:t>
+            </a:r>
+            <a:endParaRPr lang="en-US" dirty="0"/>
+          </a:p>
+        </p:txBody>
+      </p:sp>
+      <p:sp>
+        <p:nvSpPr>
+          <p:cNvPr id="8" name="TextBox 7">
+            <a:extLst>
+              <a:ext uri="{FF2B5EF4-FFF2-40B4-BE49-F238E27FC236}">
+                <a16:creationId xmlns:a16="http://schemas.microsoft.com/office/drawing/2014/main" id="{05446328-DA1A-2DF1-789C-4977EDF36AD5}"/>
+              </a:ext>
+            </a:extLst>
+          </p:cNvPr>
+          <p:cNvSpPr txBox="1"/>
+          <p:nvPr/>
+        </p:nvSpPr>
+        <p:spPr>
+          <a:xfrm>
+            <a:off x="4916456" y="672458"/>
+            <a:ext cx="7252697" cy="5355312"/>
+          </a:xfrm>
+          <a:prstGeom prst="rect">
+            <a:avLst/>
+          </a:prstGeom>
+          <a:noFill/>
+        </p:spPr>
+        <p:txBody>
+          <a:bodyPr wrap="square" rtlCol="0">
+            <a:spAutoFit/>
+          </a:bodyPr>
+          <a:lstStyle/>
+          <a:p>
+            <a:r>
+              <a:rPr lang="en-US" b="0" i="0" dirty="0">
+                <a:effectLst/>
+                <a:latin typeface="Consolas" panose="020B0609020204030204" pitchFamily="49" charset="0"/>
+              </a:rPr>
+              <a:t>Net( </a:t>
+            </a:r>
+          </a:p>
+          <a:p>
+            <a:r>
+              <a:rPr lang="en-US" b="0" i="0" dirty="0">
+                <a:effectLst/>
+                <a:latin typeface="Consolas" panose="020B0609020204030204" pitchFamily="49" charset="0"/>
+              </a:rPr>
+              <a:t>(conv1): Conv2d(3, 24, </a:t>
+            </a:r>
+            <a:r>
+              <a:rPr lang="en-US" b="0" i="0" dirty="0" err="1">
+                <a:effectLst/>
+                <a:latin typeface="Consolas" panose="020B0609020204030204" pitchFamily="49" charset="0"/>
+              </a:rPr>
+              <a:t>kernel_size</a:t>
+            </a:r>
+            <a:r>
+              <a:rPr lang="en-US" b="0" i="0" dirty="0">
+                <a:effectLst/>
+                <a:latin typeface="Consolas" panose="020B0609020204030204" pitchFamily="49" charset="0"/>
+              </a:rPr>
+              <a:t>=(5, 5), stride=(1, 1))</a:t>
+            </a:r>
+          </a:p>
+          <a:p>
+            <a:endParaRPr lang="en-US" b="0" i="0" dirty="0">
+              <a:effectLst/>
+              <a:latin typeface="Consolas" panose="020B0609020204030204" pitchFamily="49" charset="0"/>
+            </a:endParaRPr>
+          </a:p>
+          <a:p>
+            <a:r>
+              <a:rPr lang="en-US" b="0" i="0" dirty="0">
+                <a:effectLst/>
+                <a:latin typeface="Consolas" panose="020B0609020204030204" pitchFamily="49" charset="0"/>
+              </a:rPr>
+              <a:t>(conv2): Conv2d(24, 48, </a:t>
+            </a:r>
+            <a:r>
+              <a:rPr lang="en-US" b="0" i="0" dirty="0" err="1">
+                <a:effectLst/>
+                <a:latin typeface="Consolas" panose="020B0609020204030204" pitchFamily="49" charset="0"/>
+              </a:rPr>
+              <a:t>kernel_size</a:t>
+            </a:r>
+            <a:r>
+              <a:rPr lang="en-US" b="0" i="0" dirty="0">
+                <a:effectLst/>
+                <a:latin typeface="Consolas" panose="020B0609020204030204" pitchFamily="49" charset="0"/>
+              </a:rPr>
+              <a:t>=(5, 5), stride=(1, 1))</a:t>
+            </a:r>
+          </a:p>
+          <a:p>
+            <a:endParaRPr lang="en-US" b="0" i="0" dirty="0">
+              <a:effectLst/>
+              <a:latin typeface="Consolas" panose="020B0609020204030204" pitchFamily="49" charset="0"/>
+            </a:endParaRPr>
+          </a:p>
+          <a:p>
+            <a:r>
+              <a:rPr lang="en-US" b="0" i="0" dirty="0">
+                <a:effectLst/>
+                <a:latin typeface="Consolas" panose="020B0609020204030204" pitchFamily="49" charset="0"/>
+              </a:rPr>
+              <a:t>(dropout): Dropout2d(p=0.5, </a:t>
+            </a:r>
+            <a:r>
+              <a:rPr lang="en-US" b="0" i="0" dirty="0" err="1">
+                <a:effectLst/>
+                <a:latin typeface="Consolas" panose="020B0609020204030204" pitchFamily="49" charset="0"/>
+              </a:rPr>
+              <a:t>inplace</a:t>
+            </a:r>
+            <a:r>
+              <a:rPr lang="en-US" b="0" i="0" dirty="0">
+                <a:effectLst/>
+                <a:latin typeface="Consolas" panose="020B0609020204030204" pitchFamily="49" charset="0"/>
+              </a:rPr>
+              <a:t>=False)</a:t>
+            </a:r>
+          </a:p>
+          <a:p>
+            <a:endParaRPr lang="en-US" b="0" i="0" dirty="0">
+              <a:effectLst/>
+              <a:latin typeface="Consolas" panose="020B0609020204030204" pitchFamily="49" charset="0"/>
+            </a:endParaRPr>
+          </a:p>
+          <a:p>
+            <a:r>
+              <a:rPr lang="en-US" b="0" i="0" dirty="0">
+                <a:effectLst/>
+                <a:latin typeface="Consolas" panose="020B0609020204030204" pitchFamily="49" charset="0"/>
+              </a:rPr>
+              <a:t>(fc1): Linear(</a:t>
+            </a:r>
+            <a:r>
+              <a:rPr lang="en-US" b="0" i="0" dirty="0" err="1">
+                <a:effectLst/>
+                <a:latin typeface="Consolas" panose="020B0609020204030204" pitchFamily="49" charset="0"/>
+              </a:rPr>
+              <a:t>in_features</a:t>
+            </a:r>
+            <a:r>
+              <a:rPr lang="en-US" b="0" i="0" dirty="0">
+                <a:effectLst/>
+                <a:latin typeface="Consolas" panose="020B0609020204030204" pitchFamily="49" charset="0"/>
+              </a:rPr>
+              <a:t>=184512, </a:t>
+            </a:r>
+            <a:r>
+              <a:rPr lang="en-US" b="0" i="0" dirty="0" err="1">
+                <a:effectLst/>
+                <a:latin typeface="Consolas" panose="020B0609020204030204" pitchFamily="49" charset="0"/>
+              </a:rPr>
+              <a:t>out_features</a:t>
+            </a:r>
+            <a:r>
+              <a:rPr lang="en-US" b="0" i="0" dirty="0">
+                <a:effectLst/>
+                <a:latin typeface="Consolas" panose="020B0609020204030204" pitchFamily="49" charset="0"/>
+              </a:rPr>
+              <a:t>=512, bias=True)</a:t>
+            </a:r>
+          </a:p>
+          <a:p>
+            <a:endParaRPr lang="en-US" b="0" i="0" dirty="0">
+              <a:effectLst/>
+              <a:latin typeface="Consolas" panose="020B0609020204030204" pitchFamily="49" charset="0"/>
+            </a:endParaRPr>
+          </a:p>
+          <a:p>
+            <a:r>
+              <a:rPr lang="en-US" b="0" i="0" dirty="0">
+                <a:effectLst/>
+                <a:latin typeface="Consolas" panose="020B0609020204030204" pitchFamily="49" charset="0"/>
+              </a:rPr>
+              <a:t>(fc2): Linear(</a:t>
+            </a:r>
+            <a:r>
+              <a:rPr lang="en-US" b="0" i="0" dirty="0" err="1">
+                <a:effectLst/>
+                <a:latin typeface="Consolas" panose="020B0609020204030204" pitchFamily="49" charset="0"/>
+              </a:rPr>
+              <a:t>in_features</a:t>
+            </a:r>
+            <a:r>
+              <a:rPr lang="en-US" b="0" i="0" dirty="0">
+                <a:effectLst/>
+                <a:latin typeface="Consolas" panose="020B0609020204030204" pitchFamily="49" charset="0"/>
+              </a:rPr>
+              <a:t>=512, </a:t>
+            </a:r>
+            <a:r>
+              <a:rPr lang="en-US" b="0" i="0" dirty="0" err="1">
+                <a:effectLst/>
+                <a:latin typeface="Consolas" panose="020B0609020204030204" pitchFamily="49" charset="0"/>
+              </a:rPr>
+              <a:t>out_features</a:t>
+            </a:r>
+            <a:r>
+              <a:rPr lang="en-US" b="0" i="0" dirty="0">
+                <a:effectLst/>
+                <a:latin typeface="Consolas" panose="020B0609020204030204" pitchFamily="49" charset="0"/>
+              </a:rPr>
+              <a:t>=2, bias=True) </a:t>
+            </a:r>
+          </a:p>
+          <a:p>
+            <a:endParaRPr lang="en-US" b="0" i="0" dirty="0">
+              <a:effectLst/>
+              <a:latin typeface="Consolas" panose="020B0609020204030204" pitchFamily="49" charset="0"/>
+            </a:endParaRPr>
+          </a:p>
+          <a:p>
+            <a:r>
+              <a:rPr lang="en-US" b="0" i="0" dirty="0">
+                <a:effectLst/>
+                <a:latin typeface="Consolas" panose="020B0609020204030204" pitchFamily="49" charset="0"/>
+              </a:rPr>
+              <a:t>(</a:t>
+            </a:r>
+            <a:r>
+              <a:rPr lang="en-US" b="0" i="0" dirty="0" err="1">
+                <a:effectLst/>
+                <a:latin typeface="Consolas" panose="020B0609020204030204" pitchFamily="49" charset="0"/>
+              </a:rPr>
+              <a:t>qnn</a:t>
+            </a:r>
+            <a:r>
+              <a:rPr lang="en-US" b="0" i="0" dirty="0">
+                <a:effectLst/>
+                <a:latin typeface="Consolas" panose="020B0609020204030204" pitchFamily="49" charset="0"/>
+              </a:rPr>
+              <a:t>): </a:t>
+            </a:r>
+            <a:r>
+              <a:rPr lang="en-US" b="0" i="0" dirty="0" err="1">
+                <a:effectLst/>
+                <a:latin typeface="Consolas" panose="020B0609020204030204" pitchFamily="49" charset="0"/>
+              </a:rPr>
+              <a:t>TorchConnector</a:t>
+            </a:r>
+            <a:r>
+              <a:rPr lang="en-US" b="0" i="0" dirty="0">
+                <a:effectLst/>
+                <a:latin typeface="Consolas" panose="020B0609020204030204" pitchFamily="49" charset="0"/>
+              </a:rPr>
+              <a:t>()</a:t>
+            </a:r>
+          </a:p>
+          <a:p>
+            <a:endParaRPr lang="en-US" dirty="0">
+              <a:latin typeface="Consolas" panose="020B0609020204030204" pitchFamily="49" charset="0"/>
+            </a:endParaRPr>
+          </a:p>
+          <a:p>
+            <a:r>
+              <a:rPr lang="en-US" b="0" i="0" dirty="0">
+                <a:effectLst/>
+                <a:latin typeface="Consolas" panose="020B0609020204030204" pitchFamily="49" charset="0"/>
+              </a:rPr>
+              <a:t>(fc3): Linear(</a:t>
+            </a:r>
+            <a:r>
+              <a:rPr lang="en-US" b="0" i="0" dirty="0" err="1">
+                <a:effectLst/>
+                <a:latin typeface="Consolas" panose="020B0609020204030204" pitchFamily="49" charset="0"/>
+              </a:rPr>
+              <a:t>in_features</a:t>
+            </a:r>
+            <a:r>
+              <a:rPr lang="en-US" b="0" i="0" dirty="0">
+                <a:effectLst/>
+                <a:latin typeface="Consolas" panose="020B0609020204030204" pitchFamily="49" charset="0"/>
+              </a:rPr>
+              <a:t>=1, </a:t>
+            </a:r>
+            <a:r>
+              <a:rPr lang="en-US" b="0" i="0" dirty="0" err="1">
+                <a:effectLst/>
+                <a:latin typeface="Consolas" panose="020B0609020204030204" pitchFamily="49" charset="0"/>
+              </a:rPr>
+              <a:t>out_features</a:t>
+            </a:r>
+            <a:r>
+              <a:rPr lang="en-US" b="0" i="0" dirty="0">
+                <a:effectLst/>
+                <a:latin typeface="Consolas" panose="020B0609020204030204" pitchFamily="49" charset="0"/>
+              </a:rPr>
+              <a:t>=1, bias=True) </a:t>
+            </a:r>
+          </a:p>
+          <a:p>
+            <a:r>
+              <a:rPr lang="en-US" b="0" i="0" dirty="0">
+                <a:effectLst/>
+                <a:latin typeface="Consolas" panose="020B0609020204030204" pitchFamily="49" charset="0"/>
+              </a:rPr>
+              <a:t>)</a:t>
+            </a:r>
+          </a:p>
+        </p:txBody>
+      </p:sp>
+      <p:pic>
+        <p:nvPicPr>
+          <p:cNvPr id="5" name="Picture 4">
+            <a:extLst>
+              <a:ext uri="{FF2B5EF4-FFF2-40B4-BE49-F238E27FC236}">
+                <a16:creationId xmlns:a16="http://schemas.microsoft.com/office/drawing/2014/main" id="{E23A3DE4-BA75-7F4F-6F97-521BDDE5AA63}"/>
+              </a:ext>
+            </a:extLst>
+          </p:cNvPr>
+          <p:cNvPicPr>
+            <a:picLocks noChangeAspect="1"/>
+          </p:cNvPicPr>
+          <p:nvPr/>
+        </p:nvPicPr>
+        <p:blipFill>
+          <a:blip r:embed="rId2"/>
+          <a:stretch>
+            <a:fillRect/>
+          </a:stretch>
+        </p:blipFill>
+        <p:spPr>
+          <a:xfrm>
+            <a:off x="1066996" y="770421"/>
+            <a:ext cx="3179694" cy="5211495"/>
+          </a:xfrm>
+          <a:prstGeom prst="rect">
+            <a:avLst/>
+          </a:prstGeom>
+        </p:spPr>
+      </p:pic>
+    </p:spTree>
+    <p:extLst>
+      <p:ext uri="{BB962C8B-B14F-4D97-AF65-F5344CB8AC3E}">
+        <p14:creationId xmlns:p14="http://schemas.microsoft.com/office/powerpoint/2010/main" val="2922047321"/>
+      </p:ext>
+    </p:extLst>
+  </p:cSld>
+  <p:clrMapOvr>
+    <a:masterClrMapping/>
+  </p:clrMapOvr>
+</p:sld>
+</file>
+
+<file path=ppt/slides/slide11.xml><?xml version="1.0" encoding="utf-8"?>
+<p:sld xmlns:a="http://schemas.openxmlformats.org/drawingml/2006/main" xmlns:r="http://schemas.openxmlformats.org/officeDocument/2006/relationships" xmlns:p="http://schemas.openxmlformats.org/presentationml/2006/main">
+  <p:cSld>
+    <p:spTree>
+      <p:nvGrpSpPr>
+        <p:cNvPr id="1" name=""/>
+        <p:cNvGrpSpPr/>
+        <p:nvPr/>
+      </p:nvGrpSpPr>
+      <p:grpSpPr>
+        <a:xfrm>
+          <a:off x="0" y="0"/>
+          <a:ext cx="0" cy="0"/>
+          <a:chOff x="0" y="0"/>
+          <a:chExt cx="0" cy="0"/>
+        </a:xfrm>
+      </p:grpSpPr>
+      <p:pic>
+        <p:nvPicPr>
+          <p:cNvPr id="4" name="Picture 3" descr="Chart, scatter chart&#10;&#10;Description automatically generated">
+            <a:extLst>
+              <a:ext uri="{FF2B5EF4-FFF2-40B4-BE49-F238E27FC236}">
+                <a16:creationId xmlns:a16="http://schemas.microsoft.com/office/drawing/2014/main" id="{228AFBCD-4B87-EA18-7D28-8B102269C8C6}"/>
+              </a:ext>
+            </a:extLst>
+          </p:cNvPr>
+          <p:cNvPicPr>
+            <a:picLocks noChangeAspect="1"/>
+          </p:cNvPicPr>
+          <p:nvPr/>
+        </p:nvPicPr>
+        <p:blipFill rotWithShape="1">
+          <a:blip r:embed="rId2"/>
+          <a:srcRect t="5973" b="19027"/>
+          <a:stretch/>
+        </p:blipFill>
+        <p:spPr>
+          <a:xfrm>
+            <a:off x="-22827" y="3413"/>
+            <a:ext cx="12191980" cy="6857989"/>
+          </a:xfrm>
+          <a:prstGeom prst="rect">
+            <a:avLst/>
+          </a:prstGeom>
+        </p:spPr>
+      </p:pic>
+      <p:sp>
+        <p:nvSpPr>
+          <p:cNvPr id="2" name="Title 1">
+            <a:extLst>
+              <a:ext uri="{FF2B5EF4-FFF2-40B4-BE49-F238E27FC236}">
+                <a16:creationId xmlns:a16="http://schemas.microsoft.com/office/drawing/2014/main" id="{EB6A064A-D868-272C-A067-DD7A50F22CEB}"/>
+              </a:ext>
+            </a:extLst>
+          </p:cNvPr>
+          <p:cNvSpPr>
+            <a:spLocks noGrp="1"/>
+          </p:cNvSpPr>
+          <p:nvPr>
+            <p:ph type="ctrTitle"/>
+          </p:nvPr>
+        </p:nvSpPr>
+        <p:spPr>
+          <a:xfrm>
+            <a:off x="199916" y="258953"/>
+            <a:ext cx="6643087" cy="676505"/>
+          </a:xfrm>
+        </p:spPr>
+        <p:txBody>
+          <a:bodyPr vert="horz" lIns="91440" tIns="45720" rIns="91440" bIns="45720" rtlCol="0" anchor="b">
+            <a:normAutofit/>
+          </a:bodyPr>
+          <a:lstStyle/>
+          <a:p>
+            <a:pPr>
+              <a:lnSpc>
+                <a:spcPct val="90000"/>
+              </a:lnSpc>
+            </a:pPr>
+            <a:r>
+              <a:rPr lang="es-AR" sz="4200" dirty="0"/>
+              <a:t>QCNN </a:t>
+            </a:r>
+            <a:r>
+              <a:rPr lang="es-AR" sz="4200" dirty="0" err="1"/>
+              <a:t>Results</a:t>
+            </a:r>
+            <a:endParaRPr lang="en-US" sz="4200" dirty="0"/>
+          </a:p>
+        </p:txBody>
+      </p:sp>
+      <p:sp>
+        <p:nvSpPr>
+          <p:cNvPr id="8" name="TextBox 7">
+            <a:extLst>
+              <a:ext uri="{FF2B5EF4-FFF2-40B4-BE49-F238E27FC236}">
+                <a16:creationId xmlns:a16="http://schemas.microsoft.com/office/drawing/2014/main" id="{559363E2-45A2-F53A-3515-66D6F8AC1017}"/>
+              </a:ext>
+            </a:extLst>
+          </p:cNvPr>
+          <p:cNvSpPr txBox="1"/>
+          <p:nvPr/>
+        </p:nvSpPr>
+        <p:spPr>
+          <a:xfrm>
+            <a:off x="199916" y="1088637"/>
+            <a:ext cx="6197600" cy="1200329"/>
+          </a:xfrm>
+          <a:prstGeom prst="rect">
+            <a:avLst/>
+          </a:prstGeom>
+          <a:noFill/>
+        </p:spPr>
+        <p:txBody>
+          <a:bodyPr wrap="square">
+            <a:spAutoFit/>
+          </a:bodyPr>
+          <a:lstStyle/>
+          <a:p>
+            <a:r>
+              <a:rPr lang="en-US" b="0" i="0" dirty="0">
+                <a:effectLst/>
+                <a:latin typeface="Consolas" panose="020B0609020204030204" pitchFamily="49" charset="0"/>
+              </a:rPr>
+              <a:t>Training set:</a:t>
+            </a:r>
+          </a:p>
+          <a:p>
+            <a:r>
+              <a:rPr lang="en-US" dirty="0">
+                <a:latin typeface="Consolas" panose="020B0609020204030204" pitchFamily="49" charset="0"/>
+              </a:rPr>
+              <a:t>3291 images. Input Tensor[3, 260, 260]</a:t>
+            </a:r>
+            <a:r>
+              <a:rPr lang="en-US" b="0" i="0" dirty="0">
+                <a:effectLst/>
+                <a:latin typeface="Consolas" panose="020B0609020204030204" pitchFamily="49" charset="0"/>
+              </a:rPr>
+              <a:t> </a:t>
+            </a:r>
+          </a:p>
+          <a:p>
+            <a:r>
+              <a:rPr lang="en-US" b="0" i="0" dirty="0">
+                <a:effectLst/>
+                <a:latin typeface="Consolas" panose="020B0609020204030204" pitchFamily="49" charset="0"/>
+              </a:rPr>
+              <a:t>Test set: </a:t>
+            </a:r>
+          </a:p>
+          <a:p>
+            <a:r>
+              <a:rPr lang="en-US" dirty="0">
+                <a:latin typeface="Consolas" panose="020B0609020204030204" pitchFamily="49" charset="0"/>
+              </a:rPr>
+              <a:t>1772 images. Input Tensor[3, 260, 260]</a:t>
+            </a:r>
+            <a:endParaRPr lang="en-US" dirty="0"/>
+          </a:p>
+        </p:txBody>
+      </p:sp>
+      <p:sp>
+        <p:nvSpPr>
+          <p:cNvPr id="10" name="TextBox 9">
+            <a:extLst>
+              <a:ext uri="{FF2B5EF4-FFF2-40B4-BE49-F238E27FC236}">
+                <a16:creationId xmlns:a16="http://schemas.microsoft.com/office/drawing/2014/main" id="{4B055D39-1EC5-B688-0285-8870F6F340AD}"/>
+              </a:ext>
+            </a:extLst>
+          </p:cNvPr>
+          <p:cNvSpPr txBox="1"/>
+          <p:nvPr/>
+        </p:nvSpPr>
+        <p:spPr>
+          <a:xfrm>
+            <a:off x="282110" y="4298451"/>
+            <a:ext cx="3857029" cy="646331"/>
+          </a:xfrm>
+          <a:prstGeom prst="rect">
+            <a:avLst/>
+          </a:prstGeom>
+          <a:noFill/>
+        </p:spPr>
+        <p:txBody>
+          <a:bodyPr wrap="square">
+            <a:spAutoFit/>
+          </a:bodyPr>
+          <a:lstStyle/>
+          <a:p>
+            <a:r>
+              <a:rPr lang="es-ES" b="0" i="0" dirty="0">
+                <a:effectLst/>
+                <a:latin typeface="Consolas" panose="020B0609020204030204" pitchFamily="49" charset="0"/>
+              </a:rPr>
+              <a:t>Training Set </a:t>
+            </a:r>
+            <a:r>
+              <a:rPr lang="es-ES" b="0" i="0" dirty="0" err="1">
+                <a:effectLst/>
+                <a:latin typeface="Consolas" panose="020B0609020204030204" pitchFamily="49" charset="0"/>
+              </a:rPr>
+              <a:t>Accuracy</a:t>
+            </a:r>
+            <a:r>
+              <a:rPr lang="es-ES" b="0" i="0" dirty="0">
+                <a:effectLst/>
+                <a:latin typeface="Consolas" panose="020B0609020204030204" pitchFamily="49" charset="0"/>
+              </a:rPr>
+              <a:t>: 99.82% </a:t>
+            </a:r>
+          </a:p>
+          <a:p>
+            <a:r>
+              <a:rPr lang="es-ES" b="0" i="0" dirty="0">
+                <a:effectLst/>
+                <a:latin typeface="Consolas" panose="020B0609020204030204" pitchFamily="49" charset="0"/>
+              </a:rPr>
+              <a:t>Test Set </a:t>
+            </a:r>
+            <a:r>
+              <a:rPr lang="es-ES" b="0" i="0" dirty="0" err="1">
+                <a:effectLst/>
+                <a:latin typeface="Consolas" panose="020B0609020204030204" pitchFamily="49" charset="0"/>
+              </a:rPr>
+              <a:t>Accuracy</a:t>
+            </a:r>
+            <a:r>
+              <a:rPr lang="es-ES" b="0" i="0" dirty="0">
+                <a:effectLst/>
+                <a:latin typeface="Consolas" panose="020B0609020204030204" pitchFamily="49" charset="0"/>
+              </a:rPr>
+              <a:t>: 98.8%</a:t>
+            </a:r>
+            <a:endParaRPr lang="en-US" dirty="0"/>
+          </a:p>
+        </p:txBody>
+      </p:sp>
+      <p:sp>
+        <p:nvSpPr>
+          <p:cNvPr id="3" name="Subtitle 2">
+            <a:extLst>
+              <a:ext uri="{FF2B5EF4-FFF2-40B4-BE49-F238E27FC236}">
+                <a16:creationId xmlns:a16="http://schemas.microsoft.com/office/drawing/2014/main" id="{3C8A4DBB-6EAD-3D67-4D30-E9E85D184E0F}"/>
+              </a:ext>
+            </a:extLst>
+          </p:cNvPr>
+          <p:cNvSpPr txBox="1">
+            <a:spLocks/>
+          </p:cNvSpPr>
+          <p:nvPr/>
+        </p:nvSpPr>
+        <p:spPr>
+          <a:xfrm>
+            <a:off x="199916" y="6391414"/>
+            <a:ext cx="5633922" cy="658680"/>
+          </a:xfrm>
+          <a:prstGeom prst="rect">
+            <a:avLst/>
+          </a:prstGeom>
+        </p:spPr>
+        <p:txBody>
+          <a:bodyPr vert="horz" lIns="91440" tIns="45720" rIns="91440" bIns="45720" rtlCol="0">
+            <a:normAutofit fontScale="85000" lnSpcReduction="10000"/>
+          </a:bodyPr>
+          <a:lstStyle>
+            <a:lvl1pPr marL="0" indent="0" algn="l" defTabSz="914400" rtl="0" eaLnBrk="1" latinLnBrk="0" hangingPunct="1">
+              <a:lnSpc>
+                <a:spcPct val="110000"/>
+              </a:lnSpc>
+              <a:spcBef>
+                <a:spcPts val="1000"/>
+              </a:spcBef>
+              <a:buClr>
+                <a:schemeClr val="tx2">
+                  <a:lumMod val="50000"/>
+                  <a:lumOff val="50000"/>
+                </a:schemeClr>
+              </a:buClr>
+              <a:buSzPct val="75000"/>
+              <a:buFont typeface="Wingdings" panose="05000000000000000000" pitchFamily="2" charset="2"/>
+              <a:buNone/>
+              <a:defRPr sz="2400" kern="1200">
+                <a:solidFill>
+                  <a:schemeClr val="tx2"/>
+                </a:solidFill>
+                <a:latin typeface="+mn-lt"/>
+                <a:ea typeface="+mn-ea"/>
+                <a:cs typeface="+mn-cs"/>
+              </a:defRPr>
+            </a:lvl1pPr>
+            <a:lvl2pPr marL="457200" indent="0" algn="ctr" defTabSz="914400" rtl="0" eaLnBrk="1" latinLnBrk="0" hangingPunct="1">
+              <a:lnSpc>
+                <a:spcPct val="110000"/>
+              </a:lnSpc>
+              <a:spcBef>
+                <a:spcPts val="500"/>
+              </a:spcBef>
+              <a:buClr>
+                <a:schemeClr val="tx2">
+                  <a:lumMod val="50000"/>
+                  <a:lumOff val="50000"/>
+                </a:schemeClr>
+              </a:buClr>
+              <a:buSzPct val="75000"/>
+              <a:buFont typeface="Wingdings" panose="05000000000000000000" pitchFamily="2" charset="2"/>
+              <a:buNone/>
+              <a:defRPr sz="2000" kern="1200">
+                <a:solidFill>
+                  <a:schemeClr val="tx2"/>
+                </a:solidFill>
+                <a:latin typeface="+mn-lt"/>
+                <a:ea typeface="+mn-ea"/>
+                <a:cs typeface="+mn-cs"/>
+              </a:defRPr>
+            </a:lvl2pPr>
+            <a:lvl3pPr marL="914400" indent="0" algn="ctr" defTabSz="914400" rtl="0" eaLnBrk="1" latinLnBrk="0" hangingPunct="1">
+              <a:lnSpc>
+                <a:spcPct val="110000"/>
+              </a:lnSpc>
+              <a:spcBef>
+                <a:spcPts val="500"/>
+              </a:spcBef>
+              <a:buClr>
+                <a:schemeClr val="tx2">
+                  <a:lumMod val="50000"/>
+                  <a:lumOff val="50000"/>
+                </a:schemeClr>
+              </a:buClr>
+              <a:buSzPct val="75000"/>
+              <a:buFont typeface="Wingdings" panose="05000000000000000000" pitchFamily="2" charset="2"/>
+              <a:buNone/>
+              <a:defRPr sz="1800" kern="1200">
+                <a:solidFill>
+                  <a:schemeClr val="tx2"/>
+                </a:solidFill>
+                <a:latin typeface="+mn-lt"/>
+                <a:ea typeface="+mn-ea"/>
+                <a:cs typeface="+mn-cs"/>
+              </a:defRPr>
+            </a:lvl3pPr>
+            <a:lvl4pPr marL="1371600" indent="0" algn="ctr" defTabSz="914400" rtl="0" eaLnBrk="1" latinLnBrk="0" hangingPunct="1">
+              <a:lnSpc>
+                <a:spcPct val="110000"/>
+              </a:lnSpc>
+              <a:spcBef>
+                <a:spcPts val="500"/>
+              </a:spcBef>
+              <a:buClr>
+                <a:schemeClr val="tx2">
+                  <a:lumMod val="50000"/>
+                  <a:lumOff val="50000"/>
+                </a:schemeClr>
+              </a:buClr>
+              <a:buSzPct val="75000"/>
+              <a:buFont typeface="Wingdings" panose="05000000000000000000" pitchFamily="2" charset="2"/>
+              <a:buNone/>
+              <a:defRPr sz="1600" kern="1200">
+                <a:solidFill>
+                  <a:schemeClr val="tx2"/>
+                </a:solidFill>
+                <a:latin typeface="+mn-lt"/>
+                <a:ea typeface="+mn-ea"/>
+                <a:cs typeface="+mn-cs"/>
+              </a:defRPr>
+            </a:lvl4pPr>
+            <a:lvl5pPr marL="1828800" indent="0" algn="ctr" defTabSz="914400" rtl="0" eaLnBrk="1" latinLnBrk="0" hangingPunct="1">
+              <a:lnSpc>
+                <a:spcPct val="110000"/>
+              </a:lnSpc>
+              <a:spcBef>
+                <a:spcPts val="500"/>
+              </a:spcBef>
+              <a:buClr>
+                <a:schemeClr val="tx2">
+                  <a:lumMod val="50000"/>
+                  <a:lumOff val="50000"/>
+                </a:schemeClr>
+              </a:buClr>
+              <a:buSzPct val="75000"/>
+              <a:buFont typeface="Wingdings" panose="05000000000000000000" pitchFamily="2" charset="2"/>
+              <a:buNone/>
+              <a:defRPr sz="1600" kern="1200">
+                <a:solidFill>
+                  <a:schemeClr val="tx2"/>
+                </a:solidFill>
+                <a:latin typeface="+mn-lt"/>
+                <a:ea typeface="+mn-ea"/>
+                <a:cs typeface="+mn-cs"/>
+              </a:defRPr>
+            </a:lvl5pPr>
+            <a:lvl6pPr marL="2286000" indent="0" algn="ctr" defTabSz="914400" rtl="0" eaLnBrk="1" latinLnBrk="0" hangingPunct="1">
+              <a:lnSpc>
+                <a:spcPct val="90000"/>
+              </a:lnSpc>
+              <a:spcBef>
+                <a:spcPts val="500"/>
+              </a:spcBef>
+              <a:buFont typeface="Arial" panose="020B0604020202020204" pitchFamily="34" charset="0"/>
+              <a:buNone/>
+              <a:defRPr sz="1600" kern="1200">
+                <a:solidFill>
+                  <a:schemeClr val="tx1"/>
+                </a:solidFill>
+                <a:latin typeface="+mn-lt"/>
+                <a:ea typeface="+mn-ea"/>
+                <a:cs typeface="+mn-cs"/>
+              </a:defRPr>
+            </a:lvl6pPr>
+            <a:lvl7pPr marL="2743200" indent="0" algn="ctr" defTabSz="914400" rtl="0" eaLnBrk="1" latinLnBrk="0" hangingPunct="1">
+              <a:lnSpc>
+                <a:spcPct val="90000"/>
+              </a:lnSpc>
+              <a:spcBef>
+                <a:spcPts val="500"/>
+              </a:spcBef>
+              <a:buFont typeface="Arial" panose="020B0604020202020204" pitchFamily="34" charset="0"/>
+              <a:buNone/>
+              <a:defRPr sz="1600" kern="1200">
+                <a:solidFill>
+                  <a:schemeClr val="tx1"/>
+                </a:solidFill>
+                <a:latin typeface="+mn-lt"/>
+                <a:ea typeface="+mn-ea"/>
+                <a:cs typeface="+mn-cs"/>
+              </a:defRPr>
+            </a:lvl7pPr>
+            <a:lvl8pPr marL="3200400" indent="0" algn="ctr" defTabSz="914400" rtl="0" eaLnBrk="1" latinLnBrk="0" hangingPunct="1">
+              <a:lnSpc>
+                <a:spcPct val="90000"/>
+              </a:lnSpc>
+              <a:spcBef>
+                <a:spcPts val="500"/>
+              </a:spcBef>
+              <a:buFont typeface="Arial" panose="020B0604020202020204" pitchFamily="34" charset="0"/>
+              <a:buNone/>
+              <a:defRPr sz="1600" kern="1200">
+                <a:solidFill>
+                  <a:schemeClr val="tx1"/>
+                </a:solidFill>
+                <a:latin typeface="+mn-lt"/>
+                <a:ea typeface="+mn-ea"/>
+                <a:cs typeface="+mn-cs"/>
+              </a:defRPr>
+            </a:lvl8pPr>
+            <a:lvl9pPr marL="3657600" indent="0" algn="ctr" defTabSz="914400" rtl="0" eaLnBrk="1" latinLnBrk="0" hangingPunct="1">
+              <a:lnSpc>
+                <a:spcPct val="90000"/>
+              </a:lnSpc>
+              <a:spcBef>
+                <a:spcPts val="500"/>
+              </a:spcBef>
+              <a:buFont typeface="Arial" panose="020B0604020202020204" pitchFamily="34" charset="0"/>
+              <a:buNone/>
+              <a:defRPr sz="1600" kern="1200">
+                <a:solidFill>
+                  <a:schemeClr val="tx1"/>
+                </a:solidFill>
+                <a:latin typeface="+mn-lt"/>
+                <a:ea typeface="+mn-ea"/>
+                <a:cs typeface="+mn-cs"/>
+              </a:defRPr>
+            </a:lvl9pPr>
+          </a:lstStyle>
+          <a:p>
+            <a:r>
+              <a:rPr lang="es-AR" dirty="0"/>
+              <a:t>Machine </a:t>
+            </a:r>
+            <a:r>
+              <a:rPr lang="es-AR" dirty="0" err="1"/>
+              <a:t>Learning</a:t>
+            </a:r>
+            <a:r>
+              <a:rPr lang="es-AR" dirty="0"/>
+              <a:t> &amp; Quantum Deep </a:t>
+            </a:r>
+            <a:r>
+              <a:rPr lang="es-AR" dirty="0" err="1"/>
+              <a:t>Learning</a:t>
+            </a:r>
+            <a:endParaRPr lang="en-US" dirty="0"/>
+          </a:p>
+        </p:txBody>
+      </p:sp>
+      <p:sp>
+        <p:nvSpPr>
+          <p:cNvPr id="11" name="TextBox 10">
+            <a:extLst>
+              <a:ext uri="{FF2B5EF4-FFF2-40B4-BE49-F238E27FC236}">
+                <a16:creationId xmlns:a16="http://schemas.microsoft.com/office/drawing/2014/main" id="{A416CEAD-C2E2-52C3-D9F4-C09965B66571}"/>
+              </a:ext>
+            </a:extLst>
+          </p:cNvPr>
+          <p:cNvSpPr txBox="1"/>
+          <p:nvPr/>
+        </p:nvSpPr>
+        <p:spPr>
+          <a:xfrm>
+            <a:off x="199916" y="2452978"/>
+            <a:ext cx="6197600" cy="369332"/>
+          </a:xfrm>
+          <a:prstGeom prst="rect">
+            <a:avLst/>
+          </a:prstGeom>
+          <a:noFill/>
+        </p:spPr>
+        <p:txBody>
+          <a:bodyPr wrap="square">
+            <a:spAutoFit/>
+          </a:bodyPr>
+          <a:lstStyle/>
+          <a:p>
+            <a:r>
+              <a:rPr lang="en-US" b="0" i="0" dirty="0">
+                <a:effectLst/>
+                <a:latin typeface="Consolas" panose="020B0609020204030204" pitchFamily="49" charset="0"/>
+              </a:rPr>
+              <a:t>Predicted</a:t>
+            </a:r>
+            <a:r>
+              <a:rPr lang="es-ES" b="0" i="0" dirty="0">
+                <a:effectLst/>
+                <a:latin typeface="Consolas" panose="020B0609020204030204" pitchFamily="49" charset="0"/>
+              </a:rPr>
+              <a:t> Output</a:t>
+            </a:r>
+            <a:r>
+              <a:rPr lang="en-US" b="0" i="0" dirty="0">
+                <a:effectLst/>
+                <a:latin typeface="Consolas" panose="020B0609020204030204" pitchFamily="49" charset="0"/>
+              </a:rPr>
+              <a:t>:</a:t>
+            </a:r>
+            <a:endParaRPr lang="en-US" dirty="0"/>
+          </a:p>
+        </p:txBody>
+      </p:sp>
+      <p:pic>
+        <p:nvPicPr>
+          <p:cNvPr id="6" name="Picture 5">
+            <a:extLst>
+              <a:ext uri="{FF2B5EF4-FFF2-40B4-BE49-F238E27FC236}">
+                <a16:creationId xmlns:a16="http://schemas.microsoft.com/office/drawing/2014/main" id="{68165B29-A07C-B7C8-5F79-FD4155048AD9}"/>
+              </a:ext>
+            </a:extLst>
+          </p:cNvPr>
+          <p:cNvPicPr>
+            <a:picLocks noChangeAspect="1"/>
+          </p:cNvPicPr>
+          <p:nvPr/>
+        </p:nvPicPr>
+        <p:blipFill>
+          <a:blip r:embed="rId3"/>
+          <a:stretch>
+            <a:fillRect/>
+          </a:stretch>
+        </p:blipFill>
+        <p:spPr>
+          <a:xfrm>
+            <a:off x="199916" y="2890837"/>
+            <a:ext cx="5476875" cy="1076325"/>
+          </a:xfrm>
+          <a:prstGeom prst="rect">
+            <a:avLst/>
+          </a:prstGeom>
+        </p:spPr>
+      </p:pic>
+    </p:spTree>
+    <p:extLst>
+      <p:ext uri="{BB962C8B-B14F-4D97-AF65-F5344CB8AC3E}">
+        <p14:creationId xmlns:p14="http://schemas.microsoft.com/office/powerpoint/2010/main" val="582208953"/>
+      </p:ext>
+    </p:extLst>
+  </p:cSld>
+  <p:clrMapOvr>
+    <a:masterClrMapping/>
+  </p:clrMapOvr>
+</p:sld>
+</file>
+
+<file path=ppt/slides/slide12.xml><?xml version="1.0" encoding="utf-8"?>
+<p:sld xmlns:a="http://schemas.openxmlformats.org/drawingml/2006/main" xmlns:r="http://schemas.openxmlformats.org/officeDocument/2006/relationships" xmlns:p="http://schemas.openxmlformats.org/presentationml/2006/main">
+  <p:cSld>
+    <p:spTree>
+      <p:nvGrpSpPr>
+        <p:cNvPr id="1" name=""/>
+        <p:cNvGrpSpPr/>
+        <p:nvPr/>
+      </p:nvGrpSpPr>
+      <p:grpSpPr>
+        <a:xfrm>
+          <a:off x="0" y="0"/>
+          <a:ext cx="0" cy="0"/>
+          <a:chOff x="0" y="0"/>
+          <a:chExt cx="0" cy="0"/>
+        </a:xfrm>
+      </p:grpSpPr>
       <p:pic>
         <p:nvPicPr>
           <p:cNvPr id="4" name="Picture 3" descr="Chart, scatter chart&#10;&#10;Description automatically generated">
@@ -16667,10 +17901,10 @@
       </p:sp>
       <p:pic>
         <p:nvPicPr>
-          <p:cNvPr id="12" name="Picture 11">
+          <p:cNvPr id="6" name="Picture 5">
             <a:extLst>
               <a:ext uri="{FF2B5EF4-FFF2-40B4-BE49-F238E27FC236}">
-                <a16:creationId xmlns:a16="http://schemas.microsoft.com/office/drawing/2014/main" id="{E3DBC794-0BBA-CFFC-7F20-477B10E709C5}"/>
+                <a16:creationId xmlns:a16="http://schemas.microsoft.com/office/drawing/2014/main" id="{50DBF8CA-74B1-C073-ED1A-D268B10DC032}"/>
               </a:ext>
             </a:extLst>
           </p:cNvPr>
@@ -16687,8 +17921,8 @@
         </p:blipFill>
         <p:spPr>
           <a:xfrm>
-            <a:off x="22847" y="702259"/>
-            <a:ext cx="4365862" cy="2855787"/>
+            <a:off x="741141" y="737281"/>
+            <a:ext cx="4048125" cy="2647950"/>
           </a:xfrm>
           <a:prstGeom prst="rect">
             <a:avLst/>
@@ -16697,10 +17931,10 @@
       </p:pic>
       <p:pic>
         <p:nvPicPr>
-          <p:cNvPr id="7" name="Picture 6">
+          <p:cNvPr id="9" name="Picture 8">
             <a:extLst>
               <a:ext uri="{FF2B5EF4-FFF2-40B4-BE49-F238E27FC236}">
-                <a16:creationId xmlns:a16="http://schemas.microsoft.com/office/drawing/2014/main" id="{E339B1F5-2C3F-8E03-1E8F-EF6091359270}"/>
+                <a16:creationId xmlns:a16="http://schemas.microsoft.com/office/drawing/2014/main" id="{6DC90236-558A-4E90-A174-0C71F0CD32F5}"/>
               </a:ext>
             </a:extLst>
           </p:cNvPr>
@@ -16717,8 +17951,8 @@
         </p:blipFill>
         <p:spPr>
           <a:xfrm>
-            <a:off x="392717" y="3667248"/>
-            <a:ext cx="3722830" cy="2614964"/>
+            <a:off x="880309" y="3554772"/>
+            <a:ext cx="3769791" cy="2647950"/>
           </a:xfrm>
           <a:prstGeom prst="rect">
             <a:avLst/>
@@ -16738,7 +17972,7 @@
 </p:sld>
 </file>
 
-<file path=ppt/slides/slide11.xml><?xml version="1.0" encoding="utf-8"?>
+<file path=ppt/slides/slide13.xml><?xml version="1.0" encoding="utf-8"?>
 <p:sld xmlns:a="http://schemas.openxmlformats.org/drawingml/2006/main" xmlns:r="http://schemas.openxmlformats.org/officeDocument/2006/relationships" xmlns:p="http://schemas.openxmlformats.org/presentationml/2006/main">
   <p:cSld>
     <p:spTree>
@@ -16839,8 +18073,8 @@
         </p:nvSpPr>
         <p:spPr>
           <a:xfrm>
-            <a:off x="113447" y="629551"/>
-            <a:ext cx="7283945" cy="5355312"/>
+            <a:off x="113447" y="789034"/>
+            <a:ext cx="7283945" cy="4801314"/>
           </a:xfrm>
           <a:prstGeom prst="rect">
             <a:avLst/>
@@ -16885,7 +18119,7 @@
                 <a:effectLst/>
                 <a:latin typeface="Consolas" panose="020B0609020204030204" pitchFamily="49" charset="0"/>
               </a:rPr>
-              <a:t>-By vectorizing the image, the Perceptron loses information about the image, although it can be reconstructed. The neural network works with the complete information of the image.</a:t>
+              <a:t>-By vectorizing the image, the Perceptron losses information about the image, although it can be reconstructed. The neural network works with the complete information of the image.</a:t>
             </a:r>
           </a:p>
           <a:p>
@@ -16901,21 +18135,6 @@
                 <a:latin typeface="Consolas" panose="020B0609020204030204" pitchFamily="49" charset="0"/>
               </a:rPr>
               <a:t>-Could be possible to optimize hyperparameters and architecture of the quantum convolutional neural network.</a:t>
-            </a:r>
-          </a:p>
-          <a:p>
-            <a:endParaRPr lang="en-US" b="0" dirty="0">
-              <a:effectLst/>
-              <a:latin typeface="Consolas" panose="020B0609020204030204" pitchFamily="49" charset="0"/>
-            </a:endParaRPr>
-          </a:p>
-          <a:p>
-            <a:r>
-              <a:rPr lang="en-US" b="0" dirty="0">
-                <a:effectLst/>
-                <a:latin typeface="Consolas" panose="020B0609020204030204" pitchFamily="49" charset="0"/>
-              </a:rPr>
-              <a:t>-There is no quantum entanglement in the circuit. </a:t>
             </a:r>
           </a:p>
           <a:p>
@@ -17212,7 +18431,7 @@
 </p:sld>
 </file>
 
-<file path=ppt/slides/slide12.xml><?xml version="1.0" encoding="utf-8"?>
+<file path=ppt/slides/slide14.xml><?xml version="1.0" encoding="utf-8"?>
 <p:sld xmlns:a="http://schemas.openxmlformats.org/drawingml/2006/main" xmlns:r="http://schemas.openxmlformats.org/officeDocument/2006/relationships" xmlns:p="http://schemas.openxmlformats.org/presentationml/2006/main">
   <p:cSld>
     <p:spTree>
@@ -17311,10 +18530,9 @@
               </a:lnSpc>
             </a:pPr>
             <a:r>
-              <a:rPr lang="es-AR" sz="4200" dirty="0" err="1"/>
+              <a:rPr lang="en-US" sz="4200" dirty="0"/>
               <a:t>References</a:t>
             </a:r>
-            <a:endParaRPr lang="en-US" sz="4200" dirty="0"/>
           </a:p>
         </p:txBody>
       </p:sp>
@@ -17333,7 +18551,7 @@
         <p:spPr>
           <a:xfrm>
             <a:off x="199915" y="982323"/>
-            <a:ext cx="8635859" cy="3662541"/>
+            <a:ext cx="8635859" cy="5509200"/>
           </a:xfrm>
           <a:prstGeom prst="rect">
             <a:avLst/>
@@ -17436,6 +18654,88 @@
               <a:buFontTx/>
               <a:buAutoNum type="arabicPeriod"/>
             </a:pPr>
+            <a:endParaRPr lang="en-US" sz="1600" dirty="0">
+              <a:latin typeface="Consolas" panose="020B0609020204030204" pitchFamily="49" charset="0"/>
+            </a:endParaRPr>
+          </a:p>
+          <a:p>
+            <a:pPr marL="228600" indent="-228600">
+              <a:buFontTx/>
+              <a:buAutoNum type="arabicPeriod"/>
+            </a:pPr>
+            <a:r>
+              <a:rPr lang="en-US" sz="1600" b="0" dirty="0">
+                <a:solidFill>
+                  <a:schemeClr val="tx1">
+                    <a:lumMod val="95000"/>
+                    <a:lumOff val="5000"/>
+                  </a:schemeClr>
+                </a:solidFill>
+                <a:effectLst/>
+                <a:latin typeface="Consolas" panose="020B0609020204030204" pitchFamily="49" charset="0"/>
+              </a:rPr>
+              <a:t>The Quantum Convolution Neural Network: </a:t>
+            </a:r>
+            <a:r>
+              <a:rPr lang="en-US" sz="1600" b="0" dirty="0">
+                <a:solidFill>
+                  <a:schemeClr val="tx1">
+                    <a:lumMod val="95000"/>
+                    <a:lumOff val="5000"/>
+                  </a:schemeClr>
+                </a:solidFill>
+                <a:effectLst/>
+                <a:latin typeface="Consolas" panose="020B0609020204030204" pitchFamily="49" charset="0"/>
+                <a:hlinkClick r:id="rId5"/>
+              </a:rPr>
+              <a:t>https://qiskit.org/documentation/machine-learning/tutorials/11_quantum_convolutional_neural_networks.html</a:t>
+            </a:r>
+            <a:endParaRPr lang="en-US" sz="1600" b="0" dirty="0">
+              <a:solidFill>
+                <a:schemeClr val="tx1">
+                  <a:lumMod val="95000"/>
+                  <a:lumOff val="5000"/>
+                </a:schemeClr>
+              </a:solidFill>
+              <a:effectLst/>
+              <a:latin typeface="Consolas" panose="020B0609020204030204" pitchFamily="49" charset="0"/>
+            </a:endParaRPr>
+          </a:p>
+          <a:p>
+            <a:pPr marL="228600" indent="-228600">
+              <a:buFontTx/>
+              <a:buAutoNum type="arabicPeriod"/>
+            </a:pPr>
+            <a:endParaRPr lang="en-US" sz="1600" dirty="0">
+              <a:solidFill>
+                <a:schemeClr val="tx1">
+                  <a:lumMod val="95000"/>
+                  <a:lumOff val="5000"/>
+                </a:schemeClr>
+              </a:solidFill>
+              <a:latin typeface="Consolas" panose="020B0609020204030204" pitchFamily="49" charset="0"/>
+            </a:endParaRPr>
+          </a:p>
+          <a:p>
+            <a:pPr marL="228600" indent="-228600">
+              <a:buFontTx/>
+              <a:buAutoNum type="arabicPeriod"/>
+            </a:pPr>
+            <a:r>
+              <a:rPr lang="en-US" sz="1600" b="0" dirty="0">
+                <a:effectLst/>
+                <a:latin typeface="Consolas" panose="020B0609020204030204" pitchFamily="49" charset="0"/>
+              </a:rPr>
+              <a:t>Esophagus Cancer Classifier : </a:t>
+            </a:r>
+            <a:r>
+              <a:rPr lang="en-US" sz="1600" b="0" dirty="0">
+                <a:effectLst/>
+                <a:latin typeface="Consolas" panose="020B0609020204030204" pitchFamily="49" charset="0"/>
+                <a:hlinkClick r:id="rId6"/>
+              </a:rPr>
+              <a:t>https://github.com/AnIsAsPe/ClassificadorCancerEsofago</a:t>
+            </a:r>
             <a:endParaRPr lang="en-US" sz="1600" b="0" dirty="0">
               <a:effectLst/>
               <a:latin typeface="Consolas" panose="020B0609020204030204" pitchFamily="49" charset="0"/>
@@ -17446,108 +18746,277 @@
               <a:buFontTx/>
               <a:buAutoNum type="arabicPeriod"/>
             </a:pPr>
+            <a:endParaRPr lang="en-US" sz="1600" dirty="0">
+              <a:solidFill>
+                <a:schemeClr val="tx1">
+                  <a:lumMod val="95000"/>
+                  <a:lumOff val="5000"/>
+                </a:schemeClr>
+              </a:solidFill>
+              <a:latin typeface="Consolas" panose="020B0609020204030204" pitchFamily="49" charset="0"/>
+            </a:endParaRPr>
+          </a:p>
+          <a:p>
+            <a:r>
+              <a:rPr lang="en-US" sz="1600" dirty="0">
+                <a:solidFill>
+                  <a:schemeClr val="tx1">
+                    <a:lumMod val="95000"/>
+                    <a:lumOff val="5000"/>
+                  </a:schemeClr>
+                </a:solidFill>
+                <a:latin typeface="Consolas" panose="020B0609020204030204" pitchFamily="49" charset="0"/>
+              </a:rPr>
+              <a:t>5</a:t>
+            </a:r>
+            <a:r>
+              <a:rPr lang="en-US" sz="1600" dirty="0">
+                <a:solidFill>
+                  <a:srgbClr val="4B69C6"/>
+                </a:solidFill>
+                <a:latin typeface="Consolas" panose="020B0609020204030204" pitchFamily="49" charset="0"/>
+              </a:rPr>
+              <a:t>.</a:t>
+            </a:r>
             <a:r>
               <a:rPr lang="en-US" sz="1600" b="0" dirty="0">
+                <a:solidFill>
+                  <a:schemeClr val="tx1">
+                    <a:lumMod val="95000"/>
+                    <a:lumOff val="5000"/>
+                  </a:schemeClr>
+                </a:solidFill>
                 <a:effectLst/>
                 <a:latin typeface="Consolas" panose="020B0609020204030204" pitchFamily="49" charset="0"/>
               </a:rPr>
-              <a:t>Esophagus Cancer Classifier : </a:t>
-            </a:r>
-            <a:r>
-              <a:rPr lang="en-US" sz="1600" b="0" dirty="0">
+              <a:t>Machine Learning &amp; IA for the Working Analyst - Colegio de </a:t>
+            </a:r>
+            <a:r>
+              <a:rPr lang="en-US" sz="1600" b="0" dirty="0" err="1">
+                <a:solidFill>
+                  <a:schemeClr val="tx1">
+                    <a:lumMod val="95000"/>
+                    <a:lumOff val="5000"/>
+                  </a:schemeClr>
+                </a:solidFill>
                 <a:effectLst/>
                 <a:latin typeface="Consolas" panose="020B0609020204030204" pitchFamily="49" charset="0"/>
-                <a:hlinkClick r:id="rId5"/>
               </a:rPr>
-              <a:t>https://github.com/AnIsAsPe/ClassificadorCancerEsofago</a:t>
+              <a:t>Matem</a:t>
+            </a:r>
+            <a:r>
+              <a:rPr lang="es-AR" sz="1600" b="0" dirty="0">
+                <a:solidFill>
+                  <a:schemeClr val="tx1">
+                    <a:lumMod val="95000"/>
+                    <a:lumOff val="5000"/>
+                  </a:schemeClr>
+                </a:solidFill>
+                <a:effectLst/>
+                <a:latin typeface="Consolas" panose="020B0609020204030204" pitchFamily="49" charset="0"/>
+              </a:rPr>
+              <a:t>á</a:t>
+            </a:r>
+            <a:r>
+              <a:rPr lang="en-US" sz="1600" b="0" dirty="0" err="1">
+                <a:solidFill>
+                  <a:schemeClr val="tx1">
+                    <a:lumMod val="95000"/>
+                    <a:lumOff val="5000"/>
+                  </a:schemeClr>
+                </a:solidFill>
+                <a:effectLst/>
+                <a:latin typeface="Consolas" panose="020B0609020204030204" pitchFamily="49" charset="0"/>
+              </a:rPr>
+              <a:t>ticas</a:t>
+            </a:r>
+            <a:r>
+              <a:rPr lang="en-US" sz="1600" b="0" dirty="0">
+                <a:solidFill>
+                  <a:schemeClr val="tx1">
+                    <a:lumMod val="95000"/>
+                    <a:lumOff val="5000"/>
+                  </a:schemeClr>
+                </a:solidFill>
+                <a:effectLst/>
+                <a:latin typeface="Consolas" panose="020B0609020204030204" pitchFamily="49" charset="0"/>
+              </a:rPr>
+              <a:t> </a:t>
+            </a:r>
+            <a:r>
+              <a:rPr lang="en-US" sz="1600" b="0" dirty="0" err="1">
+                <a:solidFill>
+                  <a:schemeClr val="tx1">
+                    <a:lumMod val="95000"/>
+                    <a:lumOff val="5000"/>
+                  </a:schemeClr>
+                </a:solidFill>
+                <a:effectLst/>
+                <a:latin typeface="Consolas" panose="020B0609020204030204" pitchFamily="49" charset="0"/>
+              </a:rPr>
+              <a:t>Bourbaki</a:t>
+            </a:r>
+            <a:r>
+              <a:rPr lang="en-US" sz="1600" b="0" dirty="0">
+                <a:solidFill>
+                  <a:schemeClr val="tx1">
+                    <a:lumMod val="95000"/>
+                    <a:lumOff val="5000"/>
+                  </a:schemeClr>
+                </a:solidFill>
+                <a:effectLst/>
+                <a:latin typeface="Consolas" panose="020B0609020204030204" pitchFamily="49" charset="0"/>
+              </a:rPr>
+              <a:t> - Mexico</a:t>
+            </a:r>
+          </a:p>
+          <a:p>
+            <a:r>
+              <a:rPr lang="en-US" sz="1600" b="0" dirty="0">
+                <a:solidFill>
+                  <a:schemeClr val="tx1">
+                    <a:lumMod val="95000"/>
+                    <a:lumOff val="5000"/>
+                  </a:schemeClr>
+                </a:solidFill>
+                <a:effectLst/>
+                <a:latin typeface="Consolas" panose="020B0609020204030204" pitchFamily="49" charset="0"/>
+              </a:rPr>
+              <a:t>- https://www.colegio-bourbaki.com/</a:t>
+            </a:r>
+          </a:p>
+          <a:p>
+            <a:pPr marL="285750" indent="-285750">
+              <a:buFontTx/>
+              <a:buChar char="-"/>
+            </a:pPr>
+            <a:r>
+              <a:rPr lang="en-US" sz="1600" b="0" dirty="0">
+                <a:solidFill>
+                  <a:schemeClr val="tx1">
+                    <a:lumMod val="95000"/>
+                    <a:lumOff val="5000"/>
+                  </a:schemeClr>
+                </a:solidFill>
+                <a:effectLst/>
+                <a:latin typeface="Consolas" panose="020B0609020204030204" pitchFamily="49" charset="0"/>
+              </a:rPr>
+              <a:t>LinkedIn: Colegio </a:t>
+            </a:r>
+            <a:r>
+              <a:rPr lang="en-US" sz="1600" b="0" dirty="0" err="1">
+                <a:solidFill>
+                  <a:schemeClr val="tx1">
+                    <a:lumMod val="95000"/>
+                    <a:lumOff val="5000"/>
+                  </a:schemeClr>
+                </a:solidFill>
+                <a:effectLst/>
+                <a:latin typeface="Consolas" panose="020B0609020204030204" pitchFamily="49" charset="0"/>
+              </a:rPr>
+              <a:t>Bourbaki</a:t>
             </a:r>
             <a:endParaRPr lang="en-US" sz="1600" b="0" dirty="0">
+              <a:solidFill>
+                <a:schemeClr val="tx1">
+                  <a:lumMod val="95000"/>
+                  <a:lumOff val="5000"/>
+                </a:schemeClr>
+              </a:solidFill>
+              <a:effectLst/>
+              <a:latin typeface="Consolas" panose="020B0609020204030204" pitchFamily="49" charset="0"/>
+            </a:endParaRPr>
+          </a:p>
+          <a:p>
+            <a:endParaRPr lang="en-US" sz="1600" b="0" dirty="0">
+              <a:solidFill>
+                <a:schemeClr val="tx1">
+                  <a:lumMod val="95000"/>
+                  <a:lumOff val="5000"/>
+                </a:schemeClr>
+              </a:solidFill>
+              <a:effectLst/>
+              <a:latin typeface="Consolas" panose="020B0609020204030204" pitchFamily="49" charset="0"/>
+            </a:endParaRPr>
+          </a:p>
+          <a:p>
+            <a:r>
+              <a:rPr lang="en-US" sz="1600" dirty="0">
+                <a:solidFill>
+                  <a:schemeClr val="tx1">
+                    <a:lumMod val="95000"/>
+                    <a:lumOff val="5000"/>
+                  </a:schemeClr>
+                </a:solidFill>
+                <a:latin typeface="Consolas" panose="020B0609020204030204" pitchFamily="49" charset="0"/>
+              </a:rPr>
+              <a:t>6</a:t>
+            </a:r>
+            <a:r>
+              <a:rPr lang="en-US" sz="1600" b="0" dirty="0">
+                <a:solidFill>
+                  <a:schemeClr val="tx1">
+                    <a:lumMod val="95000"/>
+                    <a:lumOff val="5000"/>
+                  </a:schemeClr>
+                </a:solidFill>
+                <a:effectLst/>
+                <a:latin typeface="Consolas" panose="020B0609020204030204" pitchFamily="49" charset="0"/>
+              </a:rPr>
+              <a:t>. </a:t>
+            </a:r>
+            <a:r>
+              <a:rPr lang="en-US" sz="1600" b="0" dirty="0" err="1">
+                <a:solidFill>
+                  <a:schemeClr val="tx1">
+                    <a:lumMod val="95000"/>
+                    <a:lumOff val="5000"/>
+                  </a:schemeClr>
+                </a:solidFill>
+                <a:effectLst/>
+                <a:latin typeface="Consolas" panose="020B0609020204030204" pitchFamily="49" charset="0"/>
+              </a:rPr>
+              <a:t>Qiskit</a:t>
+            </a:r>
+            <a:r>
+              <a:rPr lang="en-US" sz="1600" b="0" dirty="0">
+                <a:solidFill>
+                  <a:schemeClr val="tx1">
+                    <a:lumMod val="95000"/>
+                    <a:lumOff val="5000"/>
+                  </a:schemeClr>
+                </a:solidFill>
+                <a:effectLst/>
+                <a:latin typeface="Consolas" panose="020B0609020204030204" pitchFamily="49" charset="0"/>
+              </a:rPr>
+              <a:t> Slack Channel (qiskit.slack.com) - Special Thanks to Owen Lockwood &amp; Anton </a:t>
+            </a:r>
+            <a:r>
+              <a:rPr lang="en-US" sz="1600" b="0" dirty="0" err="1">
+                <a:solidFill>
+                  <a:schemeClr val="tx1">
+                    <a:lumMod val="95000"/>
+                    <a:lumOff val="5000"/>
+                  </a:schemeClr>
+                </a:solidFill>
+                <a:effectLst/>
+                <a:latin typeface="Consolas" panose="020B0609020204030204" pitchFamily="49" charset="0"/>
+              </a:rPr>
+              <a:t>Dekusar</a:t>
+            </a:r>
+            <a:endParaRPr lang="en-US" sz="1600" b="0" dirty="0">
+              <a:solidFill>
+                <a:schemeClr val="tx1">
+                  <a:lumMod val="95000"/>
+                  <a:lumOff val="5000"/>
+                </a:schemeClr>
+              </a:solidFill>
               <a:effectLst/>
               <a:latin typeface="Consolas" panose="020B0609020204030204" pitchFamily="49" charset="0"/>
             </a:endParaRPr>
           </a:p>
           <a:p>
             <a:endParaRPr lang="en-US" sz="1600" dirty="0">
-              <a:latin typeface="Consolas" panose="020B0609020204030204" pitchFamily="49" charset="0"/>
-            </a:endParaRPr>
-          </a:p>
-          <a:p>
-            <a:r>
-              <a:rPr lang="en-US" sz="1600" b="0" dirty="0">
-                <a:effectLst/>
-                <a:latin typeface="Consolas" panose="020B0609020204030204" pitchFamily="49" charset="0"/>
-              </a:rPr>
-              <a:t>4. Machine Learning for the Working Analyst - Colegio </a:t>
-            </a:r>
-            <a:r>
-              <a:rPr lang="en-US" sz="1600" b="0" dirty="0" err="1">
-                <a:effectLst/>
-                <a:latin typeface="Consolas" panose="020B0609020204030204" pitchFamily="49" charset="0"/>
-              </a:rPr>
-              <a:t>Bourbaki</a:t>
-            </a:r>
-            <a:r>
-              <a:rPr lang="en-US" sz="1600" b="0" dirty="0">
-                <a:effectLst/>
-                <a:latin typeface="Consolas" panose="020B0609020204030204" pitchFamily="49" charset="0"/>
-              </a:rPr>
-              <a:t>, Mexico</a:t>
-            </a:r>
-          </a:p>
-          <a:p>
-            <a:pPr marL="285750" indent="-285750">
-              <a:buFontTx/>
-              <a:buChar char="-"/>
-            </a:pPr>
-            <a:r>
-              <a:rPr lang="en-US" sz="1600" b="0" dirty="0">
-                <a:effectLst/>
-                <a:latin typeface="Consolas" panose="020B0609020204030204" pitchFamily="49" charset="0"/>
-                <a:hlinkClick r:id="rId6"/>
-              </a:rPr>
-              <a:t>https://www.colegio-bourbaki.com</a:t>
-            </a:r>
-            <a:endParaRPr lang="en-US" sz="1600" b="0" dirty="0">
-              <a:effectLst/>
-              <a:latin typeface="Consolas" panose="020B0609020204030204" pitchFamily="49" charset="0"/>
-            </a:endParaRPr>
-          </a:p>
-          <a:p>
-            <a:r>
-              <a:rPr lang="en-US" sz="1600" b="0" dirty="0">
-                <a:effectLst/>
-                <a:latin typeface="Consolas" panose="020B0609020204030204" pitchFamily="49" charset="0"/>
-              </a:rPr>
-              <a:t>- LinkedIn: Colegio </a:t>
-            </a:r>
-            <a:r>
-              <a:rPr lang="en-US" sz="1600" b="0" dirty="0" err="1">
-                <a:effectLst/>
-                <a:latin typeface="Consolas" panose="020B0609020204030204" pitchFamily="49" charset="0"/>
-              </a:rPr>
-              <a:t>Bourbaki</a:t>
-            </a:r>
-            <a:endParaRPr lang="en-US" sz="1600" b="0" dirty="0">
-              <a:effectLst/>
-              <a:latin typeface="Consolas" panose="020B0609020204030204" pitchFamily="49" charset="0"/>
-            </a:endParaRPr>
-          </a:p>
-          <a:p>
-            <a:pPr marL="228600" indent="-228600">
-              <a:buFontTx/>
-              <a:buAutoNum type="arabicPeriod"/>
-            </a:pPr>
-            <a:endParaRPr lang="en-US" sz="1200" b="0" dirty="0">
-              <a:effectLst/>
-              <a:latin typeface="Consolas" panose="020B0609020204030204" pitchFamily="49" charset="0"/>
-            </a:endParaRPr>
-          </a:p>
-          <a:p>
-            <a:pPr marL="228600" indent="-228600">
-              <a:buAutoNum type="arabicPeriod"/>
-            </a:pPr>
-            <a:endParaRPr lang="en-US" sz="1200" b="0" dirty="0">
-              <a:effectLst/>
               <a:latin typeface="Consolas" panose="020B0609020204030204" pitchFamily="49" charset="0"/>
             </a:endParaRPr>
           </a:p>
@@ -21440,12 +22909,12 @@
               </a:lnSpc>
             </a:pPr>
             <a:r>
-              <a:rPr lang="es-AR" sz="1500" dirty="0"/>
-              <a:t>Matrix </a:t>
-            </a:r>
-            <a:r>
               <a:rPr lang="es-AR" sz="1500" dirty="0" err="1"/>
               <a:t>Confusion</a:t>
+            </a:r>
+            <a:r>
+              <a:rPr lang="es-AR" sz="1500" dirty="0"/>
+              <a:t> Matrix</a:t>
             </a:r>
             <a:endParaRPr lang="en-US" sz="1500" dirty="0"/>
           </a:p>
@@ -22527,6 +23996,35 @@
           <a:chExt cx="0" cy="0"/>
         </a:xfrm>
       </p:grpSpPr>
+      <p:pic>
+        <p:nvPicPr>
+          <p:cNvPr id="4" name="Picture 3" descr="Chart, scatter chart&#10;&#10;Description automatically generated">
+            <a:extLst>
+              <a:ext uri="{FF2B5EF4-FFF2-40B4-BE49-F238E27FC236}">
+                <a16:creationId xmlns:a16="http://schemas.microsoft.com/office/drawing/2014/main" id="{228AFBCD-4B87-EA18-7D28-8B102269C8C6}"/>
+              </a:ext>
+            </a:extLst>
+          </p:cNvPr>
+          <p:cNvPicPr>
+            <a:picLocks noChangeAspect="1"/>
+          </p:cNvPicPr>
+          <p:nvPr/>
+        </p:nvPicPr>
+        <p:blipFill rotWithShape="1">
+          <a:blip r:embed="rId2"/>
+          <a:srcRect t="5973" b="19027"/>
+          <a:stretch/>
+        </p:blipFill>
+        <p:spPr>
+          <a:xfrm>
+            <a:off x="-22827" y="3413"/>
+            <a:ext cx="12191980" cy="6857989"/>
+          </a:xfrm>
+          <a:prstGeom prst="rect">
+            <a:avLst/>
+          </a:prstGeom>
+        </p:spPr>
+      </p:pic>
       <p:sp>
         <p:nvSpPr>
           <p:cNvPr id="2" name="Title 1">
@@ -22545,13 +24043,13 @@
         </p:nvSpPr>
         <p:spPr>
           <a:xfrm>
-            <a:off x="22847" y="48063"/>
-            <a:ext cx="6643087" cy="676505"/>
+            <a:off x="375920" y="90593"/>
+            <a:ext cx="8361680" cy="676505"/>
           </a:xfrm>
         </p:spPr>
         <p:txBody>
           <a:bodyPr vert="horz" lIns="91440" tIns="45720" rIns="91440" bIns="45720" rtlCol="0" anchor="b">
-            <a:normAutofit/>
+            <a:normAutofit fontScale="90000"/>
           </a:bodyPr>
           <a:lstStyle/>
           <a:p>
@@ -22562,11 +24060,27 @@
             </a:pPr>
             <a:r>
               <a:rPr lang="es-AR" sz="4200" dirty="0"/>
-              <a:t>Net </a:t>
+              <a:t>Quantum </a:t>
             </a:r>
             <a:r>
               <a:rPr lang="es-AR" sz="4200" dirty="0" err="1"/>
-              <a:t>Overwiew</a:t>
+              <a:t>Node</a:t>
+            </a:r>
+            <a:r>
+              <a:rPr lang="es-AR" sz="4200" dirty="0"/>
+              <a:t> &amp; </a:t>
+            </a:r>
+            <a:r>
+              <a:rPr lang="es-AR" sz="4200" dirty="0" err="1"/>
+              <a:t>Circuit</a:t>
+            </a:r>
+            <a:r>
+              <a:rPr lang="es-AR" sz="4200" dirty="0"/>
+              <a:t> </a:t>
+            </a:r>
+            <a:r>
+              <a:rPr lang="es-AR" sz="4200" dirty="0" err="1"/>
+              <a:t>Decompose</a:t>
             </a:r>
             <a:endParaRPr lang="en-US" sz="4200" dirty="0"/>
           </a:p>
@@ -22821,10 +24335,10 @@
       </p:sp>
       <p:pic>
         <p:nvPicPr>
-          <p:cNvPr id="6" name="Picture 5" descr="Diagram">
+          <p:cNvPr id="6" name="Picture 5">
             <a:extLst>
               <a:ext uri="{FF2B5EF4-FFF2-40B4-BE49-F238E27FC236}">
-                <a16:creationId xmlns:a16="http://schemas.microsoft.com/office/drawing/2014/main" id="{17B9FF79-9199-4A60-6364-74CB026E5AE9}"/>
+                <a16:creationId xmlns:a16="http://schemas.microsoft.com/office/drawing/2014/main" id="{69EAD21F-9E3F-75C7-4BBA-3C4FF0739C48}"/>
               </a:ext>
             </a:extLst>
           </p:cNvPr>
@@ -22834,21 +24348,45 @@
           <p:nvPr/>
         </p:nvPicPr>
         <p:blipFill>
-          <a:blip r:embed="rId2">
-            <a:extLst>
-              <a:ext uri="{28A0092B-C50C-407E-A947-70E740481C1C}">
-                <a14:useLocalDpi xmlns:a14="http://schemas.microsoft.com/office/drawing/2010/main" val="0"/>
-              </a:ext>
-            </a:extLst>
-          </a:blip>
+          <a:blip r:embed="rId3"/>
           <a:stretch>
             <a:fillRect/>
           </a:stretch>
         </p:blipFill>
         <p:spPr>
           <a:xfrm>
-            <a:off x="667820" y="724568"/>
-            <a:ext cx="4248636" cy="5612004"/>
+            <a:off x="375920" y="1874518"/>
+            <a:ext cx="6810375" cy="1171575"/>
+          </a:xfrm>
+          <a:prstGeom prst="rect">
+            <a:avLst/>
+          </a:prstGeom>
+        </p:spPr>
+      </p:pic>
+      <p:pic>
+        <p:nvPicPr>
+          <p:cNvPr id="10" name="Picture 9">
+            <a:extLst>
+              <a:ext uri="{FF2B5EF4-FFF2-40B4-BE49-F238E27FC236}">
+                <a16:creationId xmlns:a16="http://schemas.microsoft.com/office/drawing/2014/main" id="{D7996572-373A-6F3C-3B73-084A38974613}"/>
+              </a:ext>
+            </a:extLst>
+          </p:cNvPr>
+          <p:cNvPicPr>
+            <a:picLocks noChangeAspect="1"/>
+          </p:cNvPicPr>
+          <p:nvPr/>
+        </p:nvPicPr>
+        <p:blipFill>
+          <a:blip r:embed="rId4"/>
+          <a:stretch>
+            <a:fillRect/>
+          </a:stretch>
+        </p:blipFill>
+        <p:spPr>
+          <a:xfrm>
+            <a:off x="421673" y="4148933"/>
+            <a:ext cx="2057400" cy="1171575"/>
           </a:xfrm>
           <a:prstGeom prst="rect">
             <a:avLst/>
@@ -22857,307 +24395,518 @@
       </p:pic>
       <p:sp>
         <p:nvSpPr>
-          <p:cNvPr id="8" name="TextBox 7">
+          <p:cNvPr id="13" name="Subtitle 2">
             <a:extLst>
               <a:ext uri="{FF2B5EF4-FFF2-40B4-BE49-F238E27FC236}">
-                <a16:creationId xmlns:a16="http://schemas.microsoft.com/office/drawing/2014/main" id="{05446328-DA1A-2DF1-789C-4977EDF36AD5}"/>
+                <a16:creationId xmlns:a16="http://schemas.microsoft.com/office/drawing/2014/main" id="{775E34DD-87FF-7722-4A54-12AC24F5E17F}"/>
               </a:ext>
             </a:extLst>
           </p:cNvPr>
-          <p:cNvSpPr txBox="1"/>
+          <p:cNvSpPr txBox="1">
+            <a:spLocks/>
+          </p:cNvSpPr>
           <p:nvPr/>
         </p:nvSpPr>
         <p:spPr>
           <a:xfrm>
-            <a:off x="5191715" y="672458"/>
-            <a:ext cx="7315200" cy="5355312"/>
+            <a:off x="706153" y="1215838"/>
+            <a:ext cx="5633922" cy="658680"/>
           </a:xfrm>
           <a:prstGeom prst="rect">
             <a:avLst/>
           </a:prstGeom>
-          <a:noFill/>
         </p:spPr>
         <p:txBody>
-          <a:bodyPr wrap="square" rtlCol="0">
-            <a:spAutoFit/>
+          <a:bodyPr vert="horz" lIns="91440" tIns="45720" rIns="91440" bIns="45720" rtlCol="0">
+            <a:normAutofit/>
           </a:bodyPr>
-          <a:lstStyle/>
+          <a:lstStyle>
+            <a:lvl1pPr marL="0" indent="0" algn="l" defTabSz="914400" rtl="0" eaLnBrk="1" latinLnBrk="0" hangingPunct="1">
+              <a:lnSpc>
+                <a:spcPct val="110000"/>
+              </a:lnSpc>
+              <a:spcBef>
+                <a:spcPts val="1000"/>
+              </a:spcBef>
+              <a:buClr>
+                <a:schemeClr val="tx2">
+                  <a:lumMod val="50000"/>
+                  <a:lumOff val="50000"/>
+                </a:schemeClr>
+              </a:buClr>
+              <a:buSzPct val="75000"/>
+              <a:buFont typeface="Wingdings" panose="05000000000000000000" pitchFamily="2" charset="2"/>
+              <a:buNone/>
+              <a:defRPr sz="2400" kern="1200">
+                <a:solidFill>
+                  <a:schemeClr val="tx2"/>
+                </a:solidFill>
+                <a:latin typeface="+mn-lt"/>
+                <a:ea typeface="+mn-ea"/>
+                <a:cs typeface="+mn-cs"/>
+              </a:defRPr>
+            </a:lvl1pPr>
+            <a:lvl2pPr marL="457200" indent="0" algn="ctr" defTabSz="914400" rtl="0" eaLnBrk="1" latinLnBrk="0" hangingPunct="1">
+              <a:lnSpc>
+                <a:spcPct val="110000"/>
+              </a:lnSpc>
+              <a:spcBef>
+                <a:spcPts val="500"/>
+              </a:spcBef>
+              <a:buClr>
+                <a:schemeClr val="tx2">
+                  <a:lumMod val="50000"/>
+                  <a:lumOff val="50000"/>
+                </a:schemeClr>
+              </a:buClr>
+              <a:buSzPct val="75000"/>
+              <a:buFont typeface="Wingdings" panose="05000000000000000000" pitchFamily="2" charset="2"/>
+              <a:buNone/>
+              <a:defRPr sz="2000" kern="1200">
+                <a:solidFill>
+                  <a:schemeClr val="tx2"/>
+                </a:solidFill>
+                <a:latin typeface="+mn-lt"/>
+                <a:ea typeface="+mn-ea"/>
+                <a:cs typeface="+mn-cs"/>
+              </a:defRPr>
+            </a:lvl2pPr>
+            <a:lvl3pPr marL="914400" indent="0" algn="ctr" defTabSz="914400" rtl="0" eaLnBrk="1" latinLnBrk="0" hangingPunct="1">
+              <a:lnSpc>
+                <a:spcPct val="110000"/>
+              </a:lnSpc>
+              <a:spcBef>
+                <a:spcPts val="500"/>
+              </a:spcBef>
+              <a:buClr>
+                <a:schemeClr val="tx2">
+                  <a:lumMod val="50000"/>
+                  <a:lumOff val="50000"/>
+                </a:schemeClr>
+              </a:buClr>
+              <a:buSzPct val="75000"/>
+              <a:buFont typeface="Wingdings" panose="05000000000000000000" pitchFamily="2" charset="2"/>
+              <a:buNone/>
+              <a:defRPr sz="1800" kern="1200">
+                <a:solidFill>
+                  <a:schemeClr val="tx2"/>
+                </a:solidFill>
+                <a:latin typeface="+mn-lt"/>
+                <a:ea typeface="+mn-ea"/>
+                <a:cs typeface="+mn-cs"/>
+              </a:defRPr>
+            </a:lvl3pPr>
+            <a:lvl4pPr marL="1371600" indent="0" algn="ctr" defTabSz="914400" rtl="0" eaLnBrk="1" latinLnBrk="0" hangingPunct="1">
+              <a:lnSpc>
+                <a:spcPct val="110000"/>
+              </a:lnSpc>
+              <a:spcBef>
+                <a:spcPts val="500"/>
+              </a:spcBef>
+              <a:buClr>
+                <a:schemeClr val="tx2">
+                  <a:lumMod val="50000"/>
+                  <a:lumOff val="50000"/>
+                </a:schemeClr>
+              </a:buClr>
+              <a:buSzPct val="75000"/>
+              <a:buFont typeface="Wingdings" panose="05000000000000000000" pitchFamily="2" charset="2"/>
+              <a:buNone/>
+              <a:defRPr sz="1600" kern="1200">
+                <a:solidFill>
+                  <a:schemeClr val="tx2"/>
+                </a:solidFill>
+                <a:latin typeface="+mn-lt"/>
+                <a:ea typeface="+mn-ea"/>
+                <a:cs typeface="+mn-cs"/>
+              </a:defRPr>
+            </a:lvl4pPr>
+            <a:lvl5pPr marL="1828800" indent="0" algn="ctr" defTabSz="914400" rtl="0" eaLnBrk="1" latinLnBrk="0" hangingPunct="1">
+              <a:lnSpc>
+                <a:spcPct val="110000"/>
+              </a:lnSpc>
+              <a:spcBef>
+                <a:spcPts val="500"/>
+              </a:spcBef>
+              <a:buClr>
+                <a:schemeClr val="tx2">
+                  <a:lumMod val="50000"/>
+                  <a:lumOff val="50000"/>
+                </a:schemeClr>
+              </a:buClr>
+              <a:buSzPct val="75000"/>
+              <a:buFont typeface="Wingdings" panose="05000000000000000000" pitchFamily="2" charset="2"/>
+              <a:buNone/>
+              <a:defRPr sz="1600" kern="1200">
+                <a:solidFill>
+                  <a:schemeClr val="tx2"/>
+                </a:solidFill>
+                <a:latin typeface="+mn-lt"/>
+                <a:ea typeface="+mn-ea"/>
+                <a:cs typeface="+mn-cs"/>
+              </a:defRPr>
+            </a:lvl5pPr>
+            <a:lvl6pPr marL="2286000" indent="0" algn="ctr" defTabSz="914400" rtl="0" eaLnBrk="1" latinLnBrk="0" hangingPunct="1">
+              <a:lnSpc>
+                <a:spcPct val="90000"/>
+              </a:lnSpc>
+              <a:spcBef>
+                <a:spcPts val="500"/>
+              </a:spcBef>
+              <a:buFont typeface="Arial" panose="020B0604020202020204" pitchFamily="34" charset="0"/>
+              <a:buNone/>
+              <a:defRPr sz="1600" kern="1200">
+                <a:solidFill>
+                  <a:schemeClr val="tx1"/>
+                </a:solidFill>
+                <a:latin typeface="+mn-lt"/>
+                <a:ea typeface="+mn-ea"/>
+                <a:cs typeface="+mn-cs"/>
+              </a:defRPr>
+            </a:lvl6pPr>
+            <a:lvl7pPr marL="2743200" indent="0" algn="ctr" defTabSz="914400" rtl="0" eaLnBrk="1" latinLnBrk="0" hangingPunct="1">
+              <a:lnSpc>
+                <a:spcPct val="90000"/>
+              </a:lnSpc>
+              <a:spcBef>
+                <a:spcPts val="500"/>
+              </a:spcBef>
+              <a:buFont typeface="Arial" panose="020B0604020202020204" pitchFamily="34" charset="0"/>
+              <a:buNone/>
+              <a:defRPr sz="1600" kern="1200">
+                <a:solidFill>
+                  <a:schemeClr val="tx1"/>
+                </a:solidFill>
+                <a:latin typeface="+mn-lt"/>
+                <a:ea typeface="+mn-ea"/>
+                <a:cs typeface="+mn-cs"/>
+              </a:defRPr>
+            </a:lvl7pPr>
+            <a:lvl8pPr marL="3200400" indent="0" algn="ctr" defTabSz="914400" rtl="0" eaLnBrk="1" latinLnBrk="0" hangingPunct="1">
+              <a:lnSpc>
+                <a:spcPct val="90000"/>
+              </a:lnSpc>
+              <a:spcBef>
+                <a:spcPts val="500"/>
+              </a:spcBef>
+              <a:buFont typeface="Arial" panose="020B0604020202020204" pitchFamily="34" charset="0"/>
+              <a:buNone/>
+              <a:defRPr sz="1600" kern="1200">
+                <a:solidFill>
+                  <a:schemeClr val="tx1"/>
+                </a:solidFill>
+                <a:latin typeface="+mn-lt"/>
+                <a:ea typeface="+mn-ea"/>
+                <a:cs typeface="+mn-cs"/>
+              </a:defRPr>
+            </a:lvl8pPr>
+            <a:lvl9pPr marL="3657600" indent="0" algn="ctr" defTabSz="914400" rtl="0" eaLnBrk="1" latinLnBrk="0" hangingPunct="1">
+              <a:lnSpc>
+                <a:spcPct val="90000"/>
+              </a:lnSpc>
+              <a:spcBef>
+                <a:spcPts val="500"/>
+              </a:spcBef>
+              <a:buFont typeface="Arial" panose="020B0604020202020204" pitchFamily="34" charset="0"/>
+              <a:buNone/>
+              <a:defRPr sz="1600" kern="1200">
+                <a:solidFill>
+                  <a:schemeClr val="tx1"/>
+                </a:solidFill>
+                <a:latin typeface="+mn-lt"/>
+                <a:ea typeface="+mn-ea"/>
+                <a:cs typeface="+mn-cs"/>
+              </a:defRPr>
+            </a:lvl9pPr>
+          </a:lstStyle>
           <a:p>
             <a:r>
-              <a:rPr lang="en-US" b="0" i="0" dirty="0">
-                <a:effectLst/>
-                <a:latin typeface="Consolas" panose="020B0609020204030204" pitchFamily="49" charset="0"/>
-              </a:rPr>
-              <a:t>Net( </a:t>
-            </a:r>
+              <a:rPr lang="es-AR" dirty="0" err="1"/>
+              <a:t>ZZFeature</a:t>
+            </a:r>
+            <a:r>
+              <a:rPr lang="es-AR" dirty="0"/>
+              <a:t> </a:t>
+            </a:r>
+            <a:r>
+              <a:rPr lang="es-AR" dirty="0" err="1"/>
+              <a:t>Map</a:t>
+            </a:r>
+            <a:r>
+              <a:rPr lang="es-AR" dirty="0"/>
+              <a:t> </a:t>
+            </a:r>
+            <a:r>
+              <a:rPr lang="es-AR" dirty="0" err="1"/>
+              <a:t>Circuit</a:t>
+            </a:r>
+            <a:r>
+              <a:rPr lang="es-AR" dirty="0"/>
+              <a:t> </a:t>
+            </a:r>
+            <a:r>
+              <a:rPr lang="es-AR" dirty="0" err="1"/>
+              <a:t>Graph</a:t>
+            </a:r>
+            <a:endParaRPr lang="en-US" dirty="0"/>
           </a:p>
+        </p:txBody>
+      </p:sp>
+      <p:sp>
+        <p:nvSpPr>
+          <p:cNvPr id="14" name="Subtitle 2">
+            <a:extLst>
+              <a:ext uri="{FF2B5EF4-FFF2-40B4-BE49-F238E27FC236}">
+                <a16:creationId xmlns:a16="http://schemas.microsoft.com/office/drawing/2014/main" id="{2EC928D8-C373-DEEE-FD16-CDA1AB0E90AF}"/>
+              </a:ext>
+            </a:extLst>
+          </p:cNvPr>
+          <p:cNvSpPr txBox="1">
+            <a:spLocks/>
+          </p:cNvSpPr>
+          <p:nvPr/>
+        </p:nvSpPr>
+        <p:spPr>
+          <a:xfrm>
+            <a:off x="706153" y="3558524"/>
+            <a:ext cx="5633922" cy="658680"/>
+          </a:xfrm>
+          <a:prstGeom prst="rect">
+            <a:avLst/>
+          </a:prstGeom>
+        </p:spPr>
+        <p:txBody>
+          <a:bodyPr vert="horz" lIns="91440" tIns="45720" rIns="91440" bIns="45720" rtlCol="0">
+            <a:normAutofit/>
+          </a:bodyPr>
+          <a:lstStyle>
+            <a:lvl1pPr marL="0" indent="0" algn="l" defTabSz="914400" rtl="0" eaLnBrk="1" latinLnBrk="0" hangingPunct="1">
+              <a:lnSpc>
+                <a:spcPct val="110000"/>
+              </a:lnSpc>
+              <a:spcBef>
+                <a:spcPts val="1000"/>
+              </a:spcBef>
+              <a:buClr>
+                <a:schemeClr val="tx2">
+                  <a:lumMod val="50000"/>
+                  <a:lumOff val="50000"/>
+                </a:schemeClr>
+              </a:buClr>
+              <a:buSzPct val="75000"/>
+              <a:buFont typeface="Wingdings" panose="05000000000000000000" pitchFamily="2" charset="2"/>
+              <a:buNone/>
+              <a:defRPr sz="2400" kern="1200">
+                <a:solidFill>
+                  <a:schemeClr val="tx2"/>
+                </a:solidFill>
+                <a:latin typeface="+mn-lt"/>
+                <a:ea typeface="+mn-ea"/>
+                <a:cs typeface="+mn-cs"/>
+              </a:defRPr>
+            </a:lvl1pPr>
+            <a:lvl2pPr marL="457200" indent="0" algn="ctr" defTabSz="914400" rtl="0" eaLnBrk="1" latinLnBrk="0" hangingPunct="1">
+              <a:lnSpc>
+                <a:spcPct val="110000"/>
+              </a:lnSpc>
+              <a:spcBef>
+                <a:spcPts val="500"/>
+              </a:spcBef>
+              <a:buClr>
+                <a:schemeClr val="tx2">
+                  <a:lumMod val="50000"/>
+                  <a:lumOff val="50000"/>
+                </a:schemeClr>
+              </a:buClr>
+              <a:buSzPct val="75000"/>
+              <a:buFont typeface="Wingdings" panose="05000000000000000000" pitchFamily="2" charset="2"/>
+              <a:buNone/>
+              <a:defRPr sz="2000" kern="1200">
+                <a:solidFill>
+                  <a:schemeClr val="tx2"/>
+                </a:solidFill>
+                <a:latin typeface="+mn-lt"/>
+                <a:ea typeface="+mn-ea"/>
+                <a:cs typeface="+mn-cs"/>
+              </a:defRPr>
+            </a:lvl2pPr>
+            <a:lvl3pPr marL="914400" indent="0" algn="ctr" defTabSz="914400" rtl="0" eaLnBrk="1" latinLnBrk="0" hangingPunct="1">
+              <a:lnSpc>
+                <a:spcPct val="110000"/>
+              </a:lnSpc>
+              <a:spcBef>
+                <a:spcPts val="500"/>
+              </a:spcBef>
+              <a:buClr>
+                <a:schemeClr val="tx2">
+                  <a:lumMod val="50000"/>
+                  <a:lumOff val="50000"/>
+                </a:schemeClr>
+              </a:buClr>
+              <a:buSzPct val="75000"/>
+              <a:buFont typeface="Wingdings" panose="05000000000000000000" pitchFamily="2" charset="2"/>
+              <a:buNone/>
+              <a:defRPr sz="1800" kern="1200">
+                <a:solidFill>
+                  <a:schemeClr val="tx2"/>
+                </a:solidFill>
+                <a:latin typeface="+mn-lt"/>
+                <a:ea typeface="+mn-ea"/>
+                <a:cs typeface="+mn-cs"/>
+              </a:defRPr>
+            </a:lvl3pPr>
+            <a:lvl4pPr marL="1371600" indent="0" algn="ctr" defTabSz="914400" rtl="0" eaLnBrk="1" latinLnBrk="0" hangingPunct="1">
+              <a:lnSpc>
+                <a:spcPct val="110000"/>
+              </a:lnSpc>
+              <a:spcBef>
+                <a:spcPts val="500"/>
+              </a:spcBef>
+              <a:buClr>
+                <a:schemeClr val="tx2">
+                  <a:lumMod val="50000"/>
+                  <a:lumOff val="50000"/>
+                </a:schemeClr>
+              </a:buClr>
+              <a:buSzPct val="75000"/>
+              <a:buFont typeface="Wingdings" panose="05000000000000000000" pitchFamily="2" charset="2"/>
+              <a:buNone/>
+              <a:defRPr sz="1600" kern="1200">
+                <a:solidFill>
+                  <a:schemeClr val="tx2"/>
+                </a:solidFill>
+                <a:latin typeface="+mn-lt"/>
+                <a:ea typeface="+mn-ea"/>
+                <a:cs typeface="+mn-cs"/>
+              </a:defRPr>
+            </a:lvl4pPr>
+            <a:lvl5pPr marL="1828800" indent="0" algn="ctr" defTabSz="914400" rtl="0" eaLnBrk="1" latinLnBrk="0" hangingPunct="1">
+              <a:lnSpc>
+                <a:spcPct val="110000"/>
+              </a:lnSpc>
+              <a:spcBef>
+                <a:spcPts val="500"/>
+              </a:spcBef>
+              <a:buClr>
+                <a:schemeClr val="tx2">
+                  <a:lumMod val="50000"/>
+                  <a:lumOff val="50000"/>
+                </a:schemeClr>
+              </a:buClr>
+              <a:buSzPct val="75000"/>
+              <a:buFont typeface="Wingdings" panose="05000000000000000000" pitchFamily="2" charset="2"/>
+              <a:buNone/>
+              <a:defRPr sz="1600" kern="1200">
+                <a:solidFill>
+                  <a:schemeClr val="tx2"/>
+                </a:solidFill>
+                <a:latin typeface="+mn-lt"/>
+                <a:ea typeface="+mn-ea"/>
+                <a:cs typeface="+mn-cs"/>
+              </a:defRPr>
+            </a:lvl5pPr>
+            <a:lvl6pPr marL="2286000" indent="0" algn="ctr" defTabSz="914400" rtl="0" eaLnBrk="1" latinLnBrk="0" hangingPunct="1">
+              <a:lnSpc>
+                <a:spcPct val="90000"/>
+              </a:lnSpc>
+              <a:spcBef>
+                <a:spcPts val="500"/>
+              </a:spcBef>
+              <a:buFont typeface="Arial" panose="020B0604020202020204" pitchFamily="34" charset="0"/>
+              <a:buNone/>
+              <a:defRPr sz="1600" kern="1200">
+                <a:solidFill>
+                  <a:schemeClr val="tx1"/>
+                </a:solidFill>
+                <a:latin typeface="+mn-lt"/>
+                <a:ea typeface="+mn-ea"/>
+                <a:cs typeface="+mn-cs"/>
+              </a:defRPr>
+            </a:lvl6pPr>
+            <a:lvl7pPr marL="2743200" indent="0" algn="ctr" defTabSz="914400" rtl="0" eaLnBrk="1" latinLnBrk="0" hangingPunct="1">
+              <a:lnSpc>
+                <a:spcPct val="90000"/>
+              </a:lnSpc>
+              <a:spcBef>
+                <a:spcPts val="500"/>
+              </a:spcBef>
+              <a:buFont typeface="Arial" panose="020B0604020202020204" pitchFamily="34" charset="0"/>
+              <a:buNone/>
+              <a:defRPr sz="1600" kern="1200">
+                <a:solidFill>
+                  <a:schemeClr val="tx1"/>
+                </a:solidFill>
+                <a:latin typeface="+mn-lt"/>
+                <a:ea typeface="+mn-ea"/>
+                <a:cs typeface="+mn-cs"/>
+              </a:defRPr>
+            </a:lvl7pPr>
+            <a:lvl8pPr marL="3200400" indent="0" algn="ctr" defTabSz="914400" rtl="0" eaLnBrk="1" latinLnBrk="0" hangingPunct="1">
+              <a:lnSpc>
+                <a:spcPct val="90000"/>
+              </a:lnSpc>
+              <a:spcBef>
+                <a:spcPts val="500"/>
+              </a:spcBef>
+              <a:buFont typeface="Arial" panose="020B0604020202020204" pitchFamily="34" charset="0"/>
+              <a:buNone/>
+              <a:defRPr sz="1600" kern="1200">
+                <a:solidFill>
+                  <a:schemeClr val="tx1"/>
+                </a:solidFill>
+                <a:latin typeface="+mn-lt"/>
+                <a:ea typeface="+mn-ea"/>
+                <a:cs typeface="+mn-cs"/>
+              </a:defRPr>
+            </a:lvl8pPr>
+            <a:lvl9pPr marL="3657600" indent="0" algn="ctr" defTabSz="914400" rtl="0" eaLnBrk="1" latinLnBrk="0" hangingPunct="1">
+              <a:lnSpc>
+                <a:spcPct val="90000"/>
+              </a:lnSpc>
+              <a:spcBef>
+                <a:spcPts val="500"/>
+              </a:spcBef>
+              <a:buFont typeface="Arial" panose="020B0604020202020204" pitchFamily="34" charset="0"/>
+              <a:buNone/>
+              <a:defRPr sz="1600" kern="1200">
+                <a:solidFill>
+                  <a:schemeClr val="tx1"/>
+                </a:solidFill>
+                <a:latin typeface="+mn-lt"/>
+                <a:ea typeface="+mn-ea"/>
+                <a:cs typeface="+mn-cs"/>
+              </a:defRPr>
+            </a:lvl9pPr>
+          </a:lstStyle>
           <a:p>
             <a:r>
-              <a:rPr lang="en-US" b="0" i="0" dirty="0">
-                <a:effectLst/>
-                <a:latin typeface="Consolas" panose="020B0609020204030204" pitchFamily="49" charset="0"/>
-              </a:rPr>
-              <a:t>(conv1): Conv2d(3, 24, </a:t>
-            </a:r>
-            <a:r>
-              <a:rPr lang="en-US" b="0" i="0" dirty="0" err="1">
-                <a:effectLst/>
-                <a:latin typeface="Consolas" panose="020B0609020204030204" pitchFamily="49" charset="0"/>
-              </a:rPr>
-              <a:t>kernel_size</a:t>
-            </a:r>
-            <a:r>
-              <a:rPr lang="en-US" b="0" i="0" dirty="0">
-                <a:effectLst/>
-                <a:latin typeface="Consolas" panose="020B0609020204030204" pitchFamily="49" charset="0"/>
-              </a:rPr>
-              <a:t>=(5, 5), stride=(1, 1))</a:t>
-            </a:r>
-          </a:p>
-          <a:p>
-            <a:endParaRPr lang="en-US" b="0" i="0" dirty="0">
-              <a:effectLst/>
-              <a:latin typeface="Consolas" panose="020B0609020204030204" pitchFamily="49" charset="0"/>
-            </a:endParaRPr>
-          </a:p>
-          <a:p>
-            <a:r>
-              <a:rPr lang="en-US" b="0" i="0" dirty="0">
-                <a:effectLst/>
-                <a:latin typeface="Consolas" panose="020B0609020204030204" pitchFamily="49" charset="0"/>
-              </a:rPr>
-              <a:t>(conv2): Conv2d(24, 48, </a:t>
-            </a:r>
-            <a:r>
-              <a:rPr lang="en-US" b="0" i="0" dirty="0" err="1">
-                <a:effectLst/>
-                <a:latin typeface="Consolas" panose="020B0609020204030204" pitchFamily="49" charset="0"/>
-              </a:rPr>
-              <a:t>kernel_size</a:t>
-            </a:r>
-            <a:r>
-              <a:rPr lang="en-US" b="0" i="0" dirty="0">
-                <a:effectLst/>
-                <a:latin typeface="Consolas" panose="020B0609020204030204" pitchFamily="49" charset="0"/>
-              </a:rPr>
-              <a:t>=(5, 5), stride=(1, 1))</a:t>
-            </a:r>
-          </a:p>
-          <a:p>
-            <a:endParaRPr lang="en-US" b="0" i="0" dirty="0">
-              <a:effectLst/>
-              <a:latin typeface="Consolas" panose="020B0609020204030204" pitchFamily="49" charset="0"/>
-            </a:endParaRPr>
-          </a:p>
-          <a:p>
-            <a:r>
-              <a:rPr lang="en-US" b="0" i="0" dirty="0">
-                <a:effectLst/>
-                <a:latin typeface="Consolas" panose="020B0609020204030204" pitchFamily="49" charset="0"/>
-              </a:rPr>
-              <a:t>(dropout): Dropout2d(p=0.5, </a:t>
-            </a:r>
-            <a:r>
-              <a:rPr lang="en-US" b="0" i="0" dirty="0" err="1">
-                <a:effectLst/>
-                <a:latin typeface="Consolas" panose="020B0609020204030204" pitchFamily="49" charset="0"/>
-              </a:rPr>
-              <a:t>inplace</a:t>
-            </a:r>
-            <a:r>
-              <a:rPr lang="en-US" b="0" i="0" dirty="0">
-                <a:effectLst/>
-                <a:latin typeface="Consolas" panose="020B0609020204030204" pitchFamily="49" charset="0"/>
-              </a:rPr>
-              <a:t>=False)</a:t>
-            </a:r>
-          </a:p>
-          <a:p>
-            <a:endParaRPr lang="en-US" b="0" i="0" dirty="0">
-              <a:effectLst/>
-              <a:latin typeface="Consolas" panose="020B0609020204030204" pitchFamily="49" charset="0"/>
-            </a:endParaRPr>
-          </a:p>
-          <a:p>
-            <a:r>
-              <a:rPr lang="en-US" b="0" i="0" dirty="0">
-                <a:effectLst/>
-                <a:latin typeface="Consolas" panose="020B0609020204030204" pitchFamily="49" charset="0"/>
-              </a:rPr>
-              <a:t>(fc1): Linear(</a:t>
-            </a:r>
-            <a:r>
-              <a:rPr lang="en-US" b="0" i="0" dirty="0" err="1">
-                <a:effectLst/>
-                <a:latin typeface="Consolas" panose="020B0609020204030204" pitchFamily="49" charset="0"/>
-              </a:rPr>
-              <a:t>in_features</a:t>
-            </a:r>
-            <a:r>
-              <a:rPr lang="en-US" b="0" i="0" dirty="0">
-                <a:effectLst/>
-                <a:latin typeface="Consolas" panose="020B0609020204030204" pitchFamily="49" charset="0"/>
-              </a:rPr>
-              <a:t>=184512, </a:t>
-            </a:r>
-            <a:r>
-              <a:rPr lang="en-US" b="0" i="0" dirty="0" err="1">
-                <a:effectLst/>
-                <a:latin typeface="Consolas" panose="020B0609020204030204" pitchFamily="49" charset="0"/>
-              </a:rPr>
-              <a:t>out_features</a:t>
-            </a:r>
-            <a:r>
-              <a:rPr lang="en-US" b="0" i="0" dirty="0">
-                <a:effectLst/>
-                <a:latin typeface="Consolas" panose="020B0609020204030204" pitchFamily="49" charset="0"/>
-              </a:rPr>
-              <a:t>=512, bias=True)</a:t>
-            </a:r>
-          </a:p>
-          <a:p>
-            <a:endParaRPr lang="en-US" b="0" i="0" dirty="0">
-              <a:effectLst/>
-              <a:latin typeface="Consolas" panose="020B0609020204030204" pitchFamily="49" charset="0"/>
-            </a:endParaRPr>
-          </a:p>
-          <a:p>
-            <a:r>
-              <a:rPr lang="en-US" b="0" i="0" dirty="0">
-                <a:effectLst/>
-                <a:latin typeface="Consolas" panose="020B0609020204030204" pitchFamily="49" charset="0"/>
-              </a:rPr>
-              <a:t>(fc2): Linear(</a:t>
-            </a:r>
-            <a:r>
-              <a:rPr lang="en-US" b="0" i="0" dirty="0" err="1">
-                <a:effectLst/>
-                <a:latin typeface="Consolas" panose="020B0609020204030204" pitchFamily="49" charset="0"/>
-              </a:rPr>
-              <a:t>in_features</a:t>
-            </a:r>
-            <a:r>
-              <a:rPr lang="en-US" b="0" i="0" dirty="0">
-                <a:effectLst/>
-                <a:latin typeface="Consolas" panose="020B0609020204030204" pitchFamily="49" charset="0"/>
-              </a:rPr>
-              <a:t>=512, </a:t>
-            </a:r>
-            <a:r>
-              <a:rPr lang="en-US" b="0" i="0" dirty="0" err="1">
-                <a:effectLst/>
-                <a:latin typeface="Consolas" panose="020B0609020204030204" pitchFamily="49" charset="0"/>
-              </a:rPr>
-              <a:t>out_features</a:t>
-            </a:r>
-            <a:r>
-              <a:rPr lang="en-US" b="0" i="0" dirty="0">
-                <a:effectLst/>
-                <a:latin typeface="Consolas" panose="020B0609020204030204" pitchFamily="49" charset="0"/>
-              </a:rPr>
-              <a:t>=2, bias=True) </a:t>
-            </a:r>
-          </a:p>
-          <a:p>
-            <a:endParaRPr lang="en-US" b="0" i="0" dirty="0">
-              <a:effectLst/>
-              <a:latin typeface="Consolas" panose="020B0609020204030204" pitchFamily="49" charset="0"/>
-            </a:endParaRPr>
-          </a:p>
-          <a:p>
-            <a:r>
-              <a:rPr lang="en-US" b="0" i="0" dirty="0">
-                <a:effectLst/>
-                <a:latin typeface="Consolas" panose="020B0609020204030204" pitchFamily="49" charset="0"/>
-              </a:rPr>
-              <a:t>(</a:t>
-            </a:r>
-            <a:r>
-              <a:rPr lang="en-US" b="0" i="0" dirty="0" err="1">
-                <a:effectLst/>
-                <a:latin typeface="Consolas" panose="020B0609020204030204" pitchFamily="49" charset="0"/>
-              </a:rPr>
-              <a:t>qnn</a:t>
-            </a:r>
-            <a:r>
-              <a:rPr lang="en-US" b="0" i="0" dirty="0">
-                <a:effectLst/>
-                <a:latin typeface="Consolas" panose="020B0609020204030204" pitchFamily="49" charset="0"/>
-              </a:rPr>
-              <a:t>): </a:t>
-            </a:r>
-            <a:r>
-              <a:rPr lang="en-US" b="0" i="0" dirty="0" err="1">
-                <a:effectLst/>
-                <a:latin typeface="Consolas" panose="020B0609020204030204" pitchFamily="49" charset="0"/>
-              </a:rPr>
-              <a:t>TorchConnector</a:t>
-            </a:r>
-            <a:r>
-              <a:rPr lang="en-US" b="0" i="0" dirty="0">
-                <a:effectLst/>
-                <a:latin typeface="Consolas" panose="020B0609020204030204" pitchFamily="49" charset="0"/>
-              </a:rPr>
-              <a:t>()</a:t>
-            </a:r>
-          </a:p>
-          <a:p>
-            <a:endParaRPr lang="en-US" dirty="0">
-              <a:latin typeface="Consolas" panose="020B0609020204030204" pitchFamily="49" charset="0"/>
-            </a:endParaRPr>
-          </a:p>
-          <a:p>
-            <a:r>
-              <a:rPr lang="en-US" b="0" i="0" dirty="0">
-                <a:effectLst/>
-                <a:latin typeface="Consolas" panose="020B0609020204030204" pitchFamily="49" charset="0"/>
-              </a:rPr>
-              <a:t>(fc3): Linear(</a:t>
-            </a:r>
-            <a:r>
-              <a:rPr lang="en-US" b="0" i="0" dirty="0" err="1">
-                <a:effectLst/>
-                <a:latin typeface="Consolas" panose="020B0609020204030204" pitchFamily="49" charset="0"/>
-              </a:rPr>
-              <a:t>in_features</a:t>
-            </a:r>
-            <a:r>
-              <a:rPr lang="en-US" b="0" i="0" dirty="0">
-                <a:effectLst/>
-                <a:latin typeface="Consolas" panose="020B0609020204030204" pitchFamily="49" charset="0"/>
-              </a:rPr>
-              <a:t>=1, </a:t>
-            </a:r>
-            <a:r>
-              <a:rPr lang="en-US" b="0" i="0" dirty="0" err="1">
-                <a:effectLst/>
-                <a:latin typeface="Consolas" panose="020B0609020204030204" pitchFamily="49" charset="0"/>
-              </a:rPr>
-              <a:t>out_features</a:t>
-            </a:r>
-            <a:r>
-              <a:rPr lang="en-US" b="0" i="0" dirty="0">
-                <a:effectLst/>
-                <a:latin typeface="Consolas" panose="020B0609020204030204" pitchFamily="49" charset="0"/>
-              </a:rPr>
-              <a:t>=1, bias=True) </a:t>
-            </a:r>
-          </a:p>
-          <a:p>
-            <a:r>
-              <a:rPr lang="en-US" b="0" i="0" dirty="0">
-                <a:effectLst/>
-                <a:latin typeface="Consolas" panose="020B0609020204030204" pitchFamily="49" charset="0"/>
-              </a:rPr>
-              <a:t>)</a:t>
-            </a:r>
+              <a:rPr lang="es-AR" dirty="0" err="1"/>
+              <a:t>RealAmplitudes</a:t>
+            </a:r>
+            <a:r>
+              <a:rPr lang="es-AR" dirty="0"/>
+              <a:t> </a:t>
+            </a:r>
+            <a:r>
+              <a:rPr lang="es-AR" dirty="0" err="1"/>
+              <a:t>Circuit</a:t>
+            </a:r>
+            <a:r>
+              <a:rPr lang="es-AR" dirty="0"/>
+              <a:t> </a:t>
+            </a:r>
+            <a:r>
+              <a:rPr lang="es-AR" dirty="0" err="1"/>
+              <a:t>Graph</a:t>
+            </a:r>
+            <a:endParaRPr lang="en-US" dirty="0"/>
           </a:p>
         </p:txBody>
       </p:sp>
     </p:spTree>
     <p:extLst>
       <p:ext uri="{BB962C8B-B14F-4D97-AF65-F5344CB8AC3E}">
-        <p14:creationId xmlns:p14="http://schemas.microsoft.com/office/powerpoint/2010/main" val="2922047321"/>
+        <p14:creationId xmlns:p14="http://schemas.microsoft.com/office/powerpoint/2010/main" val="1834565688"/>
       </p:ext>
     </p:extLst>
   </p:cSld>
@@ -23231,8 +24980,8 @@
         </p:nvSpPr>
         <p:spPr>
           <a:xfrm>
-            <a:off x="199916" y="258953"/>
-            <a:ext cx="6643087" cy="676505"/>
+            <a:off x="375920" y="90593"/>
+            <a:ext cx="8361680" cy="676505"/>
           </a:xfrm>
         </p:spPr>
         <p:txBody>
@@ -23248,160 +24997,21 @@
             </a:pPr>
             <a:r>
               <a:rPr lang="es-AR" sz="4200" dirty="0"/>
-              <a:t>QCNN </a:t>
+              <a:t>Quantum </a:t>
             </a:r>
             <a:r>
               <a:rPr lang="es-AR" sz="4200" dirty="0" err="1"/>
-              <a:t>Results</a:t>
+              <a:t>Entanglement</a:t>
+            </a:r>
+            <a:r>
+              <a:rPr lang="es-AR" sz="4200" dirty="0"/>
+              <a:t> </a:t>
+            </a:r>
+            <a:r>
+              <a:rPr lang="es-AR" sz="4200" dirty="0" err="1"/>
+              <a:t>Check</a:t>
             </a:r>
             <a:endParaRPr lang="en-US" sz="4200" dirty="0"/>
-          </a:p>
-        </p:txBody>
-      </p:sp>
-      <p:sp>
-        <p:nvSpPr>
-          <p:cNvPr id="8" name="TextBox 7">
-            <a:extLst>
-              <a:ext uri="{FF2B5EF4-FFF2-40B4-BE49-F238E27FC236}">
-                <a16:creationId xmlns:a16="http://schemas.microsoft.com/office/drawing/2014/main" id="{559363E2-45A2-F53A-3515-66D6F8AC1017}"/>
-              </a:ext>
-            </a:extLst>
-          </p:cNvPr>
-          <p:cNvSpPr txBox="1"/>
-          <p:nvPr/>
-        </p:nvSpPr>
-        <p:spPr>
-          <a:xfrm>
-            <a:off x="199916" y="1088637"/>
-            <a:ext cx="6197600" cy="1200329"/>
-          </a:xfrm>
-          <a:prstGeom prst="rect">
-            <a:avLst/>
-          </a:prstGeom>
-          <a:noFill/>
-        </p:spPr>
-        <p:txBody>
-          <a:bodyPr wrap="square">
-            <a:spAutoFit/>
-          </a:bodyPr>
-          <a:lstStyle/>
-          <a:p>
-            <a:r>
-              <a:rPr lang="en-US" b="0" i="0" dirty="0">
-                <a:effectLst/>
-                <a:latin typeface="Consolas" panose="020B0609020204030204" pitchFamily="49" charset="0"/>
-              </a:rPr>
-              <a:t>Training set:</a:t>
-            </a:r>
-          </a:p>
-          <a:p>
-            <a:r>
-              <a:rPr lang="en-US" dirty="0">
-                <a:latin typeface="Consolas" panose="020B0609020204030204" pitchFamily="49" charset="0"/>
-              </a:rPr>
-              <a:t>3291 images. Input Tensor[3, 260, 260]</a:t>
-            </a:r>
-            <a:r>
-              <a:rPr lang="en-US" b="0" i="0" dirty="0">
-                <a:effectLst/>
-                <a:latin typeface="Consolas" panose="020B0609020204030204" pitchFamily="49" charset="0"/>
-              </a:rPr>
-              <a:t> </a:t>
-            </a:r>
-          </a:p>
-          <a:p>
-            <a:r>
-              <a:rPr lang="en-US" b="0" i="0" dirty="0">
-                <a:effectLst/>
-                <a:latin typeface="Consolas" panose="020B0609020204030204" pitchFamily="49" charset="0"/>
-              </a:rPr>
-              <a:t>Test set: </a:t>
-            </a:r>
-          </a:p>
-          <a:p>
-            <a:r>
-              <a:rPr lang="en-US" dirty="0">
-                <a:latin typeface="Consolas" panose="020B0609020204030204" pitchFamily="49" charset="0"/>
-              </a:rPr>
-              <a:t>1772 images. Input Tensor[3, 260, 260]</a:t>
-            </a:r>
-            <a:endParaRPr lang="en-US" dirty="0"/>
-          </a:p>
-        </p:txBody>
-      </p:sp>
-      <p:sp>
-        <p:nvSpPr>
-          <p:cNvPr id="10" name="TextBox 9">
-            <a:extLst>
-              <a:ext uri="{FF2B5EF4-FFF2-40B4-BE49-F238E27FC236}">
-                <a16:creationId xmlns:a16="http://schemas.microsoft.com/office/drawing/2014/main" id="{4B055D39-1EC5-B688-0285-8870F6F340AD}"/>
-              </a:ext>
-            </a:extLst>
-          </p:cNvPr>
-          <p:cNvSpPr txBox="1"/>
-          <p:nvPr/>
-        </p:nvSpPr>
-        <p:spPr>
-          <a:xfrm>
-            <a:off x="282110" y="4298451"/>
-            <a:ext cx="3857029" cy="646331"/>
-          </a:xfrm>
-          <a:prstGeom prst="rect">
-            <a:avLst/>
-          </a:prstGeom>
-          <a:noFill/>
-        </p:spPr>
-        <p:txBody>
-          <a:bodyPr wrap="square">
-            <a:spAutoFit/>
-          </a:bodyPr>
-          <a:lstStyle/>
-          <a:p>
-            <a:r>
-              <a:rPr lang="es-ES" b="0" i="0" dirty="0">
-                <a:effectLst/>
-                <a:latin typeface="Consolas" panose="020B0609020204030204" pitchFamily="49" charset="0"/>
-              </a:rPr>
-              <a:t>Training Set </a:t>
-            </a:r>
-            <a:r>
-              <a:rPr lang="es-ES" b="0" i="0" dirty="0" err="1">
-                <a:effectLst/>
-                <a:latin typeface="Consolas" panose="020B0609020204030204" pitchFamily="49" charset="0"/>
-              </a:rPr>
-              <a:t>Accuracy</a:t>
-            </a:r>
-            <a:r>
-              <a:rPr lang="es-ES" b="0" i="0" dirty="0">
-                <a:effectLst/>
-                <a:latin typeface="Consolas" panose="020B0609020204030204" pitchFamily="49" charset="0"/>
-              </a:rPr>
-              <a:t>: 99.82% </a:t>
-            </a:r>
-          </a:p>
-          <a:p>
-            <a:r>
-              <a:rPr lang="es-ES" b="0" i="0" dirty="0">
-                <a:effectLst/>
-                <a:latin typeface="Consolas" panose="020B0609020204030204" pitchFamily="49" charset="0"/>
-              </a:rPr>
-              <a:t>Test Set </a:t>
-            </a:r>
-            <a:r>
-              <a:rPr lang="es-ES" b="0" i="0" dirty="0" err="1">
-                <a:effectLst/>
-                <a:latin typeface="Consolas" panose="020B0609020204030204" pitchFamily="49" charset="0"/>
-              </a:rPr>
-              <a:t>Accuracy</a:t>
-            </a:r>
-            <a:r>
-              <a:rPr lang="es-ES" b="0" i="0" dirty="0">
-                <a:effectLst/>
-                <a:latin typeface="Consolas" panose="020B0609020204030204" pitchFamily="49" charset="0"/>
-              </a:rPr>
-              <a:t>: 98.8%</a:t>
-            </a:r>
-            <a:endParaRPr lang="en-US" dirty="0"/>
           </a:p>
         </p:txBody>
       </p:sp>
@@ -23410,7 +25020,7 @@
           <p:cNvPr id="3" name="Subtitle 2">
             <a:extLst>
               <a:ext uri="{FF2B5EF4-FFF2-40B4-BE49-F238E27FC236}">
-                <a16:creationId xmlns:a16="http://schemas.microsoft.com/office/drawing/2014/main" id="{3C8A4DBB-6EAD-3D67-4D30-E9E85D184E0F}"/>
+                <a16:creationId xmlns:a16="http://schemas.microsoft.com/office/drawing/2014/main" id="{73CA6260-6C0F-D08C-E398-A7B28E978324}"/>
               </a:ext>
             </a:extLst>
           </p:cNvPr>
@@ -23421,7 +25031,7 @@
         </p:nvSpPr>
         <p:spPr>
           <a:xfrm>
-            <a:off x="199916" y="6391414"/>
+            <a:off x="421673" y="6349415"/>
             <a:ext cx="5633922" cy="658680"/>
           </a:xfrm>
           <a:prstGeom prst="rect">
@@ -23652,65 +25262,12 @@
           </a:p>
         </p:txBody>
       </p:sp>
-      <p:sp>
-        <p:nvSpPr>
-          <p:cNvPr id="11" name="TextBox 10">
+      <p:pic>
+        <p:nvPicPr>
+          <p:cNvPr id="7" name="Picture 6">
             <a:extLst>
               <a:ext uri="{FF2B5EF4-FFF2-40B4-BE49-F238E27FC236}">
-                <a16:creationId xmlns:a16="http://schemas.microsoft.com/office/drawing/2014/main" id="{A416CEAD-C2E2-52C3-D9F4-C09965B66571}"/>
-              </a:ext>
-            </a:extLst>
-          </p:cNvPr>
-          <p:cNvSpPr txBox="1"/>
-          <p:nvPr/>
-        </p:nvSpPr>
-        <p:spPr>
-          <a:xfrm>
-            <a:off x="199916" y="2452978"/>
-            <a:ext cx="6197600" cy="369332"/>
-          </a:xfrm>
-          <a:prstGeom prst="rect">
-            <a:avLst/>
-          </a:prstGeom>
-          <a:noFill/>
-        </p:spPr>
-        <p:txBody>
-          <a:bodyPr wrap="square">
-            <a:spAutoFit/>
-          </a:bodyPr>
-          <a:lstStyle/>
-          <a:p>
-            <a:r>
-              <a:rPr lang="es-ES" b="0" i="0" dirty="0" err="1">
-                <a:effectLst/>
-                <a:latin typeface="Consolas" panose="020B0609020204030204" pitchFamily="49" charset="0"/>
-              </a:rPr>
-              <a:t>Predicted</a:t>
-            </a:r>
-            <a:r>
-              <a:rPr lang="es-ES" b="0" i="0" dirty="0">
-                <a:effectLst/>
-                <a:latin typeface="Consolas" panose="020B0609020204030204" pitchFamily="49" charset="0"/>
-              </a:rPr>
-              <a:t> Output</a:t>
-            </a:r>
-            <a:r>
-              <a:rPr lang="en-US" b="0" i="0" dirty="0">
-                <a:effectLst/>
-                <a:latin typeface="Consolas" panose="020B0609020204030204" pitchFamily="49" charset="0"/>
-              </a:rPr>
-              <a:t>:</a:t>
-            </a:r>
-            <a:endParaRPr lang="en-US" dirty="0"/>
-          </a:p>
-        </p:txBody>
-      </p:sp>
-      <p:pic>
-        <p:nvPicPr>
-          <p:cNvPr id="6" name="Picture 5">
-            <a:extLst>
-              <a:ext uri="{FF2B5EF4-FFF2-40B4-BE49-F238E27FC236}">
-                <a16:creationId xmlns:a16="http://schemas.microsoft.com/office/drawing/2014/main" id="{68165B29-A07C-B7C8-5F79-FD4155048AD9}"/>
+                <a16:creationId xmlns:a16="http://schemas.microsoft.com/office/drawing/2014/main" id="{ECE12BBD-AAA1-8946-34FA-5C0EBAD61BC7}"/>
               </a:ext>
             </a:extLst>
           </p:cNvPr>
@@ -23727,8 +25284,309 @@
         </p:blipFill>
         <p:spPr>
           <a:xfrm>
-            <a:off x="199916" y="2890837"/>
-            <a:ext cx="5476875" cy="1076325"/>
+            <a:off x="543218" y="1427418"/>
+            <a:ext cx="5512378" cy="2960729"/>
+          </a:xfrm>
+          <a:prstGeom prst="rect">
+            <a:avLst/>
+          </a:prstGeom>
+        </p:spPr>
+      </p:pic>
+      <p:sp>
+        <p:nvSpPr>
+          <p:cNvPr id="8" name="Subtitle 2">
+            <a:extLst>
+              <a:ext uri="{FF2B5EF4-FFF2-40B4-BE49-F238E27FC236}">
+                <a16:creationId xmlns:a16="http://schemas.microsoft.com/office/drawing/2014/main" id="{F2A5A464-317D-2A0E-E40D-0F0E7EFDBDB7}"/>
+              </a:ext>
+            </a:extLst>
+          </p:cNvPr>
+          <p:cNvSpPr txBox="1">
+            <a:spLocks/>
+          </p:cNvSpPr>
+          <p:nvPr/>
+        </p:nvSpPr>
+        <p:spPr>
+          <a:xfrm>
+            <a:off x="421672" y="854278"/>
+            <a:ext cx="6263607" cy="658680"/>
+          </a:xfrm>
+          <a:prstGeom prst="rect">
+            <a:avLst/>
+          </a:prstGeom>
+        </p:spPr>
+        <p:txBody>
+          <a:bodyPr vert="horz" lIns="91440" tIns="45720" rIns="91440" bIns="45720" rtlCol="0">
+            <a:normAutofit fontScale="85000" lnSpcReduction="10000"/>
+          </a:bodyPr>
+          <a:lstStyle>
+            <a:lvl1pPr marL="0" indent="0" algn="l" defTabSz="914400" rtl="0" eaLnBrk="1" latinLnBrk="0" hangingPunct="1">
+              <a:lnSpc>
+                <a:spcPct val="110000"/>
+              </a:lnSpc>
+              <a:spcBef>
+                <a:spcPts val="1000"/>
+              </a:spcBef>
+              <a:buClr>
+                <a:schemeClr val="tx2">
+                  <a:lumMod val="50000"/>
+                  <a:lumOff val="50000"/>
+                </a:schemeClr>
+              </a:buClr>
+              <a:buSzPct val="75000"/>
+              <a:buFont typeface="Wingdings" panose="05000000000000000000" pitchFamily="2" charset="2"/>
+              <a:buNone/>
+              <a:defRPr sz="2400" kern="1200">
+                <a:solidFill>
+                  <a:schemeClr val="tx2"/>
+                </a:solidFill>
+                <a:latin typeface="+mn-lt"/>
+                <a:ea typeface="+mn-ea"/>
+                <a:cs typeface="+mn-cs"/>
+              </a:defRPr>
+            </a:lvl1pPr>
+            <a:lvl2pPr marL="457200" indent="0" algn="ctr" defTabSz="914400" rtl="0" eaLnBrk="1" latinLnBrk="0" hangingPunct="1">
+              <a:lnSpc>
+                <a:spcPct val="110000"/>
+              </a:lnSpc>
+              <a:spcBef>
+                <a:spcPts val="500"/>
+              </a:spcBef>
+              <a:buClr>
+                <a:schemeClr val="tx2">
+                  <a:lumMod val="50000"/>
+                  <a:lumOff val="50000"/>
+                </a:schemeClr>
+              </a:buClr>
+              <a:buSzPct val="75000"/>
+              <a:buFont typeface="Wingdings" panose="05000000000000000000" pitchFamily="2" charset="2"/>
+              <a:buNone/>
+              <a:defRPr sz="2000" kern="1200">
+                <a:solidFill>
+                  <a:schemeClr val="tx2"/>
+                </a:solidFill>
+                <a:latin typeface="+mn-lt"/>
+                <a:ea typeface="+mn-ea"/>
+                <a:cs typeface="+mn-cs"/>
+              </a:defRPr>
+            </a:lvl2pPr>
+            <a:lvl3pPr marL="914400" indent="0" algn="ctr" defTabSz="914400" rtl="0" eaLnBrk="1" latinLnBrk="0" hangingPunct="1">
+              <a:lnSpc>
+                <a:spcPct val="110000"/>
+              </a:lnSpc>
+              <a:spcBef>
+                <a:spcPts val="500"/>
+              </a:spcBef>
+              <a:buClr>
+                <a:schemeClr val="tx2">
+                  <a:lumMod val="50000"/>
+                  <a:lumOff val="50000"/>
+                </a:schemeClr>
+              </a:buClr>
+              <a:buSzPct val="75000"/>
+              <a:buFont typeface="Wingdings" panose="05000000000000000000" pitchFamily="2" charset="2"/>
+              <a:buNone/>
+              <a:defRPr sz="1800" kern="1200">
+                <a:solidFill>
+                  <a:schemeClr val="tx2"/>
+                </a:solidFill>
+                <a:latin typeface="+mn-lt"/>
+                <a:ea typeface="+mn-ea"/>
+                <a:cs typeface="+mn-cs"/>
+              </a:defRPr>
+            </a:lvl3pPr>
+            <a:lvl4pPr marL="1371600" indent="0" algn="ctr" defTabSz="914400" rtl="0" eaLnBrk="1" latinLnBrk="0" hangingPunct="1">
+              <a:lnSpc>
+                <a:spcPct val="110000"/>
+              </a:lnSpc>
+              <a:spcBef>
+                <a:spcPts val="500"/>
+              </a:spcBef>
+              <a:buClr>
+                <a:schemeClr val="tx2">
+                  <a:lumMod val="50000"/>
+                  <a:lumOff val="50000"/>
+                </a:schemeClr>
+              </a:buClr>
+              <a:buSzPct val="75000"/>
+              <a:buFont typeface="Wingdings" panose="05000000000000000000" pitchFamily="2" charset="2"/>
+              <a:buNone/>
+              <a:defRPr sz="1600" kern="1200">
+                <a:solidFill>
+                  <a:schemeClr val="tx2"/>
+                </a:solidFill>
+                <a:latin typeface="+mn-lt"/>
+                <a:ea typeface="+mn-ea"/>
+                <a:cs typeface="+mn-cs"/>
+              </a:defRPr>
+            </a:lvl4pPr>
+            <a:lvl5pPr marL="1828800" indent="0" algn="ctr" defTabSz="914400" rtl="0" eaLnBrk="1" latinLnBrk="0" hangingPunct="1">
+              <a:lnSpc>
+                <a:spcPct val="110000"/>
+              </a:lnSpc>
+              <a:spcBef>
+                <a:spcPts val="500"/>
+              </a:spcBef>
+              <a:buClr>
+                <a:schemeClr val="tx2">
+                  <a:lumMod val="50000"/>
+                  <a:lumOff val="50000"/>
+                </a:schemeClr>
+              </a:buClr>
+              <a:buSzPct val="75000"/>
+              <a:buFont typeface="Wingdings" panose="05000000000000000000" pitchFamily="2" charset="2"/>
+              <a:buNone/>
+              <a:defRPr sz="1600" kern="1200">
+                <a:solidFill>
+                  <a:schemeClr val="tx2"/>
+                </a:solidFill>
+                <a:latin typeface="+mn-lt"/>
+                <a:ea typeface="+mn-ea"/>
+                <a:cs typeface="+mn-cs"/>
+              </a:defRPr>
+            </a:lvl5pPr>
+            <a:lvl6pPr marL="2286000" indent="0" algn="ctr" defTabSz="914400" rtl="0" eaLnBrk="1" latinLnBrk="0" hangingPunct="1">
+              <a:lnSpc>
+                <a:spcPct val="90000"/>
+              </a:lnSpc>
+              <a:spcBef>
+                <a:spcPts val="500"/>
+              </a:spcBef>
+              <a:buFont typeface="Arial" panose="020B0604020202020204" pitchFamily="34" charset="0"/>
+              <a:buNone/>
+              <a:defRPr sz="1600" kern="1200">
+                <a:solidFill>
+                  <a:schemeClr val="tx1"/>
+                </a:solidFill>
+                <a:latin typeface="+mn-lt"/>
+                <a:ea typeface="+mn-ea"/>
+                <a:cs typeface="+mn-cs"/>
+              </a:defRPr>
+            </a:lvl6pPr>
+            <a:lvl7pPr marL="2743200" indent="0" algn="ctr" defTabSz="914400" rtl="0" eaLnBrk="1" latinLnBrk="0" hangingPunct="1">
+              <a:lnSpc>
+                <a:spcPct val="90000"/>
+              </a:lnSpc>
+              <a:spcBef>
+                <a:spcPts val="500"/>
+              </a:spcBef>
+              <a:buFont typeface="Arial" panose="020B0604020202020204" pitchFamily="34" charset="0"/>
+              <a:buNone/>
+              <a:defRPr sz="1600" kern="1200">
+                <a:solidFill>
+                  <a:schemeClr val="tx1"/>
+                </a:solidFill>
+                <a:latin typeface="+mn-lt"/>
+                <a:ea typeface="+mn-ea"/>
+                <a:cs typeface="+mn-cs"/>
+              </a:defRPr>
+            </a:lvl7pPr>
+            <a:lvl8pPr marL="3200400" indent="0" algn="ctr" defTabSz="914400" rtl="0" eaLnBrk="1" latinLnBrk="0" hangingPunct="1">
+              <a:lnSpc>
+                <a:spcPct val="90000"/>
+              </a:lnSpc>
+              <a:spcBef>
+                <a:spcPts val="500"/>
+              </a:spcBef>
+              <a:buFont typeface="Arial" panose="020B0604020202020204" pitchFamily="34" charset="0"/>
+              <a:buNone/>
+              <a:defRPr sz="1600" kern="1200">
+                <a:solidFill>
+                  <a:schemeClr val="tx1"/>
+                </a:solidFill>
+                <a:latin typeface="+mn-lt"/>
+                <a:ea typeface="+mn-ea"/>
+                <a:cs typeface="+mn-cs"/>
+              </a:defRPr>
+            </a:lvl8pPr>
+            <a:lvl9pPr marL="3657600" indent="0" algn="ctr" defTabSz="914400" rtl="0" eaLnBrk="1" latinLnBrk="0" hangingPunct="1">
+              <a:lnSpc>
+                <a:spcPct val="90000"/>
+              </a:lnSpc>
+              <a:spcBef>
+                <a:spcPts val="500"/>
+              </a:spcBef>
+              <a:buFont typeface="Arial" panose="020B0604020202020204" pitchFamily="34" charset="0"/>
+              <a:buNone/>
+              <a:defRPr sz="1600" kern="1200">
+                <a:solidFill>
+                  <a:schemeClr val="tx1"/>
+                </a:solidFill>
+                <a:latin typeface="+mn-lt"/>
+                <a:ea typeface="+mn-ea"/>
+                <a:cs typeface="+mn-cs"/>
+              </a:defRPr>
+            </a:lvl9pPr>
+          </a:lstStyle>
+          <a:p>
+            <a:r>
+              <a:rPr lang="es-AR" dirty="0" err="1"/>
+              <a:t>Density</a:t>
+            </a:r>
+            <a:r>
+              <a:rPr lang="es-AR" dirty="0"/>
+              <a:t> Matrix </a:t>
+            </a:r>
+            <a:r>
+              <a:rPr lang="es-AR" dirty="0" err="1"/>
+              <a:t>for</a:t>
+            </a:r>
+            <a:r>
+              <a:rPr lang="es-AR" dirty="0"/>
+              <a:t> </a:t>
+            </a:r>
+            <a:r>
+              <a:rPr lang="es-AR" dirty="0" err="1"/>
+              <a:t>random</a:t>
+            </a:r>
+            <a:r>
+              <a:rPr lang="es-AR" dirty="0"/>
+              <a:t> </a:t>
+            </a:r>
+            <a:r>
+              <a:rPr lang="es-AR" dirty="0" err="1"/>
+              <a:t>parameters</a:t>
+            </a:r>
+            <a:r>
+              <a:rPr lang="es-AR" dirty="0"/>
+              <a:t> </a:t>
+            </a:r>
+            <a:r>
+              <a:rPr lang="es-AR" dirty="0" err="1"/>
+              <a:t>between</a:t>
+            </a:r>
+            <a:r>
+              <a:rPr lang="es-AR" dirty="0"/>
+              <a:t> -1, 1</a:t>
+            </a:r>
+            <a:endParaRPr lang="en-US" dirty="0"/>
+          </a:p>
+        </p:txBody>
+      </p:sp>
+      <p:pic>
+        <p:nvPicPr>
+          <p:cNvPr id="11" name="Picture 10">
+            <a:extLst>
+              <a:ext uri="{FF2B5EF4-FFF2-40B4-BE49-F238E27FC236}">
+                <a16:creationId xmlns:a16="http://schemas.microsoft.com/office/drawing/2014/main" id="{E4BB84F3-C397-B079-EF72-49150E0E5833}"/>
+              </a:ext>
+            </a:extLst>
+          </p:cNvPr>
+          <p:cNvPicPr>
+            <a:picLocks noChangeAspect="1"/>
+          </p:cNvPicPr>
+          <p:nvPr/>
+        </p:nvPicPr>
+        <p:blipFill>
+          <a:blip r:embed="rId4"/>
+          <a:stretch>
+            <a:fillRect/>
+          </a:stretch>
+        </p:blipFill>
+        <p:spPr>
+          <a:xfrm>
+            <a:off x="421672" y="4628239"/>
+            <a:ext cx="11171263" cy="1495634"/>
           </a:xfrm>
           <a:prstGeom prst="rect">
             <a:avLst/>
@@ -23738,7 +25596,7 @@
     </p:spTree>
     <p:extLst>
       <p:ext uri="{BB962C8B-B14F-4D97-AF65-F5344CB8AC3E}">
-        <p14:creationId xmlns:p14="http://schemas.microsoft.com/office/powerpoint/2010/main" val="582208953"/>
+        <p14:creationId xmlns:p14="http://schemas.microsoft.com/office/powerpoint/2010/main" val="934622184"/>
       </p:ext>
     </p:extLst>
   </p:cSld>

</xml_diff>

<commit_message>
Ammends and Updates Main Notebook and Presentation
In English
</commit_message>
<xml_diff>
--- a/QCNNCancerClassifier.pptx
+++ b/QCNNCancerClassifier.pptx
@@ -15,10 +15,11 @@
     <p:sldId id="269" r:id="rId9"/>
     <p:sldId id="270" r:id="rId10"/>
     <p:sldId id="266" r:id="rId11"/>
-    <p:sldId id="264" r:id="rId12"/>
-    <p:sldId id="268" r:id="rId13"/>
-    <p:sldId id="265" r:id="rId14"/>
-    <p:sldId id="267" r:id="rId15"/>
+    <p:sldId id="271" r:id="rId12"/>
+    <p:sldId id="264" r:id="rId13"/>
+    <p:sldId id="268" r:id="rId14"/>
+    <p:sldId id="265" r:id="rId15"/>
+    <p:sldId id="267" r:id="rId16"/>
   </p:sldIdLst>
   <p:sldSz cx="12192000" cy="6858000"/>
   <p:notesSz cx="6858000" cy="9144000"/>
@@ -1791,7 +1792,7 @@
           <a:p>
             <a:fld id="{8F72BA41-EC5B-4197-BCC8-0FD2E523CD7A}" type="datetimeFigureOut">
               <a:rPr lang="en-US" smtClean="0"/>
-              <a:t>11/4/2022</a:t>
+              <a:t>11/8/2022</a:t>
             </a:fld>
             <a:endParaRPr lang="en-US"/>
           </a:p>
@@ -1994,7 +1995,7 @@
           <a:p>
             <a:fld id="{8F72BA41-EC5B-4197-BCC8-0FD2E523CD7A}" type="datetimeFigureOut">
               <a:rPr lang="en-US" smtClean="0"/>
-              <a:t>11/4/2022</a:t>
+              <a:t>11/8/2022</a:t>
             </a:fld>
             <a:endParaRPr lang="en-US"/>
           </a:p>
@@ -3715,7 +3716,7 @@
           <a:p>
             <a:fld id="{8F72BA41-EC5B-4197-BCC8-0FD2E523CD7A}" type="datetimeFigureOut">
               <a:rPr lang="en-US" smtClean="0"/>
-              <a:t>11/4/2022</a:t>
+              <a:t>11/8/2022</a:t>
             </a:fld>
             <a:endParaRPr lang="en-US"/>
           </a:p>
@@ -3914,7 +3915,7 @@
           <a:p>
             <a:fld id="{8F72BA41-EC5B-4197-BCC8-0FD2E523CD7A}" type="datetimeFigureOut">
               <a:rPr lang="en-US" smtClean="0"/>
-              <a:t>11/4/2022</a:t>
+              <a:t>11/8/2022</a:t>
             </a:fld>
             <a:endParaRPr lang="en-US"/>
           </a:p>
@@ -5704,7 +5705,7 @@
           <a:p>
             <a:fld id="{8F72BA41-EC5B-4197-BCC8-0FD2E523CD7A}" type="datetimeFigureOut">
               <a:rPr lang="en-US" smtClean="0"/>
-              <a:t>11/4/2022</a:t>
+              <a:t>11/8/2022</a:t>
             </a:fld>
             <a:endParaRPr lang="en-US"/>
           </a:p>
@@ -5977,7 +5978,7 @@
           <a:p>
             <a:fld id="{8F72BA41-EC5B-4197-BCC8-0FD2E523CD7A}" type="datetimeFigureOut">
               <a:rPr lang="en-US" smtClean="0"/>
-              <a:t>11/4/2022</a:t>
+              <a:t>11/8/2022</a:t>
             </a:fld>
             <a:endParaRPr lang="en-US"/>
           </a:p>
@@ -6397,7 +6398,7 @@
           <a:p>
             <a:fld id="{8F72BA41-EC5B-4197-BCC8-0FD2E523CD7A}" type="datetimeFigureOut">
               <a:rPr lang="en-US" smtClean="0"/>
-              <a:t>11/4/2022</a:t>
+              <a:t>11/8/2022</a:t>
             </a:fld>
             <a:endParaRPr lang="en-US"/>
           </a:p>
@@ -6553,7 +6554,7 @@
           <a:p>
             <a:fld id="{8F72BA41-EC5B-4197-BCC8-0FD2E523CD7A}" type="datetimeFigureOut">
               <a:rPr lang="en-US" smtClean="0"/>
-              <a:t>11/4/2022</a:t>
+              <a:t>11/8/2022</a:t>
             </a:fld>
             <a:endParaRPr lang="en-US"/>
           </a:p>
@@ -8121,7 +8122,7 @@
           <a:p>
             <a:fld id="{8F72BA41-EC5B-4197-BCC8-0FD2E523CD7A}" type="datetimeFigureOut">
               <a:rPr lang="en-US" smtClean="0"/>
-              <a:t>11/4/2022</a:t>
+              <a:t>11/8/2022</a:t>
             </a:fld>
             <a:endParaRPr lang="en-US"/>
           </a:p>
@@ -9972,7 +9973,7 @@
           <a:p>
             <a:fld id="{8F72BA41-EC5B-4197-BCC8-0FD2E523CD7A}" type="datetimeFigureOut">
               <a:rPr lang="en-US" smtClean="0"/>
-              <a:t>11/4/2022</a:t>
+              <a:t>11/8/2022</a:t>
             </a:fld>
             <a:endParaRPr lang="en-US"/>
           </a:p>
@@ -11785,7 +11786,7 @@
           <a:p>
             <a:fld id="{8F72BA41-EC5B-4197-BCC8-0FD2E523CD7A}" type="datetimeFigureOut">
               <a:rPr lang="en-US" smtClean="0"/>
-              <a:t>11/4/2022</a:t>
+              <a:t>11/8/2022</a:t>
             </a:fld>
             <a:endParaRPr lang="en-US"/>
           </a:p>
@@ -13479,7 +13480,7 @@
             <a:fld id="{8F72BA41-EC5B-4197-BCC8-0FD2E523CD7A}" type="datetimeFigureOut">
               <a:rPr lang="en-US" smtClean="0"/>
               <a:pPr/>
-              <a:t>11/4/2022</a:t>
+              <a:t>11/8/2022</a:t>
             </a:fld>
             <a:endParaRPr lang="en-US" dirty="0"/>
           </a:p>
@@ -15906,13 +15907,8 @@
             </a:pPr>
             <a:r>
               <a:rPr lang="en-US" dirty="0"/>
-              <a:t>Image Cancer </a:t>
-            </a:r>
-            <a:r>
-              <a:rPr lang="en-US" dirty="0" err="1"/>
-              <a:t>Classiffier</a:t>
-            </a:r>
-            <a:endParaRPr lang="en-US" dirty="0"/>
+              <a:t>Image Cancer Classifier</a:t>
+            </a:r>
           </a:p>
         </p:txBody>
       </p:sp>
@@ -16652,8 +16648,8 @@
         </p:nvSpPr>
         <p:spPr>
           <a:xfrm>
-            <a:off x="4916456" y="672458"/>
-            <a:ext cx="7252697" cy="5355312"/>
+            <a:off x="4673860" y="386315"/>
+            <a:ext cx="7252697" cy="5632311"/>
           </a:xfrm>
           <a:prstGeom prst="rect">
             <a:avLst/>
@@ -16668,6 +16664,9 @@
           <a:p>
             <a:r>
               <a:rPr lang="en-US" b="0" i="0" dirty="0">
+                <a:solidFill>
+                  <a:srgbClr val="333333"/>
+                </a:solidFill>
                 <a:effectLst/>
                 <a:latin typeface="Consolas" panose="020B0609020204030204" pitchFamily="49" charset="0"/>
               </a:rPr>
@@ -16675,30 +16674,10 @@
             </a:r>
           </a:p>
           <a:p>
-            <a:r>
-              <a:rPr lang="en-US" b="0" i="0" dirty="0">
-                <a:effectLst/>
-                <a:latin typeface="Consolas" panose="020B0609020204030204" pitchFamily="49" charset="0"/>
-              </a:rPr>
-              <a:t>(conv1): Conv2d(3, 24, </a:t>
-            </a:r>
-            <a:r>
-              <a:rPr lang="en-US" b="0" i="0" dirty="0" err="1">
-                <a:effectLst/>
-                <a:latin typeface="Consolas" panose="020B0609020204030204" pitchFamily="49" charset="0"/>
-              </a:rPr>
-              <a:t>kernel_size</a:t>
-            </a:r>
-            <a:r>
-              <a:rPr lang="en-US" b="0" i="0" dirty="0">
-                <a:effectLst/>
-                <a:latin typeface="Consolas" panose="020B0609020204030204" pitchFamily="49" charset="0"/>
-              </a:rPr>
-              <a:t>=(5, 5), stride=(1, 1))</a:t>
-            </a:r>
-          </a:p>
-          <a:p>
             <a:endParaRPr lang="en-US" b="0" i="0" dirty="0">
+              <a:solidFill>
+                <a:srgbClr val="333333"/>
+              </a:solidFill>
               <a:effectLst/>
               <a:latin typeface="Consolas" panose="020B0609020204030204" pitchFamily="49" charset="0"/>
             </a:endParaRPr>
@@ -16706,13 +16685,19 @@
           <a:p>
             <a:r>
               <a:rPr lang="en-US" b="0" i="0" dirty="0">
+                <a:solidFill>
+                  <a:srgbClr val="333333"/>
+                </a:solidFill>
                 <a:effectLst/>
                 <a:latin typeface="Consolas" panose="020B0609020204030204" pitchFamily="49" charset="0"/>
               </a:rPr>
-              <a:t>(conv2): Conv2d(24, 48, </a:t>
+              <a:t>(conv1): Conv2d(3, 128, </a:t>
             </a:r>
             <a:r>
               <a:rPr lang="en-US" b="0" i="0" dirty="0" err="1">
+                <a:solidFill>
+                  <a:srgbClr val="333333"/>
+                </a:solidFill>
                 <a:effectLst/>
                 <a:latin typeface="Consolas" panose="020B0609020204030204" pitchFamily="49" charset="0"/>
               </a:rPr>
@@ -16720,14 +16705,20 @@
             </a:r>
             <a:r>
               <a:rPr lang="en-US" b="0" i="0" dirty="0">
+                <a:solidFill>
+                  <a:srgbClr val="333333"/>
+                </a:solidFill>
                 <a:effectLst/>
                 <a:latin typeface="Consolas" panose="020B0609020204030204" pitchFamily="49" charset="0"/>
               </a:rPr>
-              <a:t>=(5, 5), stride=(1, 1))</a:t>
+              <a:t>=(5, 5), stride=(1, 1)) </a:t>
             </a:r>
           </a:p>
           <a:p>
             <a:endParaRPr lang="en-US" b="0" i="0" dirty="0">
+              <a:solidFill>
+                <a:srgbClr val="333333"/>
+              </a:solidFill>
               <a:effectLst/>
               <a:latin typeface="Consolas" panose="020B0609020204030204" pitchFamily="49" charset="0"/>
             </a:endParaRPr>
@@ -16735,28 +16726,40 @@
           <a:p>
             <a:r>
               <a:rPr lang="en-US" b="0" i="0" dirty="0">
+                <a:solidFill>
+                  <a:srgbClr val="333333"/>
+                </a:solidFill>
                 <a:effectLst/>
                 <a:latin typeface="Consolas" panose="020B0609020204030204" pitchFamily="49" charset="0"/>
               </a:rPr>
-              <a:t>(dropout): Dropout2d(p=0.5, </a:t>
+              <a:t>(conv2): Conv2d(128, 128, </a:t>
             </a:r>
             <a:r>
               <a:rPr lang="en-US" b="0" i="0" dirty="0" err="1">
+                <a:solidFill>
+                  <a:srgbClr val="333333"/>
+                </a:solidFill>
                 <a:effectLst/>
                 <a:latin typeface="Consolas" panose="020B0609020204030204" pitchFamily="49" charset="0"/>
               </a:rPr>
-              <a:t>inplace</a:t>
+              <a:t>kernel_size</a:t>
             </a:r>
             <a:r>
               <a:rPr lang="en-US" b="0" i="0" dirty="0">
+                <a:solidFill>
+                  <a:srgbClr val="333333"/>
+                </a:solidFill>
                 <a:effectLst/>
                 <a:latin typeface="Consolas" panose="020B0609020204030204" pitchFamily="49" charset="0"/>
               </a:rPr>
-              <a:t>=False)</a:t>
+              <a:t>=(3, 3), stride=(1, 1)) </a:t>
             </a:r>
           </a:p>
           <a:p>
             <a:endParaRPr lang="en-US" b="0" i="0" dirty="0">
+              <a:solidFill>
+                <a:srgbClr val="333333"/>
+              </a:solidFill>
               <a:effectLst/>
               <a:latin typeface="Consolas" panose="020B0609020204030204" pitchFamily="49" charset="0"/>
             </a:endParaRPr>
@@ -16764,42 +16767,40 @@
           <a:p>
             <a:r>
               <a:rPr lang="en-US" b="0" i="0" dirty="0">
+                <a:solidFill>
+                  <a:srgbClr val="333333"/>
+                </a:solidFill>
                 <a:effectLst/>
                 <a:latin typeface="Consolas" panose="020B0609020204030204" pitchFamily="49" charset="0"/>
               </a:rPr>
-              <a:t>(fc1): Linear(</a:t>
+              <a:t>(dropout): Dropout2d(p=0.5, </a:t>
             </a:r>
             <a:r>
               <a:rPr lang="en-US" b="0" i="0" dirty="0" err="1">
+                <a:solidFill>
+                  <a:srgbClr val="333333"/>
+                </a:solidFill>
                 <a:effectLst/>
                 <a:latin typeface="Consolas" panose="020B0609020204030204" pitchFamily="49" charset="0"/>
               </a:rPr>
-              <a:t>in_features</a:t>
+              <a:t>inplace</a:t>
             </a:r>
             <a:r>
               <a:rPr lang="en-US" b="0" i="0" dirty="0">
+                <a:solidFill>
+                  <a:srgbClr val="333333"/>
+                </a:solidFill>
                 <a:effectLst/>
                 <a:latin typeface="Consolas" panose="020B0609020204030204" pitchFamily="49" charset="0"/>
               </a:rPr>
-              <a:t>=184512, </a:t>
-            </a:r>
-            <a:r>
-              <a:rPr lang="en-US" b="0" i="0" dirty="0" err="1">
-                <a:effectLst/>
-                <a:latin typeface="Consolas" panose="020B0609020204030204" pitchFamily="49" charset="0"/>
-              </a:rPr>
-              <a:t>out_features</a:t>
-            </a:r>
-            <a:r>
-              <a:rPr lang="en-US" b="0" i="0" dirty="0">
-                <a:effectLst/>
-                <a:latin typeface="Consolas" panose="020B0609020204030204" pitchFamily="49" charset="0"/>
-              </a:rPr>
-              <a:t>=512, bias=True)</a:t>
+              <a:t>=False) </a:t>
             </a:r>
           </a:p>
           <a:p>
             <a:endParaRPr lang="en-US" b="0" i="0" dirty="0">
+              <a:solidFill>
+                <a:srgbClr val="333333"/>
+              </a:solidFill>
               <a:effectLst/>
               <a:latin typeface="Consolas" panose="020B0609020204030204" pitchFamily="49" charset="0"/>
             </a:endParaRPr>
@@ -16807,13 +16808,19 @@
           <a:p>
             <a:r>
               <a:rPr lang="en-US" b="0" i="0" dirty="0">
+                <a:solidFill>
+                  <a:srgbClr val="333333"/>
+                </a:solidFill>
                 <a:effectLst/>
                 <a:latin typeface="Consolas" panose="020B0609020204030204" pitchFamily="49" charset="0"/>
               </a:rPr>
-              <a:t>(fc2): Linear(</a:t>
+              <a:t>(fc1): Linear(</a:t>
             </a:r>
             <a:r>
               <a:rPr lang="en-US" b="0" i="0" dirty="0" err="1">
+                <a:solidFill>
+                  <a:srgbClr val="333333"/>
+                </a:solidFill>
                 <a:effectLst/>
                 <a:latin typeface="Consolas" panose="020B0609020204030204" pitchFamily="49" charset="0"/>
               </a:rPr>
@@ -16821,13 +16828,19 @@
             </a:r>
             <a:r>
               <a:rPr lang="en-US" b="0" i="0" dirty="0">
+                <a:solidFill>
+                  <a:srgbClr val="333333"/>
+                </a:solidFill>
                 <a:effectLst/>
                 <a:latin typeface="Consolas" panose="020B0609020204030204" pitchFamily="49" charset="0"/>
               </a:rPr>
-              <a:t>=512, </a:t>
+              <a:t>=508032, </a:t>
             </a:r>
             <a:r>
               <a:rPr lang="en-US" b="0" i="0" dirty="0" err="1">
+                <a:solidFill>
+                  <a:srgbClr val="333333"/>
+                </a:solidFill>
                 <a:effectLst/>
                 <a:latin typeface="Consolas" panose="020B0609020204030204" pitchFamily="49" charset="0"/>
               </a:rPr>
@@ -16835,14 +16848,20 @@
             </a:r>
             <a:r>
               <a:rPr lang="en-US" b="0" i="0" dirty="0">
+                <a:solidFill>
+                  <a:srgbClr val="333333"/>
+                </a:solidFill>
                 <a:effectLst/>
                 <a:latin typeface="Consolas" panose="020B0609020204030204" pitchFamily="49" charset="0"/>
               </a:rPr>
-              <a:t>=2, bias=True) </a:t>
+              <a:t>=128, bias=True) </a:t>
             </a:r>
           </a:p>
           <a:p>
             <a:endParaRPr lang="en-US" b="0" i="0" dirty="0">
+              <a:solidFill>
+                <a:srgbClr val="333333"/>
+              </a:solidFill>
               <a:effectLst/>
               <a:latin typeface="Consolas" panose="020B0609020204030204" pitchFamily="49" charset="0"/>
             </a:endParaRPr>
@@ -16850,6 +16869,69 @@
           <a:p>
             <a:r>
               <a:rPr lang="en-US" b="0" i="0" dirty="0">
+                <a:solidFill>
+                  <a:srgbClr val="333333"/>
+                </a:solidFill>
+                <a:effectLst/>
+                <a:latin typeface="Consolas" panose="020B0609020204030204" pitchFamily="49" charset="0"/>
+              </a:rPr>
+              <a:t>(fc2): Linear(</a:t>
+            </a:r>
+            <a:r>
+              <a:rPr lang="en-US" b="0" i="0" dirty="0" err="1">
+                <a:solidFill>
+                  <a:srgbClr val="333333"/>
+                </a:solidFill>
+                <a:effectLst/>
+                <a:latin typeface="Consolas" panose="020B0609020204030204" pitchFamily="49" charset="0"/>
+              </a:rPr>
+              <a:t>in_features</a:t>
+            </a:r>
+            <a:r>
+              <a:rPr lang="en-US" b="0" i="0" dirty="0">
+                <a:solidFill>
+                  <a:srgbClr val="333333"/>
+                </a:solidFill>
+                <a:effectLst/>
+                <a:latin typeface="Consolas" panose="020B0609020204030204" pitchFamily="49" charset="0"/>
+              </a:rPr>
+              <a:t>=128, </a:t>
+            </a:r>
+            <a:r>
+              <a:rPr lang="en-US" b="0" i="0" dirty="0" err="1">
+                <a:solidFill>
+                  <a:srgbClr val="333333"/>
+                </a:solidFill>
+                <a:effectLst/>
+                <a:latin typeface="Consolas" panose="020B0609020204030204" pitchFamily="49" charset="0"/>
+              </a:rPr>
+              <a:t>out_features</a:t>
+            </a:r>
+            <a:r>
+              <a:rPr lang="en-US" b="0" i="0" dirty="0">
+                <a:solidFill>
+                  <a:srgbClr val="333333"/>
+                </a:solidFill>
+                <a:effectLst/>
+                <a:latin typeface="Consolas" panose="020B0609020204030204" pitchFamily="49" charset="0"/>
+              </a:rPr>
+              <a:t>=2, bias=True) </a:t>
+            </a:r>
+          </a:p>
+          <a:p>
+            <a:endParaRPr lang="en-US" dirty="0">
+              <a:solidFill>
+                <a:srgbClr val="333333"/>
+              </a:solidFill>
+              <a:latin typeface="Consolas" panose="020B0609020204030204" pitchFamily="49" charset="0"/>
+            </a:endParaRPr>
+          </a:p>
+          <a:p>
+            <a:r>
+              <a:rPr lang="en-US" b="0" i="0" dirty="0">
+                <a:solidFill>
+                  <a:srgbClr val="333333"/>
+                </a:solidFill>
                 <a:effectLst/>
                 <a:latin typeface="Consolas" panose="020B0609020204030204" pitchFamily="49" charset="0"/>
               </a:rPr>
@@ -16857,6 +16939,9 @@
             </a:r>
             <a:r>
               <a:rPr lang="en-US" b="0" i="0" dirty="0" err="1">
+                <a:solidFill>
+                  <a:srgbClr val="333333"/>
+                </a:solidFill>
                 <a:effectLst/>
                 <a:latin typeface="Consolas" panose="020B0609020204030204" pitchFamily="49" charset="0"/>
               </a:rPr>
@@ -16864,6 +16949,9 @@
             </a:r>
             <a:r>
               <a:rPr lang="en-US" b="0" i="0" dirty="0">
+                <a:solidFill>
+                  <a:srgbClr val="333333"/>
+                </a:solidFill>
                 <a:effectLst/>
                 <a:latin typeface="Consolas" panose="020B0609020204030204" pitchFamily="49" charset="0"/>
               </a:rPr>
@@ -16871,6 +16959,9 @@
             </a:r>
             <a:r>
               <a:rPr lang="en-US" b="0" i="0" dirty="0" err="1">
+                <a:solidFill>
+                  <a:srgbClr val="333333"/>
+                </a:solidFill>
                 <a:effectLst/>
                 <a:latin typeface="Consolas" panose="020B0609020204030204" pitchFamily="49" charset="0"/>
               </a:rPr>
@@ -16878,20 +16969,30 @@
             </a:r>
             <a:r>
               <a:rPr lang="en-US" b="0" i="0" dirty="0">
+                <a:solidFill>
+                  <a:srgbClr val="333333"/>
+                </a:solidFill>
                 <a:effectLst/>
                 <a:latin typeface="Consolas" panose="020B0609020204030204" pitchFamily="49" charset="0"/>
               </a:rPr>
-              <a:t>()</a:t>
+              <a:t>() </a:t>
             </a:r>
           </a:p>
           <a:p>
-            <a:endParaRPr lang="en-US" dirty="0">
+            <a:endParaRPr lang="en-US" b="0" i="0" dirty="0">
+              <a:solidFill>
+                <a:srgbClr val="333333"/>
+              </a:solidFill>
+              <a:effectLst/>
               <a:latin typeface="Consolas" panose="020B0609020204030204" pitchFamily="49" charset="0"/>
             </a:endParaRPr>
           </a:p>
           <a:p>
             <a:r>
               <a:rPr lang="en-US" b="0" i="0" dirty="0">
+                <a:solidFill>
+                  <a:srgbClr val="333333"/>
+                </a:solidFill>
                 <a:effectLst/>
                 <a:latin typeface="Consolas" panose="020B0609020204030204" pitchFamily="49" charset="0"/>
               </a:rPr>
@@ -16899,6 +17000,9 @@
             </a:r>
             <a:r>
               <a:rPr lang="en-US" b="0" i="0" dirty="0" err="1">
+                <a:solidFill>
+                  <a:srgbClr val="333333"/>
+                </a:solidFill>
                 <a:effectLst/>
                 <a:latin typeface="Consolas" panose="020B0609020204030204" pitchFamily="49" charset="0"/>
               </a:rPr>
@@ -16906,6 +17010,9 @@
             </a:r>
             <a:r>
               <a:rPr lang="en-US" b="0" i="0" dirty="0">
+                <a:solidFill>
+                  <a:srgbClr val="333333"/>
+                </a:solidFill>
                 <a:effectLst/>
                 <a:latin typeface="Consolas" panose="020B0609020204030204" pitchFamily="49" charset="0"/>
               </a:rPr>
@@ -16913,6 +17020,9 @@
             </a:r>
             <a:r>
               <a:rPr lang="en-US" b="0" i="0" dirty="0" err="1">
+                <a:solidFill>
+                  <a:srgbClr val="333333"/>
+                </a:solidFill>
                 <a:effectLst/>
                 <a:latin typeface="Consolas" panose="020B0609020204030204" pitchFamily="49" charset="0"/>
               </a:rPr>
@@ -16920,20 +17030,18 @@
             </a:r>
             <a:r>
               <a:rPr lang="en-US" b="0" i="0" dirty="0">
+                <a:solidFill>
+                  <a:srgbClr val="333333"/>
+                </a:solidFill>
                 <a:effectLst/>
                 <a:latin typeface="Consolas" panose="020B0609020204030204" pitchFamily="49" charset="0"/>
               </a:rPr>
-              <a:t>=1, bias=True) </a:t>
-            </a:r>
-          </a:p>
-          <a:p>
-            <a:r>
-              <a:rPr lang="en-US" b="0" i="0" dirty="0">
-                <a:effectLst/>
-                <a:latin typeface="Consolas" panose="020B0609020204030204" pitchFamily="49" charset="0"/>
-              </a:rPr>
-              <a:t>)</a:t>
-            </a:r>
+              <a:t>=1, bias=True) )</a:t>
+            </a:r>
+            <a:endParaRPr lang="en-US" b="0" i="0" dirty="0">
+              <a:effectLst/>
+              <a:latin typeface="Consolas" panose="020B0609020204030204" pitchFamily="49" charset="0"/>
+            </a:endParaRPr>
           </a:p>
         </p:txBody>
       </p:sp>
@@ -16981,6 +17089,822 @@
 </file>
 
 <file path=ppt/slides/slide11.xml><?xml version="1.0" encoding="utf-8"?>
+<p:sld xmlns:a="http://schemas.openxmlformats.org/drawingml/2006/main" xmlns:r="http://schemas.openxmlformats.org/officeDocument/2006/relationships" xmlns:p="http://schemas.openxmlformats.org/presentationml/2006/main">
+  <p:cSld>
+    <p:spTree>
+      <p:nvGrpSpPr>
+        <p:cNvPr id="1" name=""/>
+        <p:cNvGrpSpPr/>
+        <p:nvPr/>
+      </p:nvGrpSpPr>
+      <p:grpSpPr>
+        <a:xfrm>
+          <a:off x="0" y="0"/>
+          <a:ext cx="0" cy="0"/>
+          <a:chOff x="0" y="0"/>
+          <a:chExt cx="0" cy="0"/>
+        </a:xfrm>
+      </p:grpSpPr>
+      <p:pic>
+        <p:nvPicPr>
+          <p:cNvPr id="4" name="Picture 3" descr="Chart, scatter chart&#10;&#10;Description automatically generated">
+            <a:extLst>
+              <a:ext uri="{FF2B5EF4-FFF2-40B4-BE49-F238E27FC236}">
+                <a16:creationId xmlns:a16="http://schemas.microsoft.com/office/drawing/2014/main" id="{228AFBCD-4B87-EA18-7D28-8B102269C8C6}"/>
+              </a:ext>
+            </a:extLst>
+          </p:cNvPr>
+          <p:cNvPicPr>
+            <a:picLocks noChangeAspect="1"/>
+          </p:cNvPicPr>
+          <p:nvPr/>
+        </p:nvPicPr>
+        <p:blipFill rotWithShape="1">
+          <a:blip r:embed="rId2"/>
+          <a:srcRect t="5973" b="19027"/>
+          <a:stretch/>
+        </p:blipFill>
+        <p:spPr>
+          <a:xfrm>
+            <a:off x="-22827" y="3413"/>
+            <a:ext cx="12191980" cy="6857989"/>
+          </a:xfrm>
+          <a:prstGeom prst="rect">
+            <a:avLst/>
+          </a:prstGeom>
+        </p:spPr>
+      </p:pic>
+      <p:sp>
+        <p:nvSpPr>
+          <p:cNvPr id="2" name="Title 1">
+            <a:extLst>
+              <a:ext uri="{FF2B5EF4-FFF2-40B4-BE49-F238E27FC236}">
+                <a16:creationId xmlns:a16="http://schemas.microsoft.com/office/drawing/2014/main" id="{EB6A064A-D868-272C-A067-DD7A50F22CEB}"/>
+              </a:ext>
+            </a:extLst>
+          </p:cNvPr>
+          <p:cNvSpPr>
+            <a:spLocks noGrp="1"/>
+          </p:cNvSpPr>
+          <p:nvPr>
+            <p:ph type="ctrTitle"/>
+          </p:nvPr>
+        </p:nvSpPr>
+        <p:spPr>
+          <a:xfrm>
+            <a:off x="375920" y="90593"/>
+            <a:ext cx="8361680" cy="676505"/>
+          </a:xfrm>
+        </p:spPr>
+        <p:txBody>
+          <a:bodyPr vert="horz" lIns="91440" tIns="45720" rIns="91440" bIns="45720" rtlCol="0" anchor="b">
+            <a:normAutofit/>
+          </a:bodyPr>
+          <a:lstStyle/>
+          <a:p>
+            <a:pPr>
+              <a:lnSpc>
+                <a:spcPct val="90000"/>
+              </a:lnSpc>
+            </a:pPr>
+            <a:r>
+              <a:rPr lang="es-AR" sz="4200" dirty="0"/>
+              <a:t>Net </a:t>
+            </a:r>
+            <a:r>
+              <a:rPr lang="es-AR" sz="4200" dirty="0" err="1"/>
+              <a:t>Overview</a:t>
+            </a:r>
+            <a:r>
+              <a:rPr lang="es-AR" sz="4200" dirty="0"/>
+              <a:t> </a:t>
+            </a:r>
+            <a:r>
+              <a:rPr lang="es-AR" sz="4200" dirty="0" err="1"/>
+              <a:t>Summary</a:t>
+            </a:r>
+            <a:endParaRPr lang="en-US" sz="4200" dirty="0"/>
+          </a:p>
+        </p:txBody>
+      </p:sp>
+      <p:sp>
+        <p:nvSpPr>
+          <p:cNvPr id="3" name="Subtitle 2">
+            <a:extLst>
+              <a:ext uri="{FF2B5EF4-FFF2-40B4-BE49-F238E27FC236}">
+                <a16:creationId xmlns:a16="http://schemas.microsoft.com/office/drawing/2014/main" id="{73CA6260-6C0F-D08C-E398-A7B28E978324}"/>
+              </a:ext>
+            </a:extLst>
+          </p:cNvPr>
+          <p:cNvSpPr txBox="1">
+            <a:spLocks/>
+          </p:cNvSpPr>
+          <p:nvPr/>
+        </p:nvSpPr>
+        <p:spPr>
+          <a:xfrm>
+            <a:off x="421673" y="6349415"/>
+            <a:ext cx="5633922" cy="658680"/>
+          </a:xfrm>
+          <a:prstGeom prst="rect">
+            <a:avLst/>
+          </a:prstGeom>
+        </p:spPr>
+        <p:txBody>
+          <a:bodyPr vert="horz" lIns="91440" tIns="45720" rIns="91440" bIns="45720" rtlCol="0">
+            <a:normAutofit fontScale="85000" lnSpcReduction="10000"/>
+          </a:bodyPr>
+          <a:lstStyle>
+            <a:lvl1pPr marL="0" indent="0" algn="l" defTabSz="914400" rtl="0" eaLnBrk="1" latinLnBrk="0" hangingPunct="1">
+              <a:lnSpc>
+                <a:spcPct val="110000"/>
+              </a:lnSpc>
+              <a:spcBef>
+                <a:spcPts val="1000"/>
+              </a:spcBef>
+              <a:buClr>
+                <a:schemeClr val="tx2">
+                  <a:lumMod val="50000"/>
+                  <a:lumOff val="50000"/>
+                </a:schemeClr>
+              </a:buClr>
+              <a:buSzPct val="75000"/>
+              <a:buFont typeface="Wingdings" panose="05000000000000000000" pitchFamily="2" charset="2"/>
+              <a:buNone/>
+              <a:defRPr sz="2400" kern="1200">
+                <a:solidFill>
+                  <a:schemeClr val="tx2"/>
+                </a:solidFill>
+                <a:latin typeface="+mn-lt"/>
+                <a:ea typeface="+mn-ea"/>
+                <a:cs typeface="+mn-cs"/>
+              </a:defRPr>
+            </a:lvl1pPr>
+            <a:lvl2pPr marL="457200" indent="0" algn="ctr" defTabSz="914400" rtl="0" eaLnBrk="1" latinLnBrk="0" hangingPunct="1">
+              <a:lnSpc>
+                <a:spcPct val="110000"/>
+              </a:lnSpc>
+              <a:spcBef>
+                <a:spcPts val="500"/>
+              </a:spcBef>
+              <a:buClr>
+                <a:schemeClr val="tx2">
+                  <a:lumMod val="50000"/>
+                  <a:lumOff val="50000"/>
+                </a:schemeClr>
+              </a:buClr>
+              <a:buSzPct val="75000"/>
+              <a:buFont typeface="Wingdings" panose="05000000000000000000" pitchFamily="2" charset="2"/>
+              <a:buNone/>
+              <a:defRPr sz="2000" kern="1200">
+                <a:solidFill>
+                  <a:schemeClr val="tx2"/>
+                </a:solidFill>
+                <a:latin typeface="+mn-lt"/>
+                <a:ea typeface="+mn-ea"/>
+                <a:cs typeface="+mn-cs"/>
+              </a:defRPr>
+            </a:lvl2pPr>
+            <a:lvl3pPr marL="914400" indent="0" algn="ctr" defTabSz="914400" rtl="0" eaLnBrk="1" latinLnBrk="0" hangingPunct="1">
+              <a:lnSpc>
+                <a:spcPct val="110000"/>
+              </a:lnSpc>
+              <a:spcBef>
+                <a:spcPts val="500"/>
+              </a:spcBef>
+              <a:buClr>
+                <a:schemeClr val="tx2">
+                  <a:lumMod val="50000"/>
+                  <a:lumOff val="50000"/>
+                </a:schemeClr>
+              </a:buClr>
+              <a:buSzPct val="75000"/>
+              <a:buFont typeface="Wingdings" panose="05000000000000000000" pitchFamily="2" charset="2"/>
+              <a:buNone/>
+              <a:defRPr sz="1800" kern="1200">
+                <a:solidFill>
+                  <a:schemeClr val="tx2"/>
+                </a:solidFill>
+                <a:latin typeface="+mn-lt"/>
+                <a:ea typeface="+mn-ea"/>
+                <a:cs typeface="+mn-cs"/>
+              </a:defRPr>
+            </a:lvl3pPr>
+            <a:lvl4pPr marL="1371600" indent="0" algn="ctr" defTabSz="914400" rtl="0" eaLnBrk="1" latinLnBrk="0" hangingPunct="1">
+              <a:lnSpc>
+                <a:spcPct val="110000"/>
+              </a:lnSpc>
+              <a:spcBef>
+                <a:spcPts val="500"/>
+              </a:spcBef>
+              <a:buClr>
+                <a:schemeClr val="tx2">
+                  <a:lumMod val="50000"/>
+                  <a:lumOff val="50000"/>
+                </a:schemeClr>
+              </a:buClr>
+              <a:buSzPct val="75000"/>
+              <a:buFont typeface="Wingdings" panose="05000000000000000000" pitchFamily="2" charset="2"/>
+              <a:buNone/>
+              <a:defRPr sz="1600" kern="1200">
+                <a:solidFill>
+                  <a:schemeClr val="tx2"/>
+                </a:solidFill>
+                <a:latin typeface="+mn-lt"/>
+                <a:ea typeface="+mn-ea"/>
+                <a:cs typeface="+mn-cs"/>
+              </a:defRPr>
+            </a:lvl4pPr>
+            <a:lvl5pPr marL="1828800" indent="0" algn="ctr" defTabSz="914400" rtl="0" eaLnBrk="1" latinLnBrk="0" hangingPunct="1">
+              <a:lnSpc>
+                <a:spcPct val="110000"/>
+              </a:lnSpc>
+              <a:spcBef>
+                <a:spcPts val="500"/>
+              </a:spcBef>
+              <a:buClr>
+                <a:schemeClr val="tx2">
+                  <a:lumMod val="50000"/>
+                  <a:lumOff val="50000"/>
+                </a:schemeClr>
+              </a:buClr>
+              <a:buSzPct val="75000"/>
+              <a:buFont typeface="Wingdings" panose="05000000000000000000" pitchFamily="2" charset="2"/>
+              <a:buNone/>
+              <a:defRPr sz="1600" kern="1200">
+                <a:solidFill>
+                  <a:schemeClr val="tx2"/>
+                </a:solidFill>
+                <a:latin typeface="+mn-lt"/>
+                <a:ea typeface="+mn-ea"/>
+                <a:cs typeface="+mn-cs"/>
+              </a:defRPr>
+            </a:lvl5pPr>
+            <a:lvl6pPr marL="2286000" indent="0" algn="ctr" defTabSz="914400" rtl="0" eaLnBrk="1" latinLnBrk="0" hangingPunct="1">
+              <a:lnSpc>
+                <a:spcPct val="90000"/>
+              </a:lnSpc>
+              <a:spcBef>
+                <a:spcPts val="500"/>
+              </a:spcBef>
+              <a:buFont typeface="Arial" panose="020B0604020202020204" pitchFamily="34" charset="0"/>
+              <a:buNone/>
+              <a:defRPr sz="1600" kern="1200">
+                <a:solidFill>
+                  <a:schemeClr val="tx1"/>
+                </a:solidFill>
+                <a:latin typeface="+mn-lt"/>
+                <a:ea typeface="+mn-ea"/>
+                <a:cs typeface="+mn-cs"/>
+              </a:defRPr>
+            </a:lvl6pPr>
+            <a:lvl7pPr marL="2743200" indent="0" algn="ctr" defTabSz="914400" rtl="0" eaLnBrk="1" latinLnBrk="0" hangingPunct="1">
+              <a:lnSpc>
+                <a:spcPct val="90000"/>
+              </a:lnSpc>
+              <a:spcBef>
+                <a:spcPts val="500"/>
+              </a:spcBef>
+              <a:buFont typeface="Arial" panose="020B0604020202020204" pitchFamily="34" charset="0"/>
+              <a:buNone/>
+              <a:defRPr sz="1600" kern="1200">
+                <a:solidFill>
+                  <a:schemeClr val="tx1"/>
+                </a:solidFill>
+                <a:latin typeface="+mn-lt"/>
+                <a:ea typeface="+mn-ea"/>
+                <a:cs typeface="+mn-cs"/>
+              </a:defRPr>
+            </a:lvl7pPr>
+            <a:lvl8pPr marL="3200400" indent="0" algn="ctr" defTabSz="914400" rtl="0" eaLnBrk="1" latinLnBrk="0" hangingPunct="1">
+              <a:lnSpc>
+                <a:spcPct val="90000"/>
+              </a:lnSpc>
+              <a:spcBef>
+                <a:spcPts val="500"/>
+              </a:spcBef>
+              <a:buFont typeface="Arial" panose="020B0604020202020204" pitchFamily="34" charset="0"/>
+              <a:buNone/>
+              <a:defRPr sz="1600" kern="1200">
+                <a:solidFill>
+                  <a:schemeClr val="tx1"/>
+                </a:solidFill>
+                <a:latin typeface="+mn-lt"/>
+                <a:ea typeface="+mn-ea"/>
+                <a:cs typeface="+mn-cs"/>
+              </a:defRPr>
+            </a:lvl8pPr>
+            <a:lvl9pPr marL="3657600" indent="0" algn="ctr" defTabSz="914400" rtl="0" eaLnBrk="1" latinLnBrk="0" hangingPunct="1">
+              <a:lnSpc>
+                <a:spcPct val="90000"/>
+              </a:lnSpc>
+              <a:spcBef>
+                <a:spcPts val="500"/>
+              </a:spcBef>
+              <a:buFont typeface="Arial" panose="020B0604020202020204" pitchFamily="34" charset="0"/>
+              <a:buNone/>
+              <a:defRPr sz="1600" kern="1200">
+                <a:solidFill>
+                  <a:schemeClr val="tx1"/>
+                </a:solidFill>
+                <a:latin typeface="+mn-lt"/>
+                <a:ea typeface="+mn-ea"/>
+                <a:cs typeface="+mn-cs"/>
+              </a:defRPr>
+            </a:lvl9pPr>
+          </a:lstStyle>
+          <a:p>
+            <a:r>
+              <a:rPr lang="es-AR" dirty="0"/>
+              <a:t>Machine </a:t>
+            </a:r>
+            <a:r>
+              <a:rPr lang="es-AR" dirty="0" err="1"/>
+              <a:t>Learning</a:t>
+            </a:r>
+            <a:r>
+              <a:rPr lang="es-AR" dirty="0"/>
+              <a:t> &amp; Quantum Deep </a:t>
+            </a:r>
+            <a:r>
+              <a:rPr lang="es-AR" dirty="0" err="1"/>
+              <a:t>Learning</a:t>
+            </a:r>
+            <a:endParaRPr lang="en-US" dirty="0"/>
+          </a:p>
+        </p:txBody>
+      </p:sp>
+      <p:sp>
+        <p:nvSpPr>
+          <p:cNvPr id="8" name="Subtitle 2">
+            <a:extLst>
+              <a:ext uri="{FF2B5EF4-FFF2-40B4-BE49-F238E27FC236}">
+                <a16:creationId xmlns:a16="http://schemas.microsoft.com/office/drawing/2014/main" id="{F2A5A464-317D-2A0E-E40D-0F0E7EFDBDB7}"/>
+              </a:ext>
+            </a:extLst>
+          </p:cNvPr>
+          <p:cNvSpPr txBox="1">
+            <a:spLocks/>
+          </p:cNvSpPr>
+          <p:nvPr/>
+        </p:nvSpPr>
+        <p:spPr>
+          <a:xfrm>
+            <a:off x="452187" y="884034"/>
+            <a:ext cx="5416767" cy="5465381"/>
+          </a:xfrm>
+          <a:prstGeom prst="rect">
+            <a:avLst/>
+          </a:prstGeom>
+        </p:spPr>
+        <p:txBody>
+          <a:bodyPr vert="horz" lIns="91440" tIns="45720" rIns="91440" bIns="45720" rtlCol="0">
+            <a:normAutofit fontScale="92500" lnSpcReduction="20000"/>
+          </a:bodyPr>
+          <a:lstStyle>
+            <a:lvl1pPr marL="0" indent="0" algn="l" defTabSz="914400" rtl="0" eaLnBrk="1" latinLnBrk="0" hangingPunct="1">
+              <a:lnSpc>
+                <a:spcPct val="110000"/>
+              </a:lnSpc>
+              <a:spcBef>
+                <a:spcPts val="1000"/>
+              </a:spcBef>
+              <a:buClr>
+                <a:schemeClr val="tx2">
+                  <a:lumMod val="50000"/>
+                  <a:lumOff val="50000"/>
+                </a:schemeClr>
+              </a:buClr>
+              <a:buSzPct val="75000"/>
+              <a:buFont typeface="Wingdings" panose="05000000000000000000" pitchFamily="2" charset="2"/>
+              <a:buNone/>
+              <a:defRPr sz="2400" kern="1200">
+                <a:solidFill>
+                  <a:schemeClr val="tx2"/>
+                </a:solidFill>
+                <a:latin typeface="+mn-lt"/>
+                <a:ea typeface="+mn-ea"/>
+                <a:cs typeface="+mn-cs"/>
+              </a:defRPr>
+            </a:lvl1pPr>
+            <a:lvl2pPr marL="457200" indent="0" algn="ctr" defTabSz="914400" rtl="0" eaLnBrk="1" latinLnBrk="0" hangingPunct="1">
+              <a:lnSpc>
+                <a:spcPct val="110000"/>
+              </a:lnSpc>
+              <a:spcBef>
+                <a:spcPts val="500"/>
+              </a:spcBef>
+              <a:buClr>
+                <a:schemeClr val="tx2">
+                  <a:lumMod val="50000"/>
+                  <a:lumOff val="50000"/>
+                </a:schemeClr>
+              </a:buClr>
+              <a:buSzPct val="75000"/>
+              <a:buFont typeface="Wingdings" panose="05000000000000000000" pitchFamily="2" charset="2"/>
+              <a:buNone/>
+              <a:defRPr sz="2000" kern="1200">
+                <a:solidFill>
+                  <a:schemeClr val="tx2"/>
+                </a:solidFill>
+                <a:latin typeface="+mn-lt"/>
+                <a:ea typeface="+mn-ea"/>
+                <a:cs typeface="+mn-cs"/>
+              </a:defRPr>
+            </a:lvl2pPr>
+            <a:lvl3pPr marL="914400" indent="0" algn="ctr" defTabSz="914400" rtl="0" eaLnBrk="1" latinLnBrk="0" hangingPunct="1">
+              <a:lnSpc>
+                <a:spcPct val="110000"/>
+              </a:lnSpc>
+              <a:spcBef>
+                <a:spcPts val="500"/>
+              </a:spcBef>
+              <a:buClr>
+                <a:schemeClr val="tx2">
+                  <a:lumMod val="50000"/>
+                  <a:lumOff val="50000"/>
+                </a:schemeClr>
+              </a:buClr>
+              <a:buSzPct val="75000"/>
+              <a:buFont typeface="Wingdings" panose="05000000000000000000" pitchFamily="2" charset="2"/>
+              <a:buNone/>
+              <a:defRPr sz="1800" kern="1200">
+                <a:solidFill>
+                  <a:schemeClr val="tx2"/>
+                </a:solidFill>
+                <a:latin typeface="+mn-lt"/>
+                <a:ea typeface="+mn-ea"/>
+                <a:cs typeface="+mn-cs"/>
+              </a:defRPr>
+            </a:lvl3pPr>
+            <a:lvl4pPr marL="1371600" indent="0" algn="ctr" defTabSz="914400" rtl="0" eaLnBrk="1" latinLnBrk="0" hangingPunct="1">
+              <a:lnSpc>
+                <a:spcPct val="110000"/>
+              </a:lnSpc>
+              <a:spcBef>
+                <a:spcPts val="500"/>
+              </a:spcBef>
+              <a:buClr>
+                <a:schemeClr val="tx2">
+                  <a:lumMod val="50000"/>
+                  <a:lumOff val="50000"/>
+                </a:schemeClr>
+              </a:buClr>
+              <a:buSzPct val="75000"/>
+              <a:buFont typeface="Wingdings" panose="05000000000000000000" pitchFamily="2" charset="2"/>
+              <a:buNone/>
+              <a:defRPr sz="1600" kern="1200">
+                <a:solidFill>
+                  <a:schemeClr val="tx2"/>
+                </a:solidFill>
+                <a:latin typeface="+mn-lt"/>
+                <a:ea typeface="+mn-ea"/>
+                <a:cs typeface="+mn-cs"/>
+              </a:defRPr>
+            </a:lvl4pPr>
+            <a:lvl5pPr marL="1828800" indent="0" algn="ctr" defTabSz="914400" rtl="0" eaLnBrk="1" latinLnBrk="0" hangingPunct="1">
+              <a:lnSpc>
+                <a:spcPct val="110000"/>
+              </a:lnSpc>
+              <a:spcBef>
+                <a:spcPts val="500"/>
+              </a:spcBef>
+              <a:buClr>
+                <a:schemeClr val="tx2">
+                  <a:lumMod val="50000"/>
+                  <a:lumOff val="50000"/>
+                </a:schemeClr>
+              </a:buClr>
+              <a:buSzPct val="75000"/>
+              <a:buFont typeface="Wingdings" panose="05000000000000000000" pitchFamily="2" charset="2"/>
+              <a:buNone/>
+              <a:defRPr sz="1600" kern="1200">
+                <a:solidFill>
+                  <a:schemeClr val="tx2"/>
+                </a:solidFill>
+                <a:latin typeface="+mn-lt"/>
+                <a:ea typeface="+mn-ea"/>
+                <a:cs typeface="+mn-cs"/>
+              </a:defRPr>
+            </a:lvl5pPr>
+            <a:lvl6pPr marL="2286000" indent="0" algn="ctr" defTabSz="914400" rtl="0" eaLnBrk="1" latinLnBrk="0" hangingPunct="1">
+              <a:lnSpc>
+                <a:spcPct val="90000"/>
+              </a:lnSpc>
+              <a:spcBef>
+                <a:spcPts val="500"/>
+              </a:spcBef>
+              <a:buFont typeface="Arial" panose="020B0604020202020204" pitchFamily="34" charset="0"/>
+              <a:buNone/>
+              <a:defRPr sz="1600" kern="1200">
+                <a:solidFill>
+                  <a:schemeClr val="tx1"/>
+                </a:solidFill>
+                <a:latin typeface="+mn-lt"/>
+                <a:ea typeface="+mn-ea"/>
+                <a:cs typeface="+mn-cs"/>
+              </a:defRPr>
+            </a:lvl6pPr>
+            <a:lvl7pPr marL="2743200" indent="0" algn="ctr" defTabSz="914400" rtl="0" eaLnBrk="1" latinLnBrk="0" hangingPunct="1">
+              <a:lnSpc>
+                <a:spcPct val="90000"/>
+              </a:lnSpc>
+              <a:spcBef>
+                <a:spcPts val="500"/>
+              </a:spcBef>
+              <a:buFont typeface="Arial" panose="020B0604020202020204" pitchFamily="34" charset="0"/>
+              <a:buNone/>
+              <a:defRPr sz="1600" kern="1200">
+                <a:solidFill>
+                  <a:schemeClr val="tx1"/>
+                </a:solidFill>
+                <a:latin typeface="+mn-lt"/>
+                <a:ea typeface="+mn-ea"/>
+                <a:cs typeface="+mn-cs"/>
+              </a:defRPr>
+            </a:lvl7pPr>
+            <a:lvl8pPr marL="3200400" indent="0" algn="ctr" defTabSz="914400" rtl="0" eaLnBrk="1" latinLnBrk="0" hangingPunct="1">
+              <a:lnSpc>
+                <a:spcPct val="90000"/>
+              </a:lnSpc>
+              <a:spcBef>
+                <a:spcPts val="500"/>
+              </a:spcBef>
+              <a:buFont typeface="Arial" panose="020B0604020202020204" pitchFamily="34" charset="0"/>
+              <a:buNone/>
+              <a:defRPr sz="1600" kern="1200">
+                <a:solidFill>
+                  <a:schemeClr val="tx1"/>
+                </a:solidFill>
+                <a:latin typeface="+mn-lt"/>
+                <a:ea typeface="+mn-ea"/>
+                <a:cs typeface="+mn-cs"/>
+              </a:defRPr>
+            </a:lvl8pPr>
+            <a:lvl9pPr marL="3657600" indent="0" algn="ctr" defTabSz="914400" rtl="0" eaLnBrk="1" latinLnBrk="0" hangingPunct="1">
+              <a:lnSpc>
+                <a:spcPct val="90000"/>
+              </a:lnSpc>
+              <a:spcBef>
+                <a:spcPts val="500"/>
+              </a:spcBef>
+              <a:buFont typeface="Arial" panose="020B0604020202020204" pitchFamily="34" charset="0"/>
+              <a:buNone/>
+              <a:defRPr sz="1600" kern="1200">
+                <a:solidFill>
+                  <a:schemeClr val="tx1"/>
+                </a:solidFill>
+                <a:latin typeface="+mn-lt"/>
+                <a:ea typeface="+mn-ea"/>
+                <a:cs typeface="+mn-cs"/>
+              </a:defRPr>
+            </a:lvl9pPr>
+          </a:lstStyle>
+          <a:p>
+            <a:r>
+              <a:rPr lang="en-US" sz="1200" b="0" i="0" dirty="0">
+                <a:solidFill>
+                  <a:srgbClr val="333333"/>
+                </a:solidFill>
+                <a:effectLst/>
+                <a:latin typeface="Consolas" panose="020B0609020204030204" pitchFamily="49" charset="0"/>
+              </a:rPr>
+              <a:t>---------------------------------------------------------------- </a:t>
+            </a:r>
+          </a:p>
+          <a:p>
+            <a:r>
+              <a:rPr lang="en-US" sz="1200" b="0" i="0" dirty="0">
+                <a:solidFill>
+                  <a:srgbClr val="333333"/>
+                </a:solidFill>
+                <a:effectLst/>
+                <a:latin typeface="Consolas" panose="020B0609020204030204" pitchFamily="49" charset="0"/>
+              </a:rPr>
+              <a:t>Layer (type) Output Shape Param # </a:t>
+            </a:r>
+          </a:p>
+          <a:p>
+            <a:r>
+              <a:rPr lang="en-US" sz="1200" b="0" i="0" dirty="0">
+                <a:solidFill>
+                  <a:srgbClr val="333333"/>
+                </a:solidFill>
+                <a:effectLst/>
+                <a:latin typeface="Consolas" panose="020B0609020204030204" pitchFamily="49" charset="0"/>
+              </a:rPr>
+              <a:t>================================================================ </a:t>
+            </a:r>
+          </a:p>
+          <a:p>
+            <a:r>
+              <a:rPr lang="en-US" sz="1200" b="0" i="0" dirty="0">
+                <a:solidFill>
+                  <a:srgbClr val="333333"/>
+                </a:solidFill>
+                <a:effectLst/>
+                <a:latin typeface="Consolas" panose="020B0609020204030204" pitchFamily="49" charset="0"/>
+              </a:rPr>
+              <a:t>Conv2d-1 [-1, 128, 256, 256] 9,728 </a:t>
+            </a:r>
+          </a:p>
+          <a:p>
+            <a:r>
+              <a:rPr lang="en-US" sz="1200" b="0" i="0" dirty="0">
+                <a:solidFill>
+                  <a:srgbClr val="333333"/>
+                </a:solidFill>
+                <a:effectLst/>
+                <a:latin typeface="Consolas" panose="020B0609020204030204" pitchFamily="49" charset="0"/>
+              </a:rPr>
+              <a:t>Conv2d-2 [-1, 128, 126, 126] 147,584 </a:t>
+            </a:r>
+          </a:p>
+          <a:p>
+            <a:r>
+              <a:rPr lang="en-US" sz="1200" b="0" i="0" dirty="0">
+                <a:solidFill>
+                  <a:srgbClr val="333333"/>
+                </a:solidFill>
+                <a:effectLst/>
+                <a:latin typeface="Consolas" panose="020B0609020204030204" pitchFamily="49" charset="0"/>
+              </a:rPr>
+              <a:t>Dropout2d-3 [-1, 128, 63, 63] 0 </a:t>
+            </a:r>
+          </a:p>
+          <a:p>
+            <a:r>
+              <a:rPr lang="en-US" sz="1200" b="0" i="0" dirty="0">
+                <a:solidFill>
+                  <a:srgbClr val="333333"/>
+                </a:solidFill>
+                <a:effectLst/>
+                <a:latin typeface="Consolas" panose="020B0609020204030204" pitchFamily="49" charset="0"/>
+              </a:rPr>
+              <a:t>Linear-4 [-1, 128] 65,028,224 </a:t>
+            </a:r>
+          </a:p>
+          <a:p>
+            <a:r>
+              <a:rPr lang="en-US" sz="1200" b="0" i="0" dirty="0">
+                <a:solidFill>
+                  <a:srgbClr val="333333"/>
+                </a:solidFill>
+                <a:effectLst/>
+                <a:latin typeface="Consolas" panose="020B0609020204030204" pitchFamily="49" charset="0"/>
+              </a:rPr>
+              <a:t>Linear-5 [-1, 2] 258 </a:t>
+            </a:r>
+          </a:p>
+          <a:p>
+            <a:r>
+              <a:rPr lang="en-US" sz="1200" b="0" i="0" dirty="0">
+                <a:solidFill>
+                  <a:srgbClr val="333333"/>
+                </a:solidFill>
+                <a:effectLst/>
+                <a:latin typeface="Consolas" panose="020B0609020204030204" pitchFamily="49" charset="0"/>
+              </a:rPr>
+              <a:t>TorchConnector-6 [-1, 1] 4 </a:t>
+            </a:r>
+          </a:p>
+          <a:p>
+            <a:r>
+              <a:rPr lang="en-US" sz="1200" b="0" i="0" dirty="0">
+                <a:solidFill>
+                  <a:srgbClr val="333333"/>
+                </a:solidFill>
+                <a:effectLst/>
+                <a:latin typeface="Consolas" panose="020B0609020204030204" pitchFamily="49" charset="0"/>
+              </a:rPr>
+              <a:t>Linear-7 [-1, 1] 2 </a:t>
+            </a:r>
+          </a:p>
+          <a:p>
+            <a:r>
+              <a:rPr lang="en-US" sz="1200" b="0" i="0" dirty="0">
+                <a:solidFill>
+                  <a:srgbClr val="333333"/>
+                </a:solidFill>
+                <a:effectLst/>
+                <a:latin typeface="Consolas" panose="020B0609020204030204" pitchFamily="49" charset="0"/>
+              </a:rPr>
+              <a:t>================================================================ </a:t>
+            </a:r>
+          </a:p>
+          <a:p>
+            <a:r>
+              <a:rPr lang="en-US" sz="1200" b="0" i="0" dirty="0">
+                <a:solidFill>
+                  <a:srgbClr val="333333"/>
+                </a:solidFill>
+                <a:effectLst/>
+                <a:latin typeface="Consolas" panose="020B0609020204030204" pitchFamily="49" charset="0"/>
+              </a:rPr>
+              <a:t>Total params: 65,185,800 </a:t>
+            </a:r>
+          </a:p>
+          <a:p>
+            <a:r>
+              <a:rPr lang="en-US" sz="1200" b="0" i="0" dirty="0">
+                <a:solidFill>
+                  <a:srgbClr val="333333"/>
+                </a:solidFill>
+                <a:effectLst/>
+                <a:latin typeface="Consolas" panose="020B0609020204030204" pitchFamily="49" charset="0"/>
+              </a:rPr>
+              <a:t>Trainable params: 65,185,800 </a:t>
+            </a:r>
+          </a:p>
+          <a:p>
+            <a:r>
+              <a:rPr lang="en-US" sz="1200" b="0" i="0" dirty="0">
+                <a:solidFill>
+                  <a:srgbClr val="333333"/>
+                </a:solidFill>
+                <a:effectLst/>
+                <a:latin typeface="Consolas" panose="020B0609020204030204" pitchFamily="49" charset="0"/>
+              </a:rPr>
+              <a:t>Non-trainable params: 0 </a:t>
+            </a:r>
+          </a:p>
+          <a:p>
+            <a:r>
+              <a:rPr lang="en-US" sz="1200" b="0" i="0" dirty="0">
+                <a:solidFill>
+                  <a:srgbClr val="333333"/>
+                </a:solidFill>
+                <a:effectLst/>
+                <a:latin typeface="Consolas" panose="020B0609020204030204" pitchFamily="49" charset="0"/>
+              </a:rPr>
+              <a:t>---------------------------------------------------------------- </a:t>
+            </a:r>
+          </a:p>
+          <a:p>
+            <a:r>
+              <a:rPr lang="en-US" sz="1200" b="0" i="0" dirty="0">
+                <a:solidFill>
+                  <a:srgbClr val="333333"/>
+                </a:solidFill>
+                <a:effectLst/>
+                <a:latin typeface="Consolas" panose="020B0609020204030204" pitchFamily="49" charset="0"/>
+              </a:rPr>
+              <a:t>Input size (MB): 0.77 </a:t>
+            </a:r>
+          </a:p>
+          <a:p>
+            <a:r>
+              <a:rPr lang="en-US" sz="1200" b="0" i="0" dirty="0">
+                <a:solidFill>
+                  <a:srgbClr val="333333"/>
+                </a:solidFill>
+                <a:effectLst/>
+                <a:latin typeface="Consolas" panose="020B0609020204030204" pitchFamily="49" charset="0"/>
+              </a:rPr>
+              <a:t>Forward/backward pass size (MB): 83.38 </a:t>
+            </a:r>
+          </a:p>
+          <a:p>
+            <a:r>
+              <a:rPr lang="en-US" sz="1200" b="0" i="0" dirty="0">
+                <a:solidFill>
+                  <a:srgbClr val="333333"/>
+                </a:solidFill>
+                <a:effectLst/>
+                <a:latin typeface="Consolas" panose="020B0609020204030204" pitchFamily="49" charset="0"/>
+              </a:rPr>
+              <a:t>Params size (MB): 248.66 </a:t>
+            </a:r>
+          </a:p>
+          <a:p>
+            <a:r>
+              <a:rPr lang="en-US" sz="1200" b="0" i="0" dirty="0">
+                <a:solidFill>
+                  <a:srgbClr val="333333"/>
+                </a:solidFill>
+                <a:effectLst/>
+                <a:latin typeface="Consolas" panose="020B0609020204030204" pitchFamily="49" charset="0"/>
+              </a:rPr>
+              <a:t>Estimated Total Size (MB): 332.82</a:t>
+            </a:r>
+            <a:endParaRPr lang="en-US" sz="1200" dirty="0"/>
+          </a:p>
+        </p:txBody>
+      </p:sp>
+    </p:spTree>
+    <p:extLst>
+      <p:ext uri="{BB962C8B-B14F-4D97-AF65-F5344CB8AC3E}">
+        <p14:creationId xmlns:p14="http://schemas.microsoft.com/office/powerpoint/2010/main" val="1585356434"/>
+      </p:ext>
+    </p:extLst>
+  </p:cSld>
+  <p:clrMapOvr>
+    <a:masterClrMapping/>
+  </p:clrMapOvr>
+</p:sld>
+</file>
+
+<file path=ppt/slides/slide12.xml><?xml version="1.0" encoding="utf-8"?>
 <p:sld xmlns:a="http://schemas.openxmlformats.org/drawingml/2006/main" xmlns:r="http://schemas.openxmlformats.org/officeDocument/2006/relationships" xmlns:p="http://schemas.openxmlformats.org/presentationml/2006/main">
   <p:cSld>
     <p:spTree>
@@ -17561,7 +18485,7 @@
 </p:sld>
 </file>
 
-<file path=ppt/slides/slide12.xml><?xml version="1.0" encoding="utf-8"?>
+<file path=ppt/slides/slide13.xml><?xml version="1.0" encoding="utf-8"?>
 <p:sld xmlns:a="http://schemas.openxmlformats.org/drawingml/2006/main" xmlns:r="http://schemas.openxmlformats.org/officeDocument/2006/relationships" xmlns:p="http://schemas.openxmlformats.org/presentationml/2006/main">
   <p:cSld>
     <p:spTree>
@@ -17972,7 +18896,7 @@
 </p:sld>
 </file>
 
-<file path=ppt/slides/slide13.xml><?xml version="1.0" encoding="utf-8"?>
+<file path=ppt/slides/slide14.xml><?xml version="1.0" encoding="utf-8"?>
 <p:sld xmlns:a="http://schemas.openxmlformats.org/drawingml/2006/main" xmlns:r="http://schemas.openxmlformats.org/officeDocument/2006/relationships" xmlns:p="http://schemas.openxmlformats.org/presentationml/2006/main">
   <p:cSld>
     <p:spTree>
@@ -18074,7 +18998,7 @@
         <p:spPr>
           <a:xfrm>
             <a:off x="113447" y="789034"/>
-            <a:ext cx="7283945" cy="4801314"/>
+            <a:ext cx="7283945" cy="5355312"/>
           </a:xfrm>
           <a:prstGeom prst="rect">
             <a:avLst/>
@@ -18119,7 +19043,7 @@
                 <a:effectLst/>
                 <a:latin typeface="Consolas" panose="020B0609020204030204" pitchFamily="49" charset="0"/>
               </a:rPr>
-              <a:t>-By vectorizing the image, the Perceptron losses information about the image, although it can be reconstructed. The neural network works with the complete information of the image.</a:t>
+              <a:t>-By vectorizing the image, the Perceptron losses information about the image, although it can be reconstructed. The hybrid neural network works with the complete information of the image.</a:t>
             </a:r>
           </a:p>
           <a:p>
@@ -18150,6 +19074,31 @@
               </a:rPr>
               <a:t>-The quantum circuit could be improved with more layers.</a:t>
             </a:r>
+          </a:p>
+          <a:p>
+            <a:endParaRPr lang="en-US" dirty="0">
+              <a:latin typeface="Consolas" panose="020B0609020204030204" pitchFamily="49" charset="0"/>
+            </a:endParaRPr>
+          </a:p>
+          <a:p>
+            <a:r>
+              <a:rPr lang="en-US" b="0" dirty="0">
+                <a:effectLst/>
+                <a:latin typeface="Consolas" panose="020B0609020204030204" pitchFamily="49" charset="0"/>
+              </a:rPr>
+              <a:t>-At the end, Quantum Entanglement is parameter </a:t>
+            </a:r>
+            <a:r>
+              <a:rPr lang="en-US" b="0" dirty="0" err="1">
+                <a:effectLst/>
+                <a:latin typeface="Consolas" panose="020B0609020204030204" pitchFamily="49" charset="0"/>
+              </a:rPr>
+              <a:t>binded</a:t>
+            </a:r>
+            <a:endParaRPr lang="en-US" b="0" dirty="0">
+              <a:effectLst/>
+              <a:latin typeface="Consolas" panose="020B0609020204030204" pitchFamily="49" charset="0"/>
+            </a:endParaRPr>
           </a:p>
           <a:p>
             <a:endParaRPr lang="en-US" b="0" dirty="0">
@@ -18431,7 +19380,7 @@
 </p:sld>
 </file>
 
-<file path=ppt/slides/slide14.xml><?xml version="1.0" encoding="utf-8"?>
+<file path=ppt/slides/slide15.xml><?xml version="1.0" encoding="utf-8"?>
 <p:sld xmlns:a="http://schemas.openxmlformats.org/drawingml/2006/main" xmlns:r="http://schemas.openxmlformats.org/officeDocument/2006/relationships" xmlns:p="http://schemas.openxmlformats.org/presentationml/2006/main">
   <p:cSld>
     <p:spTree>
@@ -24409,7 +25358,7 @@
         </p:nvSpPr>
         <p:spPr>
           <a:xfrm>
-            <a:off x="706153" y="1215838"/>
+            <a:off x="538203" y="1187154"/>
             <a:ext cx="5633922" cy="658680"/>
           </a:xfrm>
           <a:prstGeom prst="rect">
@@ -24668,7 +25617,7 @@
         </p:nvSpPr>
         <p:spPr>
           <a:xfrm>
-            <a:off x="706153" y="3558524"/>
+            <a:off x="538203" y="3448167"/>
             <a:ext cx="5633922" cy="658680"/>
           </a:xfrm>
           <a:prstGeom prst="rect">
@@ -24899,6 +25848,90 @@
               <a:rPr lang="es-AR" dirty="0" err="1"/>
               <a:t>Graph</a:t>
             </a:r>
+            <a:endParaRPr lang="en-US" dirty="0"/>
+          </a:p>
+        </p:txBody>
+      </p:sp>
+      <p:sp>
+        <p:nvSpPr>
+          <p:cNvPr id="5" name="TextBox 4">
+            <a:extLst>
+              <a:ext uri="{FF2B5EF4-FFF2-40B4-BE49-F238E27FC236}">
+                <a16:creationId xmlns:a16="http://schemas.microsoft.com/office/drawing/2014/main" id="{8184E454-1566-7DF0-39D9-1EC0FA753277}"/>
+              </a:ext>
+            </a:extLst>
+          </p:cNvPr>
+          <p:cNvSpPr txBox="1"/>
+          <p:nvPr/>
+        </p:nvSpPr>
+        <p:spPr>
+          <a:xfrm>
+            <a:off x="421673" y="5373296"/>
+            <a:ext cx="6389674" cy="1200329"/>
+          </a:xfrm>
+          <a:prstGeom prst="rect">
+            <a:avLst/>
+          </a:prstGeom>
+          <a:noFill/>
+        </p:spPr>
+        <p:txBody>
+          <a:bodyPr wrap="square" rtlCol="0">
+            <a:spAutoFit/>
+          </a:bodyPr>
+          <a:lstStyle/>
+          <a:p>
+            <a:r>
+              <a:rPr lang="en-US" b="0" dirty="0">
+                <a:solidFill>
+                  <a:srgbClr val="333333"/>
+                </a:solidFill>
+                <a:effectLst/>
+                <a:latin typeface="Consolas" panose="020B0609020204030204" pitchFamily="49" charset="0"/>
+              </a:rPr>
+              <a:t>There are CNOT gates in the circuits like </a:t>
+            </a:r>
+            <a:r>
+              <a:rPr lang="en-US" b="0" dirty="0" err="1">
+                <a:solidFill>
+                  <a:srgbClr val="333333"/>
+                </a:solidFill>
+                <a:effectLst/>
+                <a:latin typeface="Consolas" panose="020B0609020204030204" pitchFamily="49" charset="0"/>
+              </a:rPr>
+              <a:t>ZZFeatureMap</a:t>
+            </a:r>
+            <a:r>
+              <a:rPr lang="en-US" b="0" dirty="0">
+                <a:solidFill>
+                  <a:srgbClr val="333333"/>
+                </a:solidFill>
+                <a:effectLst/>
+                <a:latin typeface="Consolas" panose="020B0609020204030204" pitchFamily="49" charset="0"/>
+              </a:rPr>
+              <a:t> and </a:t>
+            </a:r>
+            <a:r>
+              <a:rPr lang="en-US" b="0" dirty="0" err="1">
+                <a:solidFill>
+                  <a:srgbClr val="333333"/>
+                </a:solidFill>
+                <a:effectLst/>
+                <a:latin typeface="Consolas" panose="020B0609020204030204" pitchFamily="49" charset="0"/>
+              </a:rPr>
+              <a:t>RealAmplitudes</a:t>
+            </a:r>
+            <a:r>
+              <a:rPr lang="en-US" b="0" dirty="0">
+                <a:solidFill>
+                  <a:srgbClr val="333333"/>
+                </a:solidFill>
+                <a:effectLst/>
+                <a:latin typeface="Consolas" panose="020B0609020204030204" pitchFamily="49" charset="0"/>
+              </a:rPr>
+              <a:t>, thus the QNN makes use of entanglement.</a:t>
+            </a:r>
+          </a:p>
+          <a:p>
             <a:endParaRPr lang="en-US" dirty="0"/>
           </a:p>
         </p:txBody>

</xml_diff>